<commit_message>
add initial diagram to bot basics
</commit_message>
<xml_diff>
--- a/art-source/power-point/architecture.pptx
+++ b/art-source/power-point/architecture.pptx
@@ -5,7 +5,7 @@
     <p:sldMasterId id="2147483648" r:id="rId1"/>
   </p:sldMasterIdLst>
   <p:notesMasterIdLst>
-    <p:notesMasterId r:id="rId15"/>
+    <p:notesMasterId r:id="rId14"/>
   </p:notesMasterIdLst>
   <p:sldIdLst>
     <p:sldId id="259" r:id="rId2"/>
@@ -13,14 +13,13 @@
     <p:sldId id="267" r:id="rId4"/>
     <p:sldId id="269" r:id="rId5"/>
     <p:sldId id="268" r:id="rId6"/>
-    <p:sldId id="266" r:id="rId7"/>
-    <p:sldId id="264" r:id="rId8"/>
-    <p:sldId id="260" r:id="rId9"/>
-    <p:sldId id="261" r:id="rId10"/>
-    <p:sldId id="263" r:id="rId11"/>
-    <p:sldId id="262" r:id="rId12"/>
-    <p:sldId id="258" r:id="rId13"/>
-    <p:sldId id="256" r:id="rId14"/>
+    <p:sldId id="264" r:id="rId7"/>
+    <p:sldId id="260" r:id="rId8"/>
+    <p:sldId id="261" r:id="rId9"/>
+    <p:sldId id="263" r:id="rId10"/>
+    <p:sldId id="262" r:id="rId11"/>
+    <p:sldId id="258" r:id="rId12"/>
+    <p:sldId id="256" r:id="rId13"/>
   </p:sldIdLst>
   <p:sldSz cx="12192000" cy="6858000"/>
   <p:notesSz cx="6858000" cy="9144000"/>
@@ -5375,836 +5374,6 @@
           <a:p>
             <a:r>
               <a:rPr lang="en-US" sz="2000" b="1" dirty="0"/>
-              <a:t>Dialogs library</a:t>
-            </a:r>
-          </a:p>
-        </p:txBody>
-      </p:sp>
-      <p:sp>
-        <p:nvSpPr>
-          <p:cNvPr id="16" name="Callout: Right Arrow 15">
-            <a:extLst>
-              <a:ext uri="{FF2B5EF4-FFF2-40B4-BE49-F238E27FC236}">
-                <a16:creationId xmlns:a16="http://schemas.microsoft.com/office/drawing/2014/main" id="{7EDACBF4-FF6B-4F44-B090-27D3185B84F1}"/>
-              </a:ext>
-            </a:extLst>
-          </p:cNvPr>
-          <p:cNvSpPr/>
-          <p:nvPr/>
-        </p:nvSpPr>
-        <p:spPr>
-          <a:xfrm>
-            <a:off x="1828800" y="2209800"/>
-            <a:ext cx="2743200" cy="914400"/>
-          </a:xfrm>
-          <a:prstGeom prst="rightArrowCallout">
-            <a:avLst>
-              <a:gd name="adj1" fmla="val 25000"/>
-              <a:gd name="adj2" fmla="val 25000"/>
-              <a:gd name="adj3" fmla="val 36250"/>
-              <a:gd name="adj4" fmla="val 64977"/>
-            </a:avLst>
-          </a:prstGeom>
-        </p:spPr>
-        <p:style>
-          <a:lnRef idx="2">
-            <a:schemeClr val="accent2">
-              <a:shade val="50000"/>
-            </a:schemeClr>
-          </a:lnRef>
-          <a:fillRef idx="1">
-            <a:schemeClr val="accent2"/>
-          </a:fillRef>
-          <a:effectRef idx="0">
-            <a:schemeClr val="accent2"/>
-          </a:effectRef>
-          <a:fontRef idx="minor">
-            <a:schemeClr val="lt1"/>
-          </a:fontRef>
-        </p:style>
-        <p:txBody>
-          <a:bodyPr rtlCol="0" anchor="ctr"/>
-          <a:lstStyle/>
-          <a:p>
-            <a:pPr marL="285750" indent="-285750" defTabSz="274320">
-              <a:buFont typeface="Arial" panose="020B0604020202020204" pitchFamily="34" charset="0"/>
-              <a:buChar char="•"/>
-            </a:pPr>
-            <a:r>
-              <a:rPr lang="en-US" sz="1200" dirty="0"/>
-              <a:t>Dialogs</a:t>
-            </a:r>
-          </a:p>
-          <a:p>
-            <a:pPr marL="285750" indent="-285750" defTabSz="274320">
-              <a:buFont typeface="Arial" panose="020B0604020202020204" pitchFamily="34" charset="0"/>
-              <a:buChar char="•"/>
-            </a:pPr>
-            <a:r>
-              <a:rPr lang="en-US" sz="1200" dirty="0" err="1"/>
-              <a:t>QnA</a:t>
-            </a:r>
-            <a:r>
-              <a:rPr lang="en-US" sz="1200" dirty="0"/>
-              <a:t> Maker dialog</a:t>
-            </a:r>
-          </a:p>
-          <a:p>
-            <a:pPr marL="285750" indent="-285750" defTabSz="274320">
-              <a:buFont typeface="Arial" panose="020B0604020202020204" pitchFamily="34" charset="0"/>
-              <a:buChar char="•"/>
-            </a:pPr>
-            <a:r>
-              <a:rPr lang="en-US" sz="1200" dirty="0"/>
-              <a:t>(Skills dialog)</a:t>
-            </a:r>
-          </a:p>
-        </p:txBody>
-      </p:sp>
-      <p:sp>
-        <p:nvSpPr>
-          <p:cNvPr id="2" name="Callout: Right Arrow 1">
-            <a:extLst>
-              <a:ext uri="{FF2B5EF4-FFF2-40B4-BE49-F238E27FC236}">
-                <a16:creationId xmlns:a16="http://schemas.microsoft.com/office/drawing/2014/main" id="{FB2CC90F-343C-4DD3-82D2-B556DF0CE6B9}"/>
-              </a:ext>
-            </a:extLst>
-          </p:cNvPr>
-          <p:cNvSpPr/>
-          <p:nvPr/>
-        </p:nvSpPr>
-        <p:spPr>
-          <a:xfrm>
-            <a:off x="1828800" y="3581400"/>
-            <a:ext cx="2743200" cy="609600"/>
-          </a:xfrm>
-          <a:prstGeom prst="rightArrowCallout">
-            <a:avLst>
-              <a:gd name="adj1" fmla="val 25000"/>
-              <a:gd name="adj2" fmla="val 25000"/>
-              <a:gd name="adj3" fmla="val 36250"/>
-              <a:gd name="adj4" fmla="val 64977"/>
-            </a:avLst>
-          </a:prstGeom>
-        </p:spPr>
-        <p:style>
-          <a:lnRef idx="2">
-            <a:schemeClr val="accent2">
-              <a:shade val="50000"/>
-            </a:schemeClr>
-          </a:lnRef>
-          <a:fillRef idx="1">
-            <a:schemeClr val="accent2"/>
-          </a:fillRef>
-          <a:effectRef idx="0">
-            <a:schemeClr val="accent2"/>
-          </a:effectRef>
-          <a:fontRef idx="minor">
-            <a:schemeClr val="lt1"/>
-          </a:fontRef>
-        </p:style>
-        <p:txBody>
-          <a:bodyPr rtlCol="0" anchor="ctr"/>
-          <a:lstStyle/>
-          <a:p>
-            <a:pPr marL="285750" indent="-285750" defTabSz="274320">
-              <a:buFont typeface="Arial" panose="020B0604020202020204" pitchFamily="34" charset="0"/>
-              <a:buChar char="•"/>
-            </a:pPr>
-            <a:r>
-              <a:rPr lang="en-US" sz="1200" dirty="0"/>
-              <a:t>Dialog state</a:t>
-            </a:r>
-          </a:p>
-        </p:txBody>
-      </p:sp>
-      <p:sp>
-        <p:nvSpPr>
-          <p:cNvPr id="3" name="Callout: Right Arrow 2">
-            <a:extLst>
-              <a:ext uri="{FF2B5EF4-FFF2-40B4-BE49-F238E27FC236}">
-                <a16:creationId xmlns:a16="http://schemas.microsoft.com/office/drawing/2014/main" id="{1B96634C-4C87-4A7D-BB6E-B6B2485A673B}"/>
-              </a:ext>
-            </a:extLst>
-          </p:cNvPr>
-          <p:cNvSpPr/>
-          <p:nvPr/>
-        </p:nvSpPr>
-        <p:spPr>
-          <a:xfrm>
-            <a:off x="1828800" y="4343400"/>
-            <a:ext cx="2743200" cy="609600"/>
-          </a:xfrm>
-          <a:prstGeom prst="rightArrowCallout">
-            <a:avLst>
-              <a:gd name="adj1" fmla="val 25000"/>
-              <a:gd name="adj2" fmla="val 25000"/>
-              <a:gd name="adj3" fmla="val 36250"/>
-              <a:gd name="adj4" fmla="val 64977"/>
-            </a:avLst>
-          </a:prstGeom>
-        </p:spPr>
-        <p:style>
-          <a:lnRef idx="2">
-            <a:schemeClr val="accent2">
-              <a:shade val="50000"/>
-            </a:schemeClr>
-          </a:lnRef>
-          <a:fillRef idx="1">
-            <a:schemeClr val="accent2"/>
-          </a:fillRef>
-          <a:effectRef idx="0">
-            <a:schemeClr val="accent2"/>
-          </a:effectRef>
-          <a:fontRef idx="minor">
-            <a:schemeClr val="lt1"/>
-          </a:fontRef>
-        </p:style>
-        <p:txBody>
-          <a:bodyPr rtlCol="0" anchor="ctr"/>
-          <a:lstStyle/>
-          <a:p>
-            <a:pPr marL="285750" indent="-285750" defTabSz="274320">
-              <a:buFont typeface="Arial" panose="020B0604020202020204" pitchFamily="34" charset="0"/>
-              <a:buChar char="•"/>
-            </a:pPr>
-            <a:r>
-              <a:rPr lang="en-US" sz="1200" dirty="0"/>
-              <a:t>Skills dialog</a:t>
-            </a:r>
-          </a:p>
-        </p:txBody>
-      </p:sp>
-    </p:spTree>
-    <p:extLst>
-      <p:ext uri="{BB962C8B-B14F-4D97-AF65-F5344CB8AC3E}">
-        <p14:creationId xmlns:p14="http://schemas.microsoft.com/office/powerpoint/2010/main" val="1386863386"/>
-      </p:ext>
-    </p:extLst>
-  </p:cSld>
-  <p:clrMapOvr>
-    <a:masterClrMapping/>
-  </p:clrMapOvr>
-</p:sld>
-</file>
-
-<file path=ppt/slides/slide11.xml><?xml version="1.0" encoding="utf-8"?>
-<p:sld xmlns:a="http://schemas.openxmlformats.org/drawingml/2006/main" xmlns:r="http://schemas.openxmlformats.org/officeDocument/2006/relationships" xmlns:p="http://schemas.openxmlformats.org/presentationml/2006/main">
-  <p:cSld>
-    <p:spTree>
-      <p:nvGrpSpPr>
-        <p:cNvPr id="1" name=""/>
-        <p:cNvGrpSpPr/>
-        <p:nvPr/>
-      </p:nvGrpSpPr>
-      <p:grpSpPr>
-        <a:xfrm>
-          <a:off x="0" y="0"/>
-          <a:ext cx="0" cy="0"/>
-          <a:chOff x="0" y="0"/>
-          <a:chExt cx="0" cy="0"/>
-        </a:xfrm>
-      </p:grpSpPr>
-      <p:grpSp>
-        <p:nvGrpSpPr>
-          <p:cNvPr id="129" name="Group 128">
-            <a:extLst>
-              <a:ext uri="{FF2B5EF4-FFF2-40B4-BE49-F238E27FC236}">
-                <a16:creationId xmlns:a16="http://schemas.microsoft.com/office/drawing/2014/main" id="{356B809B-BA35-4556-BB35-55659A516358}"/>
-              </a:ext>
-            </a:extLst>
-          </p:cNvPr>
-          <p:cNvGrpSpPr/>
-          <p:nvPr/>
-        </p:nvGrpSpPr>
-        <p:grpSpPr>
-          <a:xfrm>
-            <a:off x="4419600" y="1676400"/>
-            <a:ext cx="3200400" cy="3581400"/>
-            <a:chOff x="4572000" y="1295400"/>
-            <a:chExt cx="3200400" cy="3581400"/>
-          </a:xfrm>
-        </p:grpSpPr>
-        <p:sp>
-          <p:nvSpPr>
-            <p:cNvPr id="130" name="Rectangle: Rounded Corners 129">
-              <a:extLst>
-                <a:ext uri="{FF2B5EF4-FFF2-40B4-BE49-F238E27FC236}">
-                  <a16:creationId xmlns:a16="http://schemas.microsoft.com/office/drawing/2014/main" id="{89235C4A-F9D8-49AA-A913-F22EAD967C99}"/>
-                </a:ext>
-              </a:extLst>
-            </p:cNvPr>
-            <p:cNvSpPr/>
-            <p:nvPr/>
-          </p:nvSpPr>
-          <p:spPr>
-            <a:xfrm>
-              <a:off x="4572000" y="1295400"/>
-              <a:ext cx="3200400" cy="3581400"/>
-            </a:xfrm>
-            <a:prstGeom prst="roundRect">
-              <a:avLst>
-                <a:gd name="adj" fmla="val 8929"/>
-              </a:avLst>
-            </a:prstGeom>
-          </p:spPr>
-          <p:style>
-            <a:lnRef idx="1">
-              <a:schemeClr val="accent3"/>
-            </a:lnRef>
-            <a:fillRef idx="2">
-              <a:schemeClr val="accent3"/>
-            </a:fillRef>
-            <a:effectRef idx="1">
-              <a:schemeClr val="accent3"/>
-            </a:effectRef>
-            <a:fontRef idx="minor">
-              <a:schemeClr val="dk1"/>
-            </a:fontRef>
-          </p:style>
-          <p:txBody>
-            <a:bodyPr tIns="0" rtlCol="0" anchor="t" anchorCtr="0"/>
-            <a:lstStyle/>
-            <a:p>
-              <a:pPr algn="ctr"/>
-              <a:r>
-                <a:rPr lang="en-US" sz="1600" dirty="0"/>
-                <a:t>Conversational app/bot</a:t>
-              </a:r>
-            </a:p>
-          </p:txBody>
-        </p:sp>
-        <p:sp>
-          <p:nvSpPr>
-            <p:cNvPr id="131" name="Rectangle: Rounded Corners 130">
-              <a:extLst>
-                <a:ext uri="{FF2B5EF4-FFF2-40B4-BE49-F238E27FC236}">
-                  <a16:creationId xmlns:a16="http://schemas.microsoft.com/office/drawing/2014/main" id="{42584972-E47C-4EF7-B731-52C7EA72326C}"/>
-                </a:ext>
-              </a:extLst>
-            </p:cNvPr>
-            <p:cNvSpPr/>
-            <p:nvPr/>
-          </p:nvSpPr>
-          <p:spPr>
-            <a:xfrm>
-              <a:off x="4724400" y="1752600"/>
-              <a:ext cx="2895600" cy="1295400"/>
-            </a:xfrm>
-            <a:prstGeom prst="roundRect">
-              <a:avLst/>
-            </a:prstGeom>
-          </p:spPr>
-          <p:style>
-            <a:lnRef idx="2">
-              <a:schemeClr val="accent1">
-                <a:shade val="50000"/>
-              </a:schemeClr>
-            </a:lnRef>
-            <a:fillRef idx="1">
-              <a:schemeClr val="accent1"/>
-            </a:fillRef>
-            <a:effectRef idx="0">
-              <a:schemeClr val="accent1"/>
-            </a:effectRef>
-            <a:fontRef idx="minor">
-              <a:schemeClr val="lt1"/>
-            </a:fontRef>
-          </p:style>
-          <p:txBody>
-            <a:bodyPr rtlCol="0" anchor="t"/>
-            <a:lstStyle/>
-            <a:p>
-              <a:pPr algn="ctr"/>
-              <a:r>
-                <a:rPr lang="en-US" sz="1600" dirty="0"/>
-                <a:t>Reasoning</a:t>
-              </a:r>
-            </a:p>
-          </p:txBody>
-        </p:sp>
-        <p:sp>
-          <p:nvSpPr>
-            <p:cNvPr id="132" name="Rectangle: Rounded Corners 131">
-              <a:extLst>
-                <a:ext uri="{FF2B5EF4-FFF2-40B4-BE49-F238E27FC236}">
-                  <a16:creationId xmlns:a16="http://schemas.microsoft.com/office/drawing/2014/main" id="{8C8EFF27-EE9D-4B8D-B864-4067D23B9A48}"/>
-                </a:ext>
-              </a:extLst>
-            </p:cNvPr>
-            <p:cNvSpPr/>
-            <p:nvPr/>
-          </p:nvSpPr>
-          <p:spPr>
-            <a:xfrm>
-              <a:off x="4876800" y="2286000"/>
-              <a:ext cx="1219200" cy="609600"/>
-            </a:xfrm>
-            <a:prstGeom prst="roundRect">
-              <a:avLst/>
-            </a:prstGeom>
-          </p:spPr>
-          <p:style>
-            <a:lnRef idx="2">
-              <a:schemeClr val="accent5">
-                <a:shade val="50000"/>
-              </a:schemeClr>
-            </a:lnRef>
-            <a:fillRef idx="1">
-              <a:schemeClr val="accent5"/>
-            </a:fillRef>
-            <a:effectRef idx="0">
-              <a:schemeClr val="accent5"/>
-            </a:effectRef>
-            <a:fontRef idx="minor">
-              <a:schemeClr val="lt1"/>
-            </a:fontRef>
-          </p:style>
-          <p:txBody>
-            <a:bodyPr rtlCol="0" anchor="t"/>
-            <a:lstStyle/>
-            <a:p>
-              <a:pPr algn="ctr"/>
-              <a:r>
-                <a:rPr lang="en-US" sz="1600" dirty="0"/>
-                <a:t>Input recognition</a:t>
-              </a:r>
-            </a:p>
-          </p:txBody>
-        </p:sp>
-        <p:sp>
-          <p:nvSpPr>
-            <p:cNvPr id="133" name="Rectangle: Rounded Corners 132">
-              <a:extLst>
-                <a:ext uri="{FF2B5EF4-FFF2-40B4-BE49-F238E27FC236}">
-                  <a16:creationId xmlns:a16="http://schemas.microsoft.com/office/drawing/2014/main" id="{05EA6A71-3ACD-4126-83FA-4E4939AD9B57}"/>
-                </a:ext>
-              </a:extLst>
-            </p:cNvPr>
-            <p:cNvSpPr/>
-            <p:nvPr/>
-          </p:nvSpPr>
-          <p:spPr>
-            <a:xfrm>
-              <a:off x="6248400" y="2286000"/>
-              <a:ext cx="1219200" cy="609600"/>
-            </a:xfrm>
-            <a:prstGeom prst="roundRect">
-              <a:avLst/>
-            </a:prstGeom>
-          </p:spPr>
-          <p:style>
-            <a:lnRef idx="2">
-              <a:schemeClr val="accent5">
-                <a:shade val="50000"/>
-              </a:schemeClr>
-            </a:lnRef>
-            <a:fillRef idx="1">
-              <a:schemeClr val="accent5"/>
-            </a:fillRef>
-            <a:effectRef idx="0">
-              <a:schemeClr val="accent5"/>
-            </a:effectRef>
-            <a:fontRef idx="minor">
-              <a:schemeClr val="lt1"/>
-            </a:fontRef>
-          </p:style>
-          <p:txBody>
-            <a:bodyPr rtlCol="0" anchor="t"/>
-            <a:lstStyle/>
-            <a:p>
-              <a:pPr algn="ctr"/>
-              <a:r>
-                <a:rPr lang="en-US" sz="1600" dirty="0"/>
-                <a:t>Response generation</a:t>
-              </a:r>
-            </a:p>
-          </p:txBody>
-        </p:sp>
-        <p:sp>
-          <p:nvSpPr>
-            <p:cNvPr id="134" name="Rectangle: Rounded Corners 133">
-              <a:extLst>
-                <a:ext uri="{FF2B5EF4-FFF2-40B4-BE49-F238E27FC236}">
-                  <a16:creationId xmlns:a16="http://schemas.microsoft.com/office/drawing/2014/main" id="{0BBB3841-FF12-4DAD-AF07-CFB6CFC7E749}"/>
-                </a:ext>
-              </a:extLst>
-            </p:cNvPr>
-            <p:cNvSpPr/>
-            <p:nvPr/>
-          </p:nvSpPr>
-          <p:spPr>
-            <a:xfrm>
-              <a:off x="4724400" y="3276600"/>
-              <a:ext cx="2895600" cy="609600"/>
-            </a:xfrm>
-            <a:prstGeom prst="roundRect">
-              <a:avLst/>
-            </a:prstGeom>
-          </p:spPr>
-          <p:style>
-            <a:lnRef idx="2">
-              <a:schemeClr val="accent1">
-                <a:shade val="50000"/>
-              </a:schemeClr>
-            </a:lnRef>
-            <a:fillRef idx="1">
-              <a:schemeClr val="accent1"/>
-            </a:fillRef>
-            <a:effectRef idx="0">
-              <a:schemeClr val="accent1"/>
-            </a:effectRef>
-            <a:fontRef idx="minor">
-              <a:schemeClr val="lt1"/>
-            </a:fontRef>
-          </p:style>
-          <p:txBody>
-            <a:bodyPr rtlCol="0" anchor="t"/>
-            <a:lstStyle/>
-            <a:p>
-              <a:pPr algn="ctr"/>
-              <a:r>
-                <a:rPr lang="en-US" sz="1600" dirty="0"/>
-                <a:t>Pipeline processing</a:t>
-              </a:r>
-            </a:p>
-          </p:txBody>
-        </p:sp>
-        <p:sp>
-          <p:nvSpPr>
-            <p:cNvPr id="135" name="Rectangle: Rounded Corners 134">
-              <a:extLst>
-                <a:ext uri="{FF2B5EF4-FFF2-40B4-BE49-F238E27FC236}">
-                  <a16:creationId xmlns:a16="http://schemas.microsoft.com/office/drawing/2014/main" id="{F926E1B4-F398-43FD-AD3A-F11DB165A314}"/>
-                </a:ext>
-              </a:extLst>
-            </p:cNvPr>
-            <p:cNvSpPr/>
-            <p:nvPr/>
-          </p:nvSpPr>
-          <p:spPr>
-            <a:xfrm>
-              <a:off x="4724400" y="4038600"/>
-              <a:ext cx="2895600" cy="609600"/>
-            </a:xfrm>
-            <a:prstGeom prst="roundRect">
-              <a:avLst/>
-            </a:prstGeom>
-          </p:spPr>
-          <p:style>
-            <a:lnRef idx="2">
-              <a:schemeClr val="accent1">
-                <a:shade val="50000"/>
-              </a:schemeClr>
-            </a:lnRef>
-            <a:fillRef idx="1">
-              <a:schemeClr val="accent1"/>
-            </a:fillRef>
-            <a:effectRef idx="0">
-              <a:schemeClr val="accent1"/>
-            </a:effectRef>
-            <a:fontRef idx="minor">
-              <a:schemeClr val="lt1"/>
-            </a:fontRef>
-          </p:style>
-          <p:txBody>
-            <a:bodyPr rtlCol="0" anchor="t"/>
-            <a:lstStyle/>
-            <a:p>
-              <a:pPr algn="ctr"/>
-              <a:r>
-                <a:rPr lang="en-US" sz="1600" dirty="0"/>
-                <a:t>Connectivity &amp; protocol</a:t>
-              </a:r>
-            </a:p>
-          </p:txBody>
-        </p:sp>
-        <p:cxnSp>
-          <p:nvCxnSpPr>
-            <p:cNvPr id="137" name="Straight Arrow Connector 136">
-              <a:extLst>
-                <a:ext uri="{FF2B5EF4-FFF2-40B4-BE49-F238E27FC236}">
-                  <a16:creationId xmlns:a16="http://schemas.microsoft.com/office/drawing/2014/main" id="{3EE5B8FC-E07C-4B97-BA6A-5F1D6EF8F035}"/>
-                </a:ext>
-              </a:extLst>
-            </p:cNvPr>
-            <p:cNvCxnSpPr>
-              <a:cxnSpLocks/>
-            </p:cNvCxnSpPr>
-            <p:nvPr/>
-          </p:nvCxnSpPr>
-          <p:spPr>
-            <a:xfrm>
-              <a:off x="6858000" y="3048000"/>
-              <a:ext cx="0" cy="228600"/>
-            </a:xfrm>
-            <a:prstGeom prst="straightConnector1">
-              <a:avLst/>
-            </a:prstGeom>
-            <a:ln>
-              <a:tailEnd type="triangle"/>
-            </a:ln>
-          </p:spPr>
-          <p:style>
-            <a:lnRef idx="1">
-              <a:schemeClr val="accent1"/>
-            </a:lnRef>
-            <a:fillRef idx="0">
-              <a:schemeClr val="accent1"/>
-            </a:fillRef>
-            <a:effectRef idx="0">
-              <a:schemeClr val="accent1"/>
-            </a:effectRef>
-            <a:fontRef idx="minor">
-              <a:schemeClr val="tx1"/>
-            </a:fontRef>
-          </p:style>
-        </p:cxnSp>
-        <p:cxnSp>
-          <p:nvCxnSpPr>
-            <p:cNvPr id="139" name="Straight Arrow Connector 138">
-              <a:extLst>
-                <a:ext uri="{FF2B5EF4-FFF2-40B4-BE49-F238E27FC236}">
-                  <a16:creationId xmlns:a16="http://schemas.microsoft.com/office/drawing/2014/main" id="{A4BE5A02-B2F7-4D9F-91B0-2D5E1E753EAF}"/>
-                </a:ext>
-              </a:extLst>
-            </p:cNvPr>
-            <p:cNvCxnSpPr>
-              <a:cxnSpLocks/>
-            </p:cNvCxnSpPr>
-            <p:nvPr/>
-          </p:nvCxnSpPr>
-          <p:spPr>
-            <a:xfrm>
-              <a:off x="6858000" y="3886200"/>
-              <a:ext cx="0" cy="152400"/>
-            </a:xfrm>
-            <a:prstGeom prst="straightConnector1">
-              <a:avLst/>
-            </a:prstGeom>
-            <a:ln>
-              <a:tailEnd type="triangle"/>
-            </a:ln>
-          </p:spPr>
-          <p:style>
-            <a:lnRef idx="1">
-              <a:schemeClr val="accent1"/>
-            </a:lnRef>
-            <a:fillRef idx="0">
-              <a:schemeClr val="accent1"/>
-            </a:fillRef>
-            <a:effectRef idx="0">
-              <a:schemeClr val="accent1"/>
-            </a:effectRef>
-            <a:fontRef idx="minor">
-              <a:schemeClr val="tx1"/>
-            </a:fontRef>
-          </p:style>
-        </p:cxnSp>
-        <p:cxnSp>
-          <p:nvCxnSpPr>
-            <p:cNvPr id="140" name="Straight Arrow Connector 139">
-              <a:extLst>
-                <a:ext uri="{FF2B5EF4-FFF2-40B4-BE49-F238E27FC236}">
-                  <a16:creationId xmlns:a16="http://schemas.microsoft.com/office/drawing/2014/main" id="{2CFCF0B8-2DC3-4B3E-AE1F-FC5A46CD9CAD}"/>
-                </a:ext>
-              </a:extLst>
-            </p:cNvPr>
-            <p:cNvCxnSpPr>
-              <a:cxnSpLocks/>
-            </p:cNvCxnSpPr>
-            <p:nvPr/>
-          </p:nvCxnSpPr>
-          <p:spPr>
-            <a:xfrm flipV="1">
-              <a:off x="5334000" y="3048000"/>
-              <a:ext cx="0" cy="228600"/>
-            </a:xfrm>
-            <a:prstGeom prst="straightConnector1">
-              <a:avLst/>
-            </a:prstGeom>
-            <a:ln>
-              <a:tailEnd type="triangle"/>
-            </a:ln>
-          </p:spPr>
-          <p:style>
-            <a:lnRef idx="1">
-              <a:schemeClr val="accent1"/>
-            </a:lnRef>
-            <a:fillRef idx="0">
-              <a:schemeClr val="accent1"/>
-            </a:fillRef>
-            <a:effectRef idx="0">
-              <a:schemeClr val="accent1"/>
-            </a:effectRef>
-            <a:fontRef idx="minor">
-              <a:schemeClr val="tx1"/>
-            </a:fontRef>
-          </p:style>
-        </p:cxnSp>
-        <p:cxnSp>
-          <p:nvCxnSpPr>
-            <p:cNvPr id="141" name="Straight Arrow Connector 140">
-              <a:extLst>
-                <a:ext uri="{FF2B5EF4-FFF2-40B4-BE49-F238E27FC236}">
-                  <a16:creationId xmlns:a16="http://schemas.microsoft.com/office/drawing/2014/main" id="{306C0A34-E4D6-4D69-B1E5-FF7409F1B7A9}"/>
-                </a:ext>
-              </a:extLst>
-            </p:cNvPr>
-            <p:cNvCxnSpPr>
-              <a:cxnSpLocks/>
-            </p:cNvCxnSpPr>
-            <p:nvPr/>
-          </p:nvCxnSpPr>
-          <p:spPr>
-            <a:xfrm flipV="1">
-              <a:off x="5334000" y="3886200"/>
-              <a:ext cx="0" cy="152400"/>
-            </a:xfrm>
-            <a:prstGeom prst="straightConnector1">
-              <a:avLst/>
-            </a:prstGeom>
-            <a:ln>
-              <a:tailEnd type="triangle"/>
-            </a:ln>
-          </p:spPr>
-          <p:style>
-            <a:lnRef idx="1">
-              <a:schemeClr val="accent1"/>
-            </a:lnRef>
-            <a:fillRef idx="0">
-              <a:schemeClr val="accent1"/>
-            </a:fillRef>
-            <a:effectRef idx="0">
-              <a:schemeClr val="accent1"/>
-            </a:effectRef>
-            <a:fontRef idx="minor">
-              <a:schemeClr val="tx1"/>
-            </a:fontRef>
-          </p:style>
-        </p:cxnSp>
-      </p:grpSp>
-      <p:sp>
-        <p:nvSpPr>
-          <p:cNvPr id="5" name="Rectangle 4">
-            <a:extLst>
-              <a:ext uri="{FF2B5EF4-FFF2-40B4-BE49-F238E27FC236}">
-                <a16:creationId xmlns:a16="http://schemas.microsoft.com/office/drawing/2014/main" id="{573EA52F-D524-4C1E-9EDD-5C835ABB67FA}"/>
-              </a:ext>
-            </a:extLst>
-          </p:cNvPr>
-          <p:cNvSpPr/>
-          <p:nvPr/>
-        </p:nvSpPr>
-        <p:spPr>
-          <a:xfrm>
-            <a:off x="1676400" y="5562600"/>
-            <a:ext cx="7315200" cy="304800"/>
-          </a:xfrm>
-          <a:prstGeom prst="rect">
-            <a:avLst/>
-          </a:prstGeom>
-        </p:spPr>
-        <p:style>
-          <a:lnRef idx="1">
-            <a:schemeClr val="accent3"/>
-          </a:lnRef>
-          <a:fillRef idx="2">
-            <a:schemeClr val="accent3"/>
-          </a:fillRef>
-          <a:effectRef idx="1">
-            <a:schemeClr val="accent3"/>
-          </a:effectRef>
-          <a:fontRef idx="minor">
-            <a:schemeClr val="dk1"/>
-          </a:fontRef>
-        </p:style>
-        <p:txBody>
-          <a:bodyPr rtlCol="0" anchor="ctr"/>
-          <a:lstStyle/>
-          <a:p>
-            <a:pPr algn="ctr"/>
-            <a:r>
-              <a:rPr lang="en-US" sz="1600" dirty="0"/>
-              <a:t>ABS or other first- or third-party systems</a:t>
-            </a:r>
-          </a:p>
-        </p:txBody>
-      </p:sp>
-      <p:sp>
-        <p:nvSpPr>
-          <p:cNvPr id="6" name="Arrow: Up-Down 5">
-            <a:extLst>
-              <a:ext uri="{FF2B5EF4-FFF2-40B4-BE49-F238E27FC236}">
-                <a16:creationId xmlns:a16="http://schemas.microsoft.com/office/drawing/2014/main" id="{13231FE1-172B-44FC-9001-33FE434547FD}"/>
-              </a:ext>
-            </a:extLst>
-          </p:cNvPr>
-          <p:cNvSpPr/>
-          <p:nvPr/>
-        </p:nvSpPr>
-        <p:spPr>
-          <a:xfrm>
-            <a:off x="5943600" y="5257800"/>
-            <a:ext cx="152400" cy="304800"/>
-          </a:xfrm>
-          <a:prstGeom prst="upDownArrow">
-            <a:avLst/>
-          </a:prstGeom>
-        </p:spPr>
-        <p:style>
-          <a:lnRef idx="1">
-            <a:schemeClr val="accent3"/>
-          </a:lnRef>
-          <a:fillRef idx="2">
-            <a:schemeClr val="accent3"/>
-          </a:fillRef>
-          <a:effectRef idx="1">
-            <a:schemeClr val="accent3"/>
-          </a:effectRef>
-          <a:fontRef idx="minor">
-            <a:schemeClr val="dk1"/>
-          </a:fontRef>
-        </p:style>
-        <p:txBody>
-          <a:bodyPr rtlCol="0" anchor="ctr"/>
-          <a:lstStyle/>
-          <a:p>
-            <a:pPr algn="ctr"/>
-            <a:endParaRPr lang="en-US"/>
-          </a:p>
-        </p:txBody>
-      </p:sp>
-      <p:sp>
-        <p:nvSpPr>
-          <p:cNvPr id="9" name="TextBox 8">
-            <a:extLst>
-              <a:ext uri="{FF2B5EF4-FFF2-40B4-BE49-F238E27FC236}">
-                <a16:creationId xmlns:a16="http://schemas.microsoft.com/office/drawing/2014/main" id="{53AEBA00-EE2A-4F06-8F20-9FA0AFE65284}"/>
-              </a:ext>
-            </a:extLst>
-          </p:cNvPr>
-          <p:cNvSpPr txBox="1"/>
-          <p:nvPr/>
-        </p:nvSpPr>
-        <p:spPr>
-          <a:xfrm>
-            <a:off x="609600" y="381000"/>
-            <a:ext cx="2590800" cy="400110"/>
-          </a:xfrm>
-          <a:prstGeom prst="rect">
-            <a:avLst/>
-          </a:prstGeom>
-          <a:noFill/>
-        </p:spPr>
-        <p:txBody>
-          <a:bodyPr wrap="square" rtlCol="0">
-            <a:spAutoFit/>
-          </a:bodyPr>
-          <a:lstStyle/>
-          <a:p>
-            <a:r>
-              <a:rPr lang="en-US" sz="2000" b="1" dirty="0"/>
               <a:t>Teams support</a:t>
             </a:r>
           </a:p>
@@ -6334,7 +5503,7 @@
 </p:sld>
 </file>
 
-<file path=ppt/slides/slide12.xml><?xml version="1.0" encoding="utf-8"?>
+<file path=ppt/slides/slide11.xml><?xml version="1.0" encoding="utf-8"?>
 <p:sld xmlns:a="http://schemas.openxmlformats.org/drawingml/2006/main" xmlns:r="http://schemas.openxmlformats.org/officeDocument/2006/relationships" xmlns:p="http://schemas.openxmlformats.org/presentationml/2006/main">
   <p:cSld>
     <p:spTree>
@@ -8247,7 +7416,7 @@
 </p:sld>
 </file>
 
-<file path=ppt/slides/slide13.xml><?xml version="1.0" encoding="utf-8"?>
+<file path=ppt/slides/slide12.xml><?xml version="1.0" encoding="utf-8"?>
 <p:sld xmlns:a="http://schemas.openxmlformats.org/drawingml/2006/main" xmlns:r="http://schemas.openxmlformats.org/officeDocument/2006/relationships" xmlns:p="http://schemas.openxmlformats.org/presentationml/2006/main">
   <p:cSld>
     <p:spTree>
@@ -9820,7 +8989,7 @@
         <p:spPr>
           <a:xfrm>
             <a:off x="4572000" y="4038600"/>
-            <a:ext cx="4419600" cy="304800"/>
+            <a:ext cx="4572000" cy="304800"/>
           </a:xfrm>
           <a:prstGeom prst="rect">
             <a:avLst/>
@@ -9954,7 +9123,7 @@
         </p:nvSpPr>
         <p:spPr>
           <a:xfrm>
-            <a:off x="7924800" y="2971800"/>
+            <a:off x="8077200" y="2971800"/>
             <a:ext cx="762000" cy="609600"/>
           </a:xfrm>
           <a:prstGeom prst="can">
@@ -10001,7 +9170,7 @@
         </p:nvSpPr>
         <p:spPr>
           <a:xfrm>
-            <a:off x="8229600" y="3581400"/>
+            <a:off x="8382000" y="3581400"/>
             <a:ext cx="152400" cy="457200"/>
           </a:xfrm>
           <a:prstGeom prst="upDownArrow">
@@ -15667,1984 +14836,6 @@
           <a:chExt cx="0" cy="0"/>
         </a:xfrm>
       </p:grpSpPr>
-      <p:sp>
-        <p:nvSpPr>
-          <p:cNvPr id="44" name="Rectangle 43">
-            <a:extLst>
-              <a:ext uri="{FF2B5EF4-FFF2-40B4-BE49-F238E27FC236}">
-                <a16:creationId xmlns:a16="http://schemas.microsoft.com/office/drawing/2014/main" id="{6C0812FB-6F07-43AA-8184-FBADC0573931}"/>
-              </a:ext>
-            </a:extLst>
-          </p:cNvPr>
-          <p:cNvSpPr/>
-          <p:nvPr/>
-        </p:nvSpPr>
-        <p:spPr>
-          <a:xfrm>
-            <a:off x="1066800" y="4343400"/>
-            <a:ext cx="10820400" cy="457200"/>
-          </a:xfrm>
-          <a:prstGeom prst="rect">
-            <a:avLst/>
-          </a:prstGeom>
-        </p:spPr>
-        <p:style>
-          <a:lnRef idx="1">
-            <a:schemeClr val="accent3"/>
-          </a:lnRef>
-          <a:fillRef idx="2">
-            <a:schemeClr val="accent3"/>
-          </a:fillRef>
-          <a:effectRef idx="1">
-            <a:schemeClr val="accent3"/>
-          </a:effectRef>
-          <a:fontRef idx="minor">
-            <a:schemeClr val="dk1"/>
-          </a:fontRef>
-        </p:style>
-        <p:txBody>
-          <a:bodyPr rtlCol="0" anchor="ctr"/>
-          <a:lstStyle/>
-          <a:p>
-            <a:pPr algn="ctr"/>
-            <a:r>
-              <a:rPr lang="en-US" sz="1600" dirty="0"/>
-              <a:t>ABS or other first- or third-party systems</a:t>
-            </a:r>
-          </a:p>
-        </p:txBody>
-      </p:sp>
-      <p:sp>
-        <p:nvSpPr>
-          <p:cNvPr id="39" name="TextBox 38">
-            <a:extLst>
-              <a:ext uri="{FF2B5EF4-FFF2-40B4-BE49-F238E27FC236}">
-                <a16:creationId xmlns:a16="http://schemas.microsoft.com/office/drawing/2014/main" id="{F63AD7AA-8408-4417-A036-4A743D0BC6A7}"/>
-              </a:ext>
-            </a:extLst>
-          </p:cNvPr>
-          <p:cNvSpPr txBox="1"/>
-          <p:nvPr/>
-        </p:nvSpPr>
-        <p:spPr>
-          <a:xfrm>
-            <a:off x="609600" y="381000"/>
-            <a:ext cx="914400" cy="400110"/>
-          </a:xfrm>
-          <a:prstGeom prst="rect">
-            <a:avLst/>
-          </a:prstGeom>
-          <a:noFill/>
-        </p:spPr>
-        <p:txBody>
-          <a:bodyPr wrap="square" rtlCol="0">
-            <a:spAutoFit/>
-          </a:bodyPr>
-          <a:lstStyle/>
-          <a:p>
-            <a:r>
-              <a:rPr lang="en-US" sz="2000" b="1" dirty="0"/>
-              <a:t>Skills</a:t>
-            </a:r>
-          </a:p>
-        </p:txBody>
-      </p:sp>
-      <p:sp>
-        <p:nvSpPr>
-          <p:cNvPr id="9" name="Arrow: Up-Down 8">
-            <a:extLst>
-              <a:ext uri="{FF2B5EF4-FFF2-40B4-BE49-F238E27FC236}">
-                <a16:creationId xmlns:a16="http://schemas.microsoft.com/office/drawing/2014/main" id="{34CA37DF-CA97-492F-B3A6-A98DFFA4B931}"/>
-              </a:ext>
-            </a:extLst>
-          </p:cNvPr>
-          <p:cNvSpPr/>
-          <p:nvPr/>
-        </p:nvSpPr>
-        <p:spPr>
-          <a:xfrm>
-            <a:off x="4448872" y="4800600"/>
-            <a:ext cx="152400" cy="457200"/>
-          </a:xfrm>
-          <a:prstGeom prst="upDownArrow">
-            <a:avLst/>
-          </a:prstGeom>
-        </p:spPr>
-        <p:style>
-          <a:lnRef idx="1">
-            <a:schemeClr val="accent3"/>
-          </a:lnRef>
-          <a:fillRef idx="2">
-            <a:schemeClr val="accent3"/>
-          </a:fillRef>
-          <a:effectRef idx="1">
-            <a:schemeClr val="accent3"/>
-          </a:effectRef>
-          <a:fontRef idx="minor">
-            <a:schemeClr val="dk1"/>
-          </a:fontRef>
-        </p:style>
-        <p:txBody>
-          <a:bodyPr rtlCol="0" anchor="ctr"/>
-          <a:lstStyle/>
-          <a:p>
-            <a:pPr algn="ctr"/>
-            <a:endParaRPr lang="en-US"/>
-          </a:p>
-        </p:txBody>
-      </p:sp>
-      <p:grpSp>
-        <p:nvGrpSpPr>
-          <p:cNvPr id="59" name="Group 58">
-            <a:extLst>
-              <a:ext uri="{FF2B5EF4-FFF2-40B4-BE49-F238E27FC236}">
-                <a16:creationId xmlns:a16="http://schemas.microsoft.com/office/drawing/2014/main" id="{D49608D5-7AEC-4DE5-B3D1-A293B7B6BE80}"/>
-              </a:ext>
-            </a:extLst>
-          </p:cNvPr>
-          <p:cNvGrpSpPr/>
-          <p:nvPr/>
-        </p:nvGrpSpPr>
-        <p:grpSpPr>
-          <a:xfrm>
-            <a:off x="3686872" y="5257800"/>
-            <a:ext cx="1828800" cy="1524000"/>
-            <a:chOff x="6705600" y="3276600"/>
-            <a:chExt cx="2194560" cy="1828800"/>
-          </a:xfrm>
-        </p:grpSpPr>
-        <p:sp>
-          <p:nvSpPr>
-            <p:cNvPr id="60" name="Rectangle: Rounded Corners 59">
-              <a:extLst>
-                <a:ext uri="{FF2B5EF4-FFF2-40B4-BE49-F238E27FC236}">
-                  <a16:creationId xmlns:a16="http://schemas.microsoft.com/office/drawing/2014/main" id="{A28D5F23-4DBE-43C3-9C96-D842E0E70737}"/>
-                </a:ext>
-              </a:extLst>
-            </p:cNvPr>
-            <p:cNvSpPr/>
-            <p:nvPr/>
-          </p:nvSpPr>
-          <p:spPr>
-            <a:xfrm>
-              <a:off x="6705600" y="3276600"/>
-              <a:ext cx="1981200" cy="1828800"/>
-            </a:xfrm>
-            <a:prstGeom prst="roundRect">
-              <a:avLst/>
-            </a:prstGeom>
-          </p:spPr>
-          <p:style>
-            <a:lnRef idx="1">
-              <a:schemeClr val="accent3"/>
-            </a:lnRef>
-            <a:fillRef idx="2">
-              <a:schemeClr val="accent3"/>
-            </a:fillRef>
-            <a:effectRef idx="1">
-              <a:schemeClr val="accent3"/>
-            </a:effectRef>
-            <a:fontRef idx="minor">
-              <a:schemeClr val="dk1"/>
-            </a:fontRef>
-          </p:style>
-          <p:txBody>
-            <a:bodyPr rtlCol="0" anchor="t"/>
-            <a:lstStyle/>
-            <a:p>
-              <a:r>
-                <a:rPr lang="en-US" sz="1600" dirty="0"/>
-                <a:t>Device/Channel</a:t>
-              </a:r>
-            </a:p>
-          </p:txBody>
-        </p:sp>
-        <p:sp>
-          <p:nvSpPr>
-            <p:cNvPr id="61" name="Rectangle: Rounded Corners 60">
-              <a:extLst>
-                <a:ext uri="{FF2B5EF4-FFF2-40B4-BE49-F238E27FC236}">
-                  <a16:creationId xmlns:a16="http://schemas.microsoft.com/office/drawing/2014/main" id="{C9189069-8615-4F13-BE22-606A572E5090}"/>
-                </a:ext>
-              </a:extLst>
-            </p:cNvPr>
-            <p:cNvSpPr/>
-            <p:nvPr/>
-          </p:nvSpPr>
-          <p:spPr>
-            <a:xfrm>
-              <a:off x="7985759" y="3733800"/>
-              <a:ext cx="914401" cy="1066800"/>
-            </a:xfrm>
-            <a:prstGeom prst="roundRect">
-              <a:avLst/>
-            </a:prstGeom>
-          </p:spPr>
-          <p:style>
-            <a:lnRef idx="2">
-              <a:schemeClr val="dk1"/>
-            </a:lnRef>
-            <a:fillRef idx="1">
-              <a:schemeClr val="lt1"/>
-            </a:fillRef>
-            <a:effectRef idx="0">
-              <a:schemeClr val="dk1"/>
-            </a:effectRef>
-            <a:fontRef idx="minor">
-              <a:schemeClr val="dk1"/>
-            </a:fontRef>
-          </p:style>
-          <p:txBody>
-            <a:bodyPr rtlCol="0" anchor="t"/>
-            <a:lstStyle/>
-            <a:p>
-              <a:r>
-                <a:rPr lang="en-US" sz="1600" dirty="0"/>
-                <a:t>User</a:t>
-              </a:r>
-            </a:p>
-          </p:txBody>
-        </p:sp>
-        <p:grpSp>
-          <p:nvGrpSpPr>
-            <p:cNvPr id="62" name="Group 61">
-              <a:extLst>
-                <a:ext uri="{FF2B5EF4-FFF2-40B4-BE49-F238E27FC236}">
-                  <a16:creationId xmlns:a16="http://schemas.microsoft.com/office/drawing/2014/main" id="{D83DC9F8-17D3-4313-AE1F-F328A4621118}"/>
-                </a:ext>
-              </a:extLst>
-            </p:cNvPr>
-            <p:cNvGrpSpPr/>
-            <p:nvPr/>
-          </p:nvGrpSpPr>
-          <p:grpSpPr>
-            <a:xfrm>
-              <a:off x="6858000" y="3752854"/>
-              <a:ext cx="914408" cy="1047746"/>
-              <a:chOff x="6913417" y="4512432"/>
-              <a:chExt cx="831282" cy="914400"/>
-            </a:xfrm>
-          </p:grpSpPr>
-          <p:sp>
-            <p:nvSpPr>
-              <p:cNvPr id="63" name="Rectangle: Rounded Corners 62">
-                <a:extLst>
-                  <a:ext uri="{FF2B5EF4-FFF2-40B4-BE49-F238E27FC236}">
-                    <a16:creationId xmlns:a16="http://schemas.microsoft.com/office/drawing/2014/main" id="{05B601D2-FDCA-4EE7-869C-9A81F10E13DA}"/>
-                  </a:ext>
-                </a:extLst>
-              </p:cNvPr>
-              <p:cNvSpPr/>
-              <p:nvPr/>
-            </p:nvSpPr>
-            <p:spPr>
-              <a:xfrm>
-                <a:off x="6913428" y="4512432"/>
-                <a:ext cx="831264" cy="304800"/>
-              </a:xfrm>
-              <a:prstGeom prst="roundRect">
-                <a:avLst/>
-              </a:prstGeom>
-            </p:spPr>
-            <p:style>
-              <a:lnRef idx="2">
-                <a:schemeClr val="accent3">
-                  <a:shade val="50000"/>
-                </a:schemeClr>
-              </a:lnRef>
-              <a:fillRef idx="1">
-                <a:schemeClr val="accent3"/>
-              </a:fillRef>
-              <a:effectRef idx="0">
-                <a:schemeClr val="accent3"/>
-              </a:effectRef>
-              <a:fontRef idx="minor">
-                <a:schemeClr val="lt1"/>
-              </a:fontRef>
-            </p:style>
-            <p:txBody>
-              <a:bodyPr rtlCol="0" anchor="ctr"/>
-              <a:lstStyle/>
-              <a:p>
-                <a:pPr algn="ctr"/>
-                <a:r>
-                  <a:rPr lang="en-US" sz="1600" dirty="0"/>
-                  <a:t>Text</a:t>
-                </a:r>
-              </a:p>
-            </p:txBody>
-          </p:sp>
-          <p:sp>
-            <p:nvSpPr>
-              <p:cNvPr id="64" name="Rectangle: Rounded Corners 63">
-                <a:extLst>
-                  <a:ext uri="{FF2B5EF4-FFF2-40B4-BE49-F238E27FC236}">
-                    <a16:creationId xmlns:a16="http://schemas.microsoft.com/office/drawing/2014/main" id="{398E636A-0E3D-4AE5-B12E-152FBD65A6D3}"/>
-                  </a:ext>
-                </a:extLst>
-              </p:cNvPr>
-              <p:cNvSpPr/>
-              <p:nvPr/>
-            </p:nvSpPr>
-            <p:spPr>
-              <a:xfrm>
-                <a:off x="6913417" y="4817233"/>
-                <a:ext cx="831274" cy="304800"/>
-              </a:xfrm>
-              <a:prstGeom prst="roundRect">
-                <a:avLst/>
-              </a:prstGeom>
-            </p:spPr>
-            <p:style>
-              <a:lnRef idx="2">
-                <a:schemeClr val="accent3">
-                  <a:shade val="50000"/>
-                </a:schemeClr>
-              </a:lnRef>
-              <a:fillRef idx="1">
-                <a:schemeClr val="accent3"/>
-              </a:fillRef>
-              <a:effectRef idx="0">
-                <a:schemeClr val="accent3"/>
-              </a:effectRef>
-              <a:fontRef idx="minor">
-                <a:schemeClr val="lt1"/>
-              </a:fontRef>
-            </p:style>
-            <p:txBody>
-              <a:bodyPr rtlCol="0" anchor="ctr"/>
-              <a:lstStyle/>
-              <a:p>
-                <a:pPr algn="ctr"/>
-                <a:r>
-                  <a:rPr lang="en-US" sz="1600" dirty="0"/>
-                  <a:t>Audio</a:t>
-                </a:r>
-              </a:p>
-            </p:txBody>
-          </p:sp>
-          <p:sp>
-            <p:nvSpPr>
-              <p:cNvPr id="65" name="Rectangle: Rounded Corners 64">
-                <a:extLst>
-                  <a:ext uri="{FF2B5EF4-FFF2-40B4-BE49-F238E27FC236}">
-                    <a16:creationId xmlns:a16="http://schemas.microsoft.com/office/drawing/2014/main" id="{88C0281C-42B7-4854-9515-33C4B8A77F3E}"/>
-                  </a:ext>
-                </a:extLst>
-              </p:cNvPr>
-              <p:cNvSpPr/>
-              <p:nvPr/>
-            </p:nvSpPr>
-            <p:spPr>
-              <a:xfrm>
-                <a:off x="6913426" y="5122032"/>
-                <a:ext cx="831273" cy="304800"/>
-              </a:xfrm>
-              <a:prstGeom prst="roundRect">
-                <a:avLst/>
-              </a:prstGeom>
-            </p:spPr>
-            <p:style>
-              <a:lnRef idx="2">
-                <a:schemeClr val="accent3">
-                  <a:shade val="50000"/>
-                </a:schemeClr>
-              </a:lnRef>
-              <a:fillRef idx="1">
-                <a:schemeClr val="accent3"/>
-              </a:fillRef>
-              <a:effectRef idx="0">
-                <a:schemeClr val="accent3"/>
-              </a:effectRef>
-              <a:fontRef idx="minor">
-                <a:schemeClr val="lt1"/>
-              </a:fontRef>
-            </p:style>
-            <p:txBody>
-              <a:bodyPr rtlCol="0" anchor="ctr"/>
-              <a:lstStyle/>
-              <a:p>
-                <a:pPr algn="ctr"/>
-                <a:r>
-                  <a:rPr lang="en-US" sz="1600" dirty="0"/>
-                  <a:t>Video</a:t>
-                </a:r>
-              </a:p>
-            </p:txBody>
-          </p:sp>
-        </p:grpSp>
-      </p:grpSp>
-      <p:sp>
-        <p:nvSpPr>
-          <p:cNvPr id="27" name="TextBox 26">
-            <a:extLst>
-              <a:ext uri="{FF2B5EF4-FFF2-40B4-BE49-F238E27FC236}">
-                <a16:creationId xmlns:a16="http://schemas.microsoft.com/office/drawing/2014/main" id="{035FDCB0-AAD5-4325-B614-A1C3E65722CF}"/>
-              </a:ext>
-            </a:extLst>
-          </p:cNvPr>
-          <p:cNvSpPr txBox="1"/>
-          <p:nvPr/>
-        </p:nvSpPr>
-        <p:spPr>
-          <a:xfrm>
-            <a:off x="4601272" y="4950023"/>
-            <a:ext cx="1037528" cy="307777"/>
-          </a:xfrm>
-          <a:prstGeom prst="rect">
-            <a:avLst/>
-          </a:prstGeom>
-          <a:noFill/>
-        </p:spPr>
-        <p:txBody>
-          <a:bodyPr wrap="none" rtlCol="0">
-            <a:spAutoFit/>
-          </a:bodyPr>
-          <a:lstStyle/>
-          <a:p>
-            <a:r>
-              <a:rPr lang="en-US" sz="1400" dirty="0"/>
-              <a:t>Service URL</a:t>
-            </a:r>
-          </a:p>
-        </p:txBody>
-      </p:sp>
-      <p:grpSp>
-        <p:nvGrpSpPr>
-          <p:cNvPr id="93" name="Group 92">
-            <a:extLst>
-              <a:ext uri="{FF2B5EF4-FFF2-40B4-BE49-F238E27FC236}">
-                <a16:creationId xmlns:a16="http://schemas.microsoft.com/office/drawing/2014/main" id="{FBDAD918-E9EB-4E42-BC35-A9116E5FDE74}"/>
-              </a:ext>
-            </a:extLst>
-          </p:cNvPr>
-          <p:cNvGrpSpPr/>
-          <p:nvPr/>
-        </p:nvGrpSpPr>
-        <p:grpSpPr>
-          <a:xfrm>
-            <a:off x="1828800" y="228600"/>
-            <a:ext cx="3352800" cy="4114800"/>
-            <a:chOff x="3962400" y="228600"/>
-            <a:chExt cx="3352800" cy="4114800"/>
-          </a:xfrm>
-        </p:grpSpPr>
-        <p:sp>
-          <p:nvSpPr>
-            <p:cNvPr id="46" name="Rectangle: Rounded Corners 45">
-              <a:extLst>
-                <a:ext uri="{FF2B5EF4-FFF2-40B4-BE49-F238E27FC236}">
-                  <a16:creationId xmlns:a16="http://schemas.microsoft.com/office/drawing/2014/main" id="{6F675791-8DB1-475B-A4C4-EB802EE95216}"/>
-                </a:ext>
-              </a:extLst>
-            </p:cNvPr>
-            <p:cNvSpPr/>
-            <p:nvPr/>
-          </p:nvSpPr>
-          <p:spPr>
-            <a:xfrm>
-              <a:off x="3962400" y="228600"/>
-              <a:ext cx="3352800" cy="3810000"/>
-            </a:xfrm>
-            <a:prstGeom prst="roundRect">
-              <a:avLst>
-                <a:gd name="adj" fmla="val 5123"/>
-              </a:avLst>
-            </a:prstGeom>
-            <a:ln w="19050">
-              <a:solidFill>
-                <a:schemeClr val="accent1"/>
-              </a:solidFill>
-            </a:ln>
-          </p:spPr>
-          <p:style>
-            <a:lnRef idx="1">
-              <a:schemeClr val="accent3"/>
-            </a:lnRef>
-            <a:fillRef idx="2">
-              <a:schemeClr val="accent3"/>
-            </a:fillRef>
-            <a:effectRef idx="1">
-              <a:schemeClr val="accent3"/>
-            </a:effectRef>
-            <a:fontRef idx="minor">
-              <a:schemeClr val="dk1"/>
-            </a:fontRef>
-          </p:style>
-          <p:txBody>
-            <a:bodyPr rtlCol="0" anchor="t"/>
-            <a:lstStyle/>
-            <a:p>
-              <a:pPr algn="ctr"/>
-              <a:r>
-                <a:rPr lang="en-US" sz="1600" dirty="0"/>
-                <a:t>Conversational app/bot</a:t>
-              </a:r>
-            </a:p>
-          </p:txBody>
-        </p:sp>
-        <p:sp>
-          <p:nvSpPr>
-            <p:cNvPr id="47" name="Rectangle: Rounded Corners 46">
-              <a:extLst>
-                <a:ext uri="{FF2B5EF4-FFF2-40B4-BE49-F238E27FC236}">
-                  <a16:creationId xmlns:a16="http://schemas.microsoft.com/office/drawing/2014/main" id="{43CAD27B-16AD-46FE-AD05-B76E1096551F}"/>
-                </a:ext>
-              </a:extLst>
-            </p:cNvPr>
-            <p:cNvSpPr/>
-            <p:nvPr/>
-          </p:nvSpPr>
-          <p:spPr>
-            <a:xfrm>
-              <a:off x="4114800" y="685800"/>
-              <a:ext cx="2895600" cy="1219200"/>
-            </a:xfrm>
-            <a:prstGeom prst="roundRect">
-              <a:avLst>
-                <a:gd name="adj" fmla="val 9849"/>
-              </a:avLst>
-            </a:prstGeom>
-          </p:spPr>
-          <p:style>
-            <a:lnRef idx="2">
-              <a:schemeClr val="accent1">
-                <a:shade val="50000"/>
-              </a:schemeClr>
-            </a:lnRef>
-            <a:fillRef idx="1">
-              <a:schemeClr val="accent1"/>
-            </a:fillRef>
-            <a:effectRef idx="0">
-              <a:schemeClr val="accent1"/>
-            </a:effectRef>
-            <a:fontRef idx="minor">
-              <a:schemeClr val="lt1"/>
-            </a:fontRef>
-          </p:style>
-          <p:txBody>
-            <a:bodyPr rtlCol="0" anchor="t"/>
-            <a:lstStyle/>
-            <a:p>
-              <a:pPr algn="ctr"/>
-              <a:r>
-                <a:rPr lang="en-US" sz="1600" dirty="0"/>
-                <a:t>Reasoning</a:t>
-              </a:r>
-            </a:p>
-          </p:txBody>
-        </p:sp>
-        <p:sp>
-          <p:nvSpPr>
-            <p:cNvPr id="48" name="Rectangle: Rounded Corners 47">
-              <a:extLst>
-                <a:ext uri="{FF2B5EF4-FFF2-40B4-BE49-F238E27FC236}">
-                  <a16:creationId xmlns:a16="http://schemas.microsoft.com/office/drawing/2014/main" id="{FB3E5612-E0DE-42A4-B9B0-2B1554F7A63F}"/>
-                </a:ext>
-              </a:extLst>
-            </p:cNvPr>
-            <p:cNvSpPr/>
-            <p:nvPr/>
-          </p:nvSpPr>
-          <p:spPr>
-            <a:xfrm>
-              <a:off x="4114800" y="2209800"/>
-              <a:ext cx="3048000" cy="1676400"/>
-            </a:xfrm>
-            <a:prstGeom prst="roundRect">
-              <a:avLst>
-                <a:gd name="adj" fmla="val 9091"/>
-              </a:avLst>
-            </a:prstGeom>
-          </p:spPr>
-          <p:style>
-            <a:lnRef idx="2">
-              <a:schemeClr val="accent1">
-                <a:shade val="50000"/>
-              </a:schemeClr>
-            </a:lnRef>
-            <a:fillRef idx="1">
-              <a:schemeClr val="accent1"/>
-            </a:fillRef>
-            <a:effectRef idx="0">
-              <a:schemeClr val="accent1"/>
-            </a:effectRef>
-            <a:fontRef idx="minor">
-              <a:schemeClr val="lt1"/>
-            </a:fontRef>
-          </p:style>
-          <p:txBody>
-            <a:bodyPr rtlCol="0" anchor="t"/>
-            <a:lstStyle/>
-            <a:p>
-              <a:pPr algn="ctr"/>
-              <a:r>
-                <a:rPr lang="en-US" sz="1600" dirty="0"/>
-                <a:t>Pipeline processing</a:t>
-              </a:r>
-            </a:p>
-          </p:txBody>
-        </p:sp>
-        <p:sp>
-          <p:nvSpPr>
-            <p:cNvPr id="49" name="Rectangle: Rounded Corners 48">
-              <a:extLst>
-                <a:ext uri="{FF2B5EF4-FFF2-40B4-BE49-F238E27FC236}">
-                  <a16:creationId xmlns:a16="http://schemas.microsoft.com/office/drawing/2014/main" id="{E150EFBA-D3D8-4B73-B638-A20D9ACB5F1F}"/>
-                </a:ext>
-              </a:extLst>
-            </p:cNvPr>
-            <p:cNvSpPr/>
-            <p:nvPr/>
-          </p:nvSpPr>
-          <p:spPr>
-            <a:xfrm>
-              <a:off x="4267200" y="2514600"/>
-              <a:ext cx="2743200" cy="1219200"/>
-            </a:xfrm>
-            <a:prstGeom prst="roundRect">
-              <a:avLst/>
-            </a:prstGeom>
-          </p:spPr>
-          <p:style>
-            <a:lnRef idx="2">
-              <a:schemeClr val="accent5">
-                <a:shade val="50000"/>
-              </a:schemeClr>
-            </a:lnRef>
-            <a:fillRef idx="1">
-              <a:schemeClr val="accent5"/>
-            </a:fillRef>
-            <a:effectRef idx="0">
-              <a:schemeClr val="accent5"/>
-            </a:effectRef>
-            <a:fontRef idx="minor">
-              <a:schemeClr val="lt1"/>
-            </a:fontRef>
-          </p:style>
-          <p:txBody>
-            <a:bodyPr rtlCol="0" anchor="t"/>
-            <a:lstStyle/>
-            <a:p>
-              <a:pPr algn="ctr"/>
-              <a:r>
-                <a:rPr lang="en-US" sz="1600" dirty="0"/>
-                <a:t>Connectivity &amp; protocol</a:t>
-              </a:r>
-            </a:p>
-          </p:txBody>
-        </p:sp>
-        <p:sp>
-          <p:nvSpPr>
-            <p:cNvPr id="50" name="Rectangle: Rounded Corners 49">
-              <a:extLst>
-                <a:ext uri="{FF2B5EF4-FFF2-40B4-BE49-F238E27FC236}">
-                  <a16:creationId xmlns:a16="http://schemas.microsoft.com/office/drawing/2014/main" id="{79BF1094-46CA-4A9B-979C-613EB7B43A7A}"/>
-                </a:ext>
-              </a:extLst>
-            </p:cNvPr>
-            <p:cNvSpPr/>
-            <p:nvPr/>
-          </p:nvSpPr>
-          <p:spPr>
-            <a:xfrm>
-              <a:off x="4267200" y="1143000"/>
-              <a:ext cx="1219200" cy="609600"/>
-            </a:xfrm>
-            <a:prstGeom prst="roundRect">
-              <a:avLst/>
-            </a:prstGeom>
-          </p:spPr>
-          <p:style>
-            <a:lnRef idx="2">
-              <a:schemeClr val="accent5">
-                <a:shade val="50000"/>
-              </a:schemeClr>
-            </a:lnRef>
-            <a:fillRef idx="1">
-              <a:schemeClr val="accent5"/>
-            </a:fillRef>
-            <a:effectRef idx="0">
-              <a:schemeClr val="accent5"/>
-            </a:effectRef>
-            <a:fontRef idx="minor">
-              <a:schemeClr val="lt1"/>
-            </a:fontRef>
-          </p:style>
-          <p:txBody>
-            <a:bodyPr rtlCol="0" anchor="t"/>
-            <a:lstStyle/>
-            <a:p>
-              <a:pPr algn="ctr"/>
-              <a:r>
-                <a:rPr lang="en-US" sz="1600" dirty="0"/>
-                <a:t>Input recognition</a:t>
-              </a:r>
-            </a:p>
-          </p:txBody>
-        </p:sp>
-        <p:sp>
-          <p:nvSpPr>
-            <p:cNvPr id="51" name="Rectangle: Rounded Corners 50">
-              <a:extLst>
-                <a:ext uri="{FF2B5EF4-FFF2-40B4-BE49-F238E27FC236}">
-                  <a16:creationId xmlns:a16="http://schemas.microsoft.com/office/drawing/2014/main" id="{BF6CFBCD-4AEB-4332-BB91-E0E3AE1CC143}"/>
-                </a:ext>
-              </a:extLst>
-            </p:cNvPr>
-            <p:cNvSpPr/>
-            <p:nvPr/>
-          </p:nvSpPr>
-          <p:spPr>
-            <a:xfrm>
-              <a:off x="5638800" y="1143000"/>
-              <a:ext cx="1219200" cy="609600"/>
-            </a:xfrm>
-            <a:prstGeom prst="roundRect">
-              <a:avLst/>
-            </a:prstGeom>
-          </p:spPr>
-          <p:style>
-            <a:lnRef idx="2">
-              <a:schemeClr val="accent5">
-                <a:shade val="50000"/>
-              </a:schemeClr>
-            </a:lnRef>
-            <a:fillRef idx="1">
-              <a:schemeClr val="accent5"/>
-            </a:fillRef>
-            <a:effectRef idx="0">
-              <a:schemeClr val="accent5"/>
-            </a:effectRef>
-            <a:fontRef idx="minor">
-              <a:schemeClr val="lt1"/>
-            </a:fontRef>
-          </p:style>
-          <p:txBody>
-            <a:bodyPr rtlCol="0" anchor="t"/>
-            <a:lstStyle/>
-            <a:p>
-              <a:pPr algn="ctr"/>
-              <a:r>
-                <a:rPr lang="en-US" sz="1600" dirty="0"/>
-                <a:t>Response generation</a:t>
-              </a:r>
-            </a:p>
-          </p:txBody>
-        </p:sp>
-        <p:cxnSp>
-          <p:nvCxnSpPr>
-            <p:cNvPr id="52" name="Straight Arrow Connector 51">
-              <a:extLst>
-                <a:ext uri="{FF2B5EF4-FFF2-40B4-BE49-F238E27FC236}">
-                  <a16:creationId xmlns:a16="http://schemas.microsoft.com/office/drawing/2014/main" id="{12548F1E-1BC3-4DDD-9FB8-0BB6FAEC019A}"/>
-                </a:ext>
-              </a:extLst>
-            </p:cNvPr>
-            <p:cNvCxnSpPr>
-              <a:cxnSpLocks/>
-            </p:cNvCxnSpPr>
-            <p:nvPr/>
-          </p:nvCxnSpPr>
-          <p:spPr>
-            <a:xfrm flipV="1">
-              <a:off x="5029200" y="1905000"/>
-              <a:ext cx="0" cy="304800"/>
-            </a:xfrm>
-            <a:prstGeom prst="straightConnector1">
-              <a:avLst/>
-            </a:prstGeom>
-            <a:ln>
-              <a:tailEnd type="triangle"/>
-            </a:ln>
-          </p:spPr>
-          <p:style>
-            <a:lnRef idx="1">
-              <a:schemeClr val="accent1"/>
-            </a:lnRef>
-            <a:fillRef idx="0">
-              <a:schemeClr val="accent1"/>
-            </a:fillRef>
-            <a:effectRef idx="0">
-              <a:schemeClr val="accent1"/>
-            </a:effectRef>
-            <a:fontRef idx="minor">
-              <a:schemeClr val="tx1"/>
-            </a:fontRef>
-          </p:style>
-        </p:cxnSp>
-        <p:cxnSp>
-          <p:nvCxnSpPr>
-            <p:cNvPr id="53" name="Straight Arrow Connector 52">
-              <a:extLst>
-                <a:ext uri="{FF2B5EF4-FFF2-40B4-BE49-F238E27FC236}">
-                  <a16:creationId xmlns:a16="http://schemas.microsoft.com/office/drawing/2014/main" id="{26BA05B8-78B8-4180-9097-7E54F06A5720}"/>
-                </a:ext>
-              </a:extLst>
-            </p:cNvPr>
-            <p:cNvCxnSpPr>
-              <a:cxnSpLocks/>
-            </p:cNvCxnSpPr>
-            <p:nvPr/>
-          </p:nvCxnSpPr>
-          <p:spPr>
-            <a:xfrm>
-              <a:off x="6096000" y="1905000"/>
-              <a:ext cx="0" cy="304800"/>
-            </a:xfrm>
-            <a:prstGeom prst="straightConnector1">
-              <a:avLst/>
-            </a:prstGeom>
-            <a:ln>
-              <a:tailEnd type="triangle"/>
-            </a:ln>
-          </p:spPr>
-          <p:style>
-            <a:lnRef idx="1">
-              <a:schemeClr val="accent1"/>
-            </a:lnRef>
-            <a:fillRef idx="0">
-              <a:schemeClr val="accent1"/>
-            </a:fillRef>
-            <a:effectRef idx="0">
-              <a:schemeClr val="accent1"/>
-            </a:effectRef>
-            <a:fontRef idx="minor">
-              <a:schemeClr val="tx1"/>
-            </a:fontRef>
-          </p:style>
-        </p:cxnSp>
-        <p:sp>
-          <p:nvSpPr>
-            <p:cNvPr id="23" name="Rectangle: Rounded Corners 22">
-              <a:extLst>
-                <a:ext uri="{FF2B5EF4-FFF2-40B4-BE49-F238E27FC236}">
-                  <a16:creationId xmlns:a16="http://schemas.microsoft.com/office/drawing/2014/main" id="{C7356978-ACAA-4DF4-A356-9B91EE9DD81F}"/>
-                </a:ext>
-              </a:extLst>
-            </p:cNvPr>
-            <p:cNvSpPr/>
-            <p:nvPr/>
-          </p:nvSpPr>
-          <p:spPr>
-            <a:xfrm rot="16200000">
-              <a:off x="4191000" y="3200400"/>
-              <a:ext cx="1066800" cy="609600"/>
-            </a:xfrm>
-            <a:prstGeom prst="roundRect">
-              <a:avLst/>
-            </a:prstGeom>
-          </p:spPr>
-          <p:style>
-            <a:lnRef idx="2">
-              <a:schemeClr val="accent5">
-                <a:shade val="50000"/>
-              </a:schemeClr>
-            </a:lnRef>
-            <a:fillRef idx="1">
-              <a:schemeClr val="accent5"/>
-            </a:fillRef>
-            <a:effectRef idx="0">
-              <a:schemeClr val="accent5"/>
-            </a:effectRef>
-            <a:fontRef idx="minor">
-              <a:schemeClr val="lt1"/>
-            </a:fontRef>
-          </p:style>
-          <p:txBody>
-            <a:bodyPr rtlCol="0" anchor="ctr"/>
-            <a:lstStyle/>
-            <a:p>
-              <a:pPr algn="ctr"/>
-              <a:r>
-                <a:rPr lang="en-US" sz="1400" dirty="0"/>
-                <a:t>Messaging endpoint</a:t>
-              </a:r>
-            </a:p>
-          </p:txBody>
-        </p:sp>
-        <p:sp>
-          <p:nvSpPr>
-            <p:cNvPr id="25" name="Rectangle: Rounded Corners 24">
-              <a:extLst>
-                <a:ext uri="{FF2B5EF4-FFF2-40B4-BE49-F238E27FC236}">
-                  <a16:creationId xmlns:a16="http://schemas.microsoft.com/office/drawing/2014/main" id="{55632650-CEE0-4FBB-BC9F-91667E92668E}"/>
-                </a:ext>
-              </a:extLst>
-            </p:cNvPr>
-            <p:cNvSpPr/>
-            <p:nvPr/>
-          </p:nvSpPr>
-          <p:spPr>
-            <a:xfrm rot="16200000">
-              <a:off x="5410199" y="3200400"/>
-              <a:ext cx="1066800" cy="609600"/>
-            </a:xfrm>
-            <a:prstGeom prst="roundRect">
-              <a:avLst/>
-            </a:prstGeom>
-          </p:spPr>
-          <p:style>
-            <a:lnRef idx="2">
-              <a:schemeClr val="accent6">
-                <a:shade val="50000"/>
-              </a:schemeClr>
-            </a:lnRef>
-            <a:fillRef idx="1">
-              <a:schemeClr val="accent6"/>
-            </a:fillRef>
-            <a:effectRef idx="0">
-              <a:schemeClr val="accent6"/>
-            </a:effectRef>
-            <a:fontRef idx="minor">
-              <a:schemeClr val="lt1"/>
-            </a:fontRef>
-          </p:style>
-          <p:txBody>
-            <a:bodyPr rtlCol="0" anchor="ctr"/>
-            <a:lstStyle/>
-            <a:p>
-              <a:pPr algn="ctr"/>
-              <a:r>
-                <a:rPr lang="en-US" sz="1400" dirty="0"/>
-                <a:t>Skill host endpoint</a:t>
-              </a:r>
-            </a:p>
-          </p:txBody>
-        </p:sp>
-        <p:sp>
-          <p:nvSpPr>
-            <p:cNvPr id="29" name="Rectangle: Rounded Corners 28">
-              <a:extLst>
-                <a:ext uri="{FF2B5EF4-FFF2-40B4-BE49-F238E27FC236}">
-                  <a16:creationId xmlns:a16="http://schemas.microsoft.com/office/drawing/2014/main" id="{1AA43D72-47BC-427F-A853-FD8CC1F2BDF7}"/>
-                </a:ext>
-              </a:extLst>
-            </p:cNvPr>
-            <p:cNvSpPr/>
-            <p:nvPr/>
-          </p:nvSpPr>
-          <p:spPr>
-            <a:xfrm rot="16200000">
-              <a:off x="6019800" y="3200400"/>
-              <a:ext cx="1066800" cy="609600"/>
-            </a:xfrm>
-            <a:prstGeom prst="roundRect">
-              <a:avLst/>
-            </a:prstGeom>
-          </p:spPr>
-          <p:style>
-            <a:lnRef idx="2">
-              <a:schemeClr val="accent6">
-                <a:shade val="50000"/>
-              </a:schemeClr>
-            </a:lnRef>
-            <a:fillRef idx="1">
-              <a:schemeClr val="accent6"/>
-            </a:fillRef>
-            <a:effectRef idx="0">
-              <a:schemeClr val="accent6"/>
-            </a:effectRef>
-            <a:fontRef idx="minor">
-              <a:schemeClr val="lt1"/>
-            </a:fontRef>
-          </p:style>
-          <p:txBody>
-            <a:bodyPr rtlCol="0" anchor="ctr"/>
-            <a:lstStyle/>
-            <a:p>
-              <a:pPr algn="ctr"/>
-              <a:r>
-                <a:rPr lang="en-US" sz="1400" dirty="0"/>
-                <a:t>Skill handler</a:t>
-              </a:r>
-            </a:p>
-          </p:txBody>
-        </p:sp>
-        <p:sp>
-          <p:nvSpPr>
-            <p:cNvPr id="82" name="Arrow: Up 81">
-              <a:extLst>
-                <a:ext uri="{FF2B5EF4-FFF2-40B4-BE49-F238E27FC236}">
-                  <a16:creationId xmlns:a16="http://schemas.microsoft.com/office/drawing/2014/main" id="{3D573CB3-66E1-433B-9B06-4E89FF8CFDE8}"/>
-                </a:ext>
-              </a:extLst>
-            </p:cNvPr>
-            <p:cNvSpPr/>
-            <p:nvPr/>
-          </p:nvSpPr>
-          <p:spPr>
-            <a:xfrm>
-              <a:off x="4724400" y="4038600"/>
-              <a:ext cx="152400" cy="304800"/>
-            </a:xfrm>
-            <a:prstGeom prst="upArrow">
-              <a:avLst/>
-            </a:prstGeom>
-          </p:spPr>
-          <p:style>
-            <a:lnRef idx="1">
-              <a:schemeClr val="accent3"/>
-            </a:lnRef>
-            <a:fillRef idx="2">
-              <a:schemeClr val="accent3"/>
-            </a:fillRef>
-            <a:effectRef idx="1">
-              <a:schemeClr val="accent3"/>
-            </a:effectRef>
-            <a:fontRef idx="minor">
-              <a:schemeClr val="dk1"/>
-            </a:fontRef>
-          </p:style>
-          <p:txBody>
-            <a:bodyPr rtlCol="0" anchor="ctr"/>
-            <a:lstStyle/>
-            <a:p>
-              <a:pPr algn="ctr"/>
-              <a:endParaRPr lang="en-US"/>
-            </a:p>
-          </p:txBody>
-        </p:sp>
-        <p:sp>
-          <p:nvSpPr>
-            <p:cNvPr id="84" name="Arrow: Up 83">
-              <a:extLst>
-                <a:ext uri="{FF2B5EF4-FFF2-40B4-BE49-F238E27FC236}">
-                  <a16:creationId xmlns:a16="http://schemas.microsoft.com/office/drawing/2014/main" id="{DBD76831-ED22-4BBC-9A8C-E660A8590DA8}"/>
-                </a:ext>
-              </a:extLst>
-            </p:cNvPr>
-            <p:cNvSpPr/>
-            <p:nvPr/>
-          </p:nvSpPr>
-          <p:spPr>
-            <a:xfrm>
-              <a:off x="5943600" y="4038600"/>
-              <a:ext cx="152400" cy="304800"/>
-            </a:xfrm>
-            <a:prstGeom prst="upArrow">
-              <a:avLst/>
-            </a:prstGeom>
-          </p:spPr>
-          <p:style>
-            <a:lnRef idx="1">
-              <a:schemeClr val="accent6"/>
-            </a:lnRef>
-            <a:fillRef idx="2">
-              <a:schemeClr val="accent6"/>
-            </a:fillRef>
-            <a:effectRef idx="1">
-              <a:schemeClr val="accent6"/>
-            </a:effectRef>
-            <a:fontRef idx="minor">
-              <a:schemeClr val="dk1"/>
-            </a:fontRef>
-          </p:style>
-          <p:txBody>
-            <a:bodyPr rtlCol="0" anchor="ctr"/>
-            <a:lstStyle/>
-            <a:p>
-              <a:pPr algn="ctr"/>
-              <a:endParaRPr lang="en-US"/>
-            </a:p>
-          </p:txBody>
-        </p:sp>
-        <p:sp>
-          <p:nvSpPr>
-            <p:cNvPr id="86" name="Arrow: Up 85">
-              <a:extLst>
-                <a:ext uri="{FF2B5EF4-FFF2-40B4-BE49-F238E27FC236}">
-                  <a16:creationId xmlns:a16="http://schemas.microsoft.com/office/drawing/2014/main" id="{7665D944-C8B4-4B55-B455-D6418B3C8382}"/>
-                </a:ext>
-              </a:extLst>
-            </p:cNvPr>
-            <p:cNvSpPr/>
-            <p:nvPr/>
-          </p:nvSpPr>
-          <p:spPr>
-            <a:xfrm rot="10800000">
-              <a:off x="6400800" y="4038600"/>
-              <a:ext cx="152400" cy="304800"/>
-            </a:xfrm>
-            <a:prstGeom prst="upArrow">
-              <a:avLst/>
-            </a:prstGeom>
-          </p:spPr>
-          <p:style>
-            <a:lnRef idx="1">
-              <a:schemeClr val="accent6"/>
-            </a:lnRef>
-            <a:fillRef idx="2">
-              <a:schemeClr val="accent6"/>
-            </a:fillRef>
-            <a:effectRef idx="1">
-              <a:schemeClr val="accent6"/>
-            </a:effectRef>
-            <a:fontRef idx="minor">
-              <a:schemeClr val="dk1"/>
-            </a:fontRef>
-          </p:style>
-          <p:txBody>
-            <a:bodyPr rtlCol="0" anchor="ctr"/>
-            <a:lstStyle/>
-            <a:p>
-              <a:pPr algn="ctr"/>
-              <a:endParaRPr lang="en-US"/>
-            </a:p>
-          </p:txBody>
-        </p:sp>
-        <p:sp>
-          <p:nvSpPr>
-            <p:cNvPr id="88" name="Arrow: Up 87">
-              <a:extLst>
-                <a:ext uri="{FF2B5EF4-FFF2-40B4-BE49-F238E27FC236}">
-                  <a16:creationId xmlns:a16="http://schemas.microsoft.com/office/drawing/2014/main" id="{BAAC1822-3AF0-473D-8434-3AC91143AE89}"/>
-                </a:ext>
-              </a:extLst>
-            </p:cNvPr>
-            <p:cNvSpPr/>
-            <p:nvPr/>
-          </p:nvSpPr>
-          <p:spPr>
-            <a:xfrm rot="10800000">
-              <a:off x="5181600" y="4038600"/>
-              <a:ext cx="152400" cy="304800"/>
-            </a:xfrm>
-            <a:prstGeom prst="upArrow">
-              <a:avLst/>
-            </a:prstGeom>
-          </p:spPr>
-          <p:style>
-            <a:lnRef idx="1">
-              <a:schemeClr val="accent3"/>
-            </a:lnRef>
-            <a:fillRef idx="2">
-              <a:schemeClr val="accent3"/>
-            </a:fillRef>
-            <a:effectRef idx="1">
-              <a:schemeClr val="accent3"/>
-            </a:effectRef>
-            <a:fontRef idx="minor">
-              <a:schemeClr val="dk1"/>
-            </a:fontRef>
-          </p:style>
-          <p:txBody>
-            <a:bodyPr rtlCol="0" anchor="ctr"/>
-            <a:lstStyle/>
-            <a:p>
-              <a:pPr algn="ctr"/>
-              <a:endParaRPr lang="en-US"/>
-            </a:p>
-          </p:txBody>
-        </p:sp>
-      </p:grpSp>
-      <p:grpSp>
-        <p:nvGrpSpPr>
-          <p:cNvPr id="94" name="Group 93">
-            <a:extLst>
-              <a:ext uri="{FF2B5EF4-FFF2-40B4-BE49-F238E27FC236}">
-                <a16:creationId xmlns:a16="http://schemas.microsoft.com/office/drawing/2014/main" id="{8187B26E-702D-4FBE-BBC1-29E6A67DBBB8}"/>
-              </a:ext>
-            </a:extLst>
-          </p:cNvPr>
-          <p:cNvGrpSpPr/>
-          <p:nvPr/>
-        </p:nvGrpSpPr>
-        <p:grpSpPr>
-          <a:xfrm>
-            <a:off x="7010400" y="228600"/>
-            <a:ext cx="3352800" cy="4114800"/>
-            <a:chOff x="7924800" y="228600"/>
-            <a:chExt cx="3352800" cy="4114800"/>
-          </a:xfrm>
-        </p:grpSpPr>
-        <p:sp>
-          <p:nvSpPr>
-            <p:cNvPr id="31" name="Rectangle: Rounded Corners 30">
-              <a:extLst>
-                <a:ext uri="{FF2B5EF4-FFF2-40B4-BE49-F238E27FC236}">
-                  <a16:creationId xmlns:a16="http://schemas.microsoft.com/office/drawing/2014/main" id="{E1A7C0B4-747F-4270-9B26-C8159AFD9C4A}"/>
-                </a:ext>
-              </a:extLst>
-            </p:cNvPr>
-            <p:cNvSpPr/>
-            <p:nvPr/>
-          </p:nvSpPr>
-          <p:spPr>
-            <a:xfrm>
-              <a:off x="7924800" y="228600"/>
-              <a:ext cx="3352800" cy="3810000"/>
-            </a:xfrm>
-            <a:prstGeom prst="roundRect">
-              <a:avLst>
-                <a:gd name="adj" fmla="val 5123"/>
-              </a:avLst>
-            </a:prstGeom>
-            <a:ln w="19050"/>
-          </p:spPr>
-          <p:style>
-            <a:lnRef idx="1">
-              <a:schemeClr val="accent6"/>
-            </a:lnRef>
-            <a:fillRef idx="2">
-              <a:schemeClr val="accent6"/>
-            </a:fillRef>
-            <a:effectRef idx="1">
-              <a:schemeClr val="accent6"/>
-            </a:effectRef>
-            <a:fontRef idx="minor">
-              <a:schemeClr val="dk1"/>
-            </a:fontRef>
-          </p:style>
-          <p:txBody>
-            <a:bodyPr rtlCol="0" anchor="t"/>
-            <a:lstStyle/>
-            <a:p>
-              <a:pPr algn="ctr"/>
-              <a:r>
-                <a:rPr lang="en-US" sz="1600" dirty="0"/>
-                <a:t>Conversational app/bot</a:t>
-              </a:r>
-            </a:p>
-          </p:txBody>
-        </p:sp>
-        <p:sp>
-          <p:nvSpPr>
-            <p:cNvPr id="41" name="Rectangle: Rounded Corners 40">
-              <a:extLst>
-                <a:ext uri="{FF2B5EF4-FFF2-40B4-BE49-F238E27FC236}">
-                  <a16:creationId xmlns:a16="http://schemas.microsoft.com/office/drawing/2014/main" id="{69165BCC-610D-47D6-B389-A69AE9298E74}"/>
-                </a:ext>
-              </a:extLst>
-            </p:cNvPr>
-            <p:cNvSpPr/>
-            <p:nvPr/>
-          </p:nvSpPr>
-          <p:spPr>
-            <a:xfrm>
-              <a:off x="8077200" y="685800"/>
-              <a:ext cx="2895600" cy="1219200"/>
-            </a:xfrm>
-            <a:prstGeom prst="roundRect">
-              <a:avLst>
-                <a:gd name="adj" fmla="val 9849"/>
-              </a:avLst>
-            </a:prstGeom>
-          </p:spPr>
-          <p:style>
-            <a:lnRef idx="2">
-              <a:schemeClr val="accent1">
-                <a:shade val="50000"/>
-              </a:schemeClr>
-            </a:lnRef>
-            <a:fillRef idx="1">
-              <a:schemeClr val="accent1"/>
-            </a:fillRef>
-            <a:effectRef idx="0">
-              <a:schemeClr val="accent1"/>
-            </a:effectRef>
-            <a:fontRef idx="minor">
-              <a:schemeClr val="lt1"/>
-            </a:fontRef>
-          </p:style>
-          <p:txBody>
-            <a:bodyPr rtlCol="0" anchor="t"/>
-            <a:lstStyle/>
-            <a:p>
-              <a:pPr algn="ctr"/>
-              <a:r>
-                <a:rPr lang="en-US" sz="1600" dirty="0"/>
-                <a:t>Reasoning</a:t>
-              </a:r>
-            </a:p>
-          </p:txBody>
-        </p:sp>
-        <p:sp>
-          <p:nvSpPr>
-            <p:cNvPr id="42" name="Rectangle: Rounded Corners 41">
-              <a:extLst>
-                <a:ext uri="{FF2B5EF4-FFF2-40B4-BE49-F238E27FC236}">
-                  <a16:creationId xmlns:a16="http://schemas.microsoft.com/office/drawing/2014/main" id="{AE2BAE46-72F8-4AB9-9A1F-2D93F0990476}"/>
-                </a:ext>
-              </a:extLst>
-            </p:cNvPr>
-            <p:cNvSpPr/>
-            <p:nvPr/>
-          </p:nvSpPr>
-          <p:spPr>
-            <a:xfrm>
-              <a:off x="8077200" y="2209800"/>
-              <a:ext cx="3048000" cy="1676400"/>
-            </a:xfrm>
-            <a:prstGeom prst="roundRect">
-              <a:avLst>
-                <a:gd name="adj" fmla="val 9091"/>
-              </a:avLst>
-            </a:prstGeom>
-          </p:spPr>
-          <p:style>
-            <a:lnRef idx="2">
-              <a:schemeClr val="accent1">
-                <a:shade val="50000"/>
-              </a:schemeClr>
-            </a:lnRef>
-            <a:fillRef idx="1">
-              <a:schemeClr val="accent1"/>
-            </a:fillRef>
-            <a:effectRef idx="0">
-              <a:schemeClr val="accent1"/>
-            </a:effectRef>
-            <a:fontRef idx="minor">
-              <a:schemeClr val="lt1"/>
-            </a:fontRef>
-          </p:style>
-          <p:txBody>
-            <a:bodyPr rtlCol="0" anchor="t"/>
-            <a:lstStyle/>
-            <a:p>
-              <a:pPr algn="ctr"/>
-              <a:r>
-                <a:rPr lang="en-US" sz="1600" dirty="0"/>
-                <a:t>Pipeline processing</a:t>
-              </a:r>
-            </a:p>
-          </p:txBody>
-        </p:sp>
-        <p:sp>
-          <p:nvSpPr>
-            <p:cNvPr id="43" name="Rectangle: Rounded Corners 42">
-              <a:extLst>
-                <a:ext uri="{FF2B5EF4-FFF2-40B4-BE49-F238E27FC236}">
-                  <a16:creationId xmlns:a16="http://schemas.microsoft.com/office/drawing/2014/main" id="{0CBB8EB1-E6E6-42C4-BECC-EC2BAB122039}"/>
-                </a:ext>
-              </a:extLst>
-            </p:cNvPr>
-            <p:cNvSpPr/>
-            <p:nvPr/>
-          </p:nvSpPr>
-          <p:spPr>
-            <a:xfrm>
-              <a:off x="8229600" y="2514600"/>
-              <a:ext cx="2743200" cy="1219200"/>
-            </a:xfrm>
-            <a:prstGeom prst="roundRect">
-              <a:avLst/>
-            </a:prstGeom>
-          </p:spPr>
-          <p:style>
-            <a:lnRef idx="2">
-              <a:schemeClr val="accent5">
-                <a:shade val="50000"/>
-              </a:schemeClr>
-            </a:lnRef>
-            <a:fillRef idx="1">
-              <a:schemeClr val="accent5"/>
-            </a:fillRef>
-            <a:effectRef idx="0">
-              <a:schemeClr val="accent5"/>
-            </a:effectRef>
-            <a:fontRef idx="minor">
-              <a:schemeClr val="lt1"/>
-            </a:fontRef>
-          </p:style>
-          <p:txBody>
-            <a:bodyPr rtlCol="0" anchor="t"/>
-            <a:lstStyle/>
-            <a:p>
-              <a:pPr algn="ctr"/>
-              <a:r>
-                <a:rPr lang="en-US" sz="1600" dirty="0"/>
-                <a:t>Connectivity &amp; protocol</a:t>
-              </a:r>
-            </a:p>
-          </p:txBody>
-        </p:sp>
-        <p:sp>
-          <p:nvSpPr>
-            <p:cNvPr id="55" name="Rectangle: Rounded Corners 54">
-              <a:extLst>
-                <a:ext uri="{FF2B5EF4-FFF2-40B4-BE49-F238E27FC236}">
-                  <a16:creationId xmlns:a16="http://schemas.microsoft.com/office/drawing/2014/main" id="{01E10F3C-A7A6-409E-9E7C-24C002DB28AC}"/>
-                </a:ext>
-              </a:extLst>
-            </p:cNvPr>
-            <p:cNvSpPr/>
-            <p:nvPr/>
-          </p:nvSpPr>
-          <p:spPr>
-            <a:xfrm>
-              <a:off x="8229600" y="1143000"/>
-              <a:ext cx="1219200" cy="609600"/>
-            </a:xfrm>
-            <a:prstGeom prst="roundRect">
-              <a:avLst/>
-            </a:prstGeom>
-          </p:spPr>
-          <p:style>
-            <a:lnRef idx="2">
-              <a:schemeClr val="accent5">
-                <a:shade val="50000"/>
-              </a:schemeClr>
-            </a:lnRef>
-            <a:fillRef idx="1">
-              <a:schemeClr val="accent5"/>
-            </a:fillRef>
-            <a:effectRef idx="0">
-              <a:schemeClr val="accent5"/>
-            </a:effectRef>
-            <a:fontRef idx="minor">
-              <a:schemeClr val="lt1"/>
-            </a:fontRef>
-          </p:style>
-          <p:txBody>
-            <a:bodyPr rtlCol="0" anchor="t"/>
-            <a:lstStyle/>
-            <a:p>
-              <a:pPr algn="ctr"/>
-              <a:r>
-                <a:rPr lang="en-US" sz="1600" dirty="0"/>
-                <a:t>Input recognition</a:t>
-              </a:r>
-            </a:p>
-          </p:txBody>
-        </p:sp>
-        <p:sp>
-          <p:nvSpPr>
-            <p:cNvPr id="57" name="Rectangle: Rounded Corners 56">
-              <a:extLst>
-                <a:ext uri="{FF2B5EF4-FFF2-40B4-BE49-F238E27FC236}">
-                  <a16:creationId xmlns:a16="http://schemas.microsoft.com/office/drawing/2014/main" id="{9ADABD83-1A67-4515-848B-8E64E399E5FE}"/>
-                </a:ext>
-              </a:extLst>
-            </p:cNvPr>
-            <p:cNvSpPr/>
-            <p:nvPr/>
-          </p:nvSpPr>
-          <p:spPr>
-            <a:xfrm>
-              <a:off x="9601200" y="1143000"/>
-              <a:ext cx="1219200" cy="609600"/>
-            </a:xfrm>
-            <a:prstGeom prst="roundRect">
-              <a:avLst/>
-            </a:prstGeom>
-          </p:spPr>
-          <p:style>
-            <a:lnRef idx="2">
-              <a:schemeClr val="accent5">
-                <a:shade val="50000"/>
-              </a:schemeClr>
-            </a:lnRef>
-            <a:fillRef idx="1">
-              <a:schemeClr val="accent5"/>
-            </a:fillRef>
-            <a:effectRef idx="0">
-              <a:schemeClr val="accent5"/>
-            </a:effectRef>
-            <a:fontRef idx="minor">
-              <a:schemeClr val="lt1"/>
-            </a:fontRef>
-          </p:style>
-          <p:txBody>
-            <a:bodyPr rtlCol="0" anchor="t"/>
-            <a:lstStyle/>
-            <a:p>
-              <a:pPr algn="ctr"/>
-              <a:r>
-                <a:rPr lang="en-US" sz="1600" dirty="0"/>
-                <a:t>Response generation</a:t>
-              </a:r>
-            </a:p>
-          </p:txBody>
-        </p:sp>
-        <p:cxnSp>
-          <p:nvCxnSpPr>
-            <p:cNvPr id="73" name="Straight Arrow Connector 72">
-              <a:extLst>
-                <a:ext uri="{FF2B5EF4-FFF2-40B4-BE49-F238E27FC236}">
-                  <a16:creationId xmlns:a16="http://schemas.microsoft.com/office/drawing/2014/main" id="{186680D0-8EF8-4F59-AC19-94A29E248F73}"/>
-                </a:ext>
-              </a:extLst>
-            </p:cNvPr>
-            <p:cNvCxnSpPr>
-              <a:cxnSpLocks/>
-            </p:cNvCxnSpPr>
-            <p:nvPr/>
-          </p:nvCxnSpPr>
-          <p:spPr>
-            <a:xfrm flipV="1">
-              <a:off x="8991600" y="1905000"/>
-              <a:ext cx="0" cy="304800"/>
-            </a:xfrm>
-            <a:prstGeom prst="straightConnector1">
-              <a:avLst/>
-            </a:prstGeom>
-            <a:ln>
-              <a:tailEnd type="triangle"/>
-            </a:ln>
-          </p:spPr>
-          <p:style>
-            <a:lnRef idx="1">
-              <a:schemeClr val="accent1"/>
-            </a:lnRef>
-            <a:fillRef idx="0">
-              <a:schemeClr val="accent1"/>
-            </a:fillRef>
-            <a:effectRef idx="0">
-              <a:schemeClr val="accent1"/>
-            </a:effectRef>
-            <a:fontRef idx="minor">
-              <a:schemeClr val="tx1"/>
-            </a:fontRef>
-          </p:style>
-        </p:cxnSp>
-        <p:cxnSp>
-          <p:nvCxnSpPr>
-            <p:cNvPr id="75" name="Straight Arrow Connector 74">
-              <a:extLst>
-                <a:ext uri="{FF2B5EF4-FFF2-40B4-BE49-F238E27FC236}">
-                  <a16:creationId xmlns:a16="http://schemas.microsoft.com/office/drawing/2014/main" id="{9B3337C4-6824-4B20-B2F4-1267E08C0C9A}"/>
-                </a:ext>
-              </a:extLst>
-            </p:cNvPr>
-            <p:cNvCxnSpPr>
-              <a:cxnSpLocks/>
-            </p:cNvCxnSpPr>
-            <p:nvPr/>
-          </p:nvCxnSpPr>
-          <p:spPr>
-            <a:xfrm>
-              <a:off x="10058400" y="1905000"/>
-              <a:ext cx="0" cy="304800"/>
-            </a:xfrm>
-            <a:prstGeom prst="straightConnector1">
-              <a:avLst/>
-            </a:prstGeom>
-            <a:ln>
-              <a:tailEnd type="triangle"/>
-            </a:ln>
-          </p:spPr>
-          <p:style>
-            <a:lnRef idx="1">
-              <a:schemeClr val="accent1"/>
-            </a:lnRef>
-            <a:fillRef idx="0">
-              <a:schemeClr val="accent1"/>
-            </a:fillRef>
-            <a:effectRef idx="0">
-              <a:schemeClr val="accent1"/>
-            </a:effectRef>
-            <a:fontRef idx="minor">
-              <a:schemeClr val="tx1"/>
-            </a:fontRef>
-          </p:style>
-        </p:cxnSp>
-        <p:sp>
-          <p:nvSpPr>
-            <p:cNvPr id="77" name="Rectangle: Rounded Corners 76">
-              <a:extLst>
-                <a:ext uri="{FF2B5EF4-FFF2-40B4-BE49-F238E27FC236}">
-                  <a16:creationId xmlns:a16="http://schemas.microsoft.com/office/drawing/2014/main" id="{78359FD7-815D-43CE-8217-81A143125384}"/>
-                </a:ext>
-              </a:extLst>
-            </p:cNvPr>
-            <p:cNvSpPr/>
-            <p:nvPr/>
-          </p:nvSpPr>
-          <p:spPr>
-            <a:xfrm rot="16200000">
-              <a:off x="8153400" y="3200400"/>
-              <a:ext cx="1066800" cy="609600"/>
-            </a:xfrm>
-            <a:prstGeom prst="roundRect">
-              <a:avLst/>
-            </a:prstGeom>
-          </p:spPr>
-          <p:style>
-            <a:lnRef idx="2">
-              <a:schemeClr val="accent5">
-                <a:shade val="50000"/>
-              </a:schemeClr>
-            </a:lnRef>
-            <a:fillRef idx="1">
-              <a:schemeClr val="accent5"/>
-            </a:fillRef>
-            <a:effectRef idx="0">
-              <a:schemeClr val="accent5"/>
-            </a:effectRef>
-            <a:fontRef idx="minor">
-              <a:schemeClr val="lt1"/>
-            </a:fontRef>
-          </p:style>
-          <p:txBody>
-            <a:bodyPr rtlCol="0" anchor="ctr"/>
-            <a:lstStyle/>
-            <a:p>
-              <a:pPr algn="ctr"/>
-              <a:r>
-                <a:rPr lang="en-US" sz="1400" dirty="0"/>
-                <a:t>Messaging endpoint</a:t>
-              </a:r>
-            </a:p>
-          </p:txBody>
-        </p:sp>
-        <p:sp>
-          <p:nvSpPr>
-            <p:cNvPr id="90" name="Arrow: Up 89">
-              <a:extLst>
-                <a:ext uri="{FF2B5EF4-FFF2-40B4-BE49-F238E27FC236}">
-                  <a16:creationId xmlns:a16="http://schemas.microsoft.com/office/drawing/2014/main" id="{1ABCB151-CC23-4B0F-8364-B3263865F510}"/>
-                </a:ext>
-              </a:extLst>
-            </p:cNvPr>
-            <p:cNvSpPr/>
-            <p:nvPr/>
-          </p:nvSpPr>
-          <p:spPr>
-            <a:xfrm rot="10800000">
-              <a:off x="9144000" y="4038600"/>
-              <a:ext cx="152400" cy="304800"/>
-            </a:xfrm>
-            <a:prstGeom prst="upArrow">
-              <a:avLst/>
-            </a:prstGeom>
-          </p:spPr>
-          <p:style>
-            <a:lnRef idx="1">
-              <a:schemeClr val="accent6"/>
-            </a:lnRef>
-            <a:fillRef idx="2">
-              <a:schemeClr val="accent6"/>
-            </a:fillRef>
-            <a:effectRef idx="1">
-              <a:schemeClr val="accent6"/>
-            </a:effectRef>
-            <a:fontRef idx="minor">
-              <a:schemeClr val="dk1"/>
-            </a:fontRef>
-          </p:style>
-          <p:txBody>
-            <a:bodyPr rtlCol="0" anchor="ctr"/>
-            <a:lstStyle/>
-            <a:p>
-              <a:pPr algn="ctr"/>
-              <a:endParaRPr lang="en-US"/>
-            </a:p>
-          </p:txBody>
-        </p:sp>
-        <p:sp>
-          <p:nvSpPr>
-            <p:cNvPr id="92" name="Arrow: Up 91">
-              <a:extLst>
-                <a:ext uri="{FF2B5EF4-FFF2-40B4-BE49-F238E27FC236}">
-                  <a16:creationId xmlns:a16="http://schemas.microsoft.com/office/drawing/2014/main" id="{9FD3A548-6806-4769-B0C3-4904120A68FC}"/>
-                </a:ext>
-              </a:extLst>
-            </p:cNvPr>
-            <p:cNvSpPr/>
-            <p:nvPr/>
-          </p:nvSpPr>
-          <p:spPr>
-            <a:xfrm>
-              <a:off x="8686800" y="4038600"/>
-              <a:ext cx="152400" cy="304800"/>
-            </a:xfrm>
-            <a:prstGeom prst="upArrow">
-              <a:avLst/>
-            </a:prstGeom>
-          </p:spPr>
-          <p:style>
-            <a:lnRef idx="1">
-              <a:schemeClr val="accent6"/>
-            </a:lnRef>
-            <a:fillRef idx="2">
-              <a:schemeClr val="accent6"/>
-            </a:fillRef>
-            <a:effectRef idx="1">
-              <a:schemeClr val="accent6"/>
-            </a:effectRef>
-            <a:fontRef idx="minor">
-              <a:schemeClr val="dk1"/>
-            </a:fontRef>
-          </p:style>
-          <p:txBody>
-            <a:bodyPr rtlCol="0" anchor="ctr"/>
-            <a:lstStyle/>
-            <a:p>
-              <a:pPr algn="ctr"/>
-              <a:endParaRPr lang="en-US"/>
-            </a:p>
-          </p:txBody>
-        </p:sp>
-      </p:grpSp>
-      <p:grpSp>
-        <p:nvGrpSpPr>
-          <p:cNvPr id="103" name="Group 102">
-            <a:extLst>
-              <a:ext uri="{FF2B5EF4-FFF2-40B4-BE49-F238E27FC236}">
-                <a16:creationId xmlns:a16="http://schemas.microsoft.com/office/drawing/2014/main" id="{2EDA8244-9BD0-43B6-9A26-9B3F80AB3AC5}"/>
-              </a:ext>
-            </a:extLst>
-          </p:cNvPr>
-          <p:cNvGrpSpPr/>
-          <p:nvPr/>
-        </p:nvGrpSpPr>
-        <p:grpSpPr>
-          <a:xfrm>
-            <a:off x="5334000" y="3276600"/>
-            <a:ext cx="1066800" cy="1066800"/>
-            <a:chOff x="1524000" y="3276600"/>
-            <a:chExt cx="1066800" cy="1066800"/>
-          </a:xfrm>
-        </p:grpSpPr>
-        <p:sp>
-          <p:nvSpPr>
-            <p:cNvPr id="96" name="Cylinder 95">
-              <a:extLst>
-                <a:ext uri="{FF2B5EF4-FFF2-40B4-BE49-F238E27FC236}">
-                  <a16:creationId xmlns:a16="http://schemas.microsoft.com/office/drawing/2014/main" id="{30E5D197-D5B7-4D28-90BF-75A9ED5FAD37}"/>
-                </a:ext>
-              </a:extLst>
-            </p:cNvPr>
-            <p:cNvSpPr/>
-            <p:nvPr/>
-          </p:nvSpPr>
-          <p:spPr>
-            <a:xfrm>
-              <a:off x="1524000" y="3276600"/>
-              <a:ext cx="1066800" cy="609600"/>
-            </a:xfrm>
-            <a:prstGeom prst="can">
-              <a:avLst/>
-            </a:prstGeom>
-            <a:ln w="19050">
-              <a:solidFill>
-                <a:schemeClr val="accent1"/>
-              </a:solidFill>
-            </a:ln>
-          </p:spPr>
-          <p:style>
-            <a:lnRef idx="2">
-              <a:schemeClr val="accent6">
-                <a:shade val="50000"/>
-              </a:schemeClr>
-            </a:lnRef>
-            <a:fillRef idx="1">
-              <a:schemeClr val="accent6"/>
-            </a:fillRef>
-            <a:effectRef idx="0">
-              <a:schemeClr val="accent6"/>
-            </a:effectRef>
-            <a:fontRef idx="minor">
-              <a:schemeClr val="lt1"/>
-            </a:fontRef>
-          </p:style>
-          <p:txBody>
-            <a:bodyPr rtlCol="0" anchor="ctr"/>
-            <a:lstStyle/>
-            <a:p>
-              <a:pPr algn="ctr"/>
-              <a:r>
-                <a:rPr lang="en-US" sz="1600" dirty="0"/>
-                <a:t>Storage</a:t>
-              </a:r>
-            </a:p>
-          </p:txBody>
-        </p:sp>
-        <p:sp>
-          <p:nvSpPr>
-            <p:cNvPr id="98" name="Arrow: Up-Down 97">
-              <a:extLst>
-                <a:ext uri="{FF2B5EF4-FFF2-40B4-BE49-F238E27FC236}">
-                  <a16:creationId xmlns:a16="http://schemas.microsoft.com/office/drawing/2014/main" id="{ED3FD1B3-6E38-40CA-B2C8-C81B5D127E5A}"/>
-                </a:ext>
-              </a:extLst>
-            </p:cNvPr>
-            <p:cNvSpPr/>
-            <p:nvPr/>
-          </p:nvSpPr>
-          <p:spPr>
-            <a:xfrm>
-              <a:off x="1981200" y="3886200"/>
-              <a:ext cx="152400" cy="457200"/>
-            </a:xfrm>
-            <a:prstGeom prst="upDownArrow">
-              <a:avLst/>
-            </a:prstGeom>
-          </p:spPr>
-          <p:style>
-            <a:lnRef idx="1">
-              <a:schemeClr val="accent3"/>
-            </a:lnRef>
-            <a:fillRef idx="2">
-              <a:schemeClr val="accent3"/>
-            </a:fillRef>
-            <a:effectRef idx="1">
-              <a:schemeClr val="accent3"/>
-            </a:effectRef>
-            <a:fontRef idx="minor">
-              <a:schemeClr val="dk1"/>
-            </a:fontRef>
-          </p:style>
-          <p:txBody>
-            <a:bodyPr rtlCol="0" anchor="ctr"/>
-            <a:lstStyle/>
-            <a:p>
-              <a:pPr algn="ctr"/>
-              <a:endParaRPr lang="en-US"/>
-            </a:p>
-          </p:txBody>
-        </p:sp>
-      </p:grpSp>
-      <p:grpSp>
-        <p:nvGrpSpPr>
-          <p:cNvPr id="104" name="Group 103">
-            <a:extLst>
-              <a:ext uri="{FF2B5EF4-FFF2-40B4-BE49-F238E27FC236}">
-                <a16:creationId xmlns:a16="http://schemas.microsoft.com/office/drawing/2014/main" id="{A765A06F-054C-44D8-BB4A-E5BB431F5107}"/>
-              </a:ext>
-            </a:extLst>
-          </p:cNvPr>
-          <p:cNvGrpSpPr/>
-          <p:nvPr/>
-        </p:nvGrpSpPr>
-        <p:grpSpPr>
-          <a:xfrm>
-            <a:off x="10515600" y="3276600"/>
-            <a:ext cx="1066800" cy="1066800"/>
-            <a:chOff x="10515600" y="3276600"/>
-            <a:chExt cx="1066800" cy="1066800"/>
-          </a:xfrm>
-        </p:grpSpPr>
-        <p:sp>
-          <p:nvSpPr>
-            <p:cNvPr id="100" name="Cylinder 99">
-              <a:extLst>
-                <a:ext uri="{FF2B5EF4-FFF2-40B4-BE49-F238E27FC236}">
-                  <a16:creationId xmlns:a16="http://schemas.microsoft.com/office/drawing/2014/main" id="{E729B802-9B71-4124-8553-00034DA8CE0B}"/>
-                </a:ext>
-              </a:extLst>
-            </p:cNvPr>
-            <p:cNvSpPr/>
-            <p:nvPr/>
-          </p:nvSpPr>
-          <p:spPr>
-            <a:xfrm>
-              <a:off x="10515600" y="3276600"/>
-              <a:ext cx="1066800" cy="609600"/>
-            </a:xfrm>
-            <a:prstGeom prst="can">
-              <a:avLst/>
-            </a:prstGeom>
-            <a:ln w="19050">
-              <a:solidFill>
-                <a:schemeClr val="accent6"/>
-              </a:solidFill>
-            </a:ln>
-          </p:spPr>
-          <p:style>
-            <a:lnRef idx="2">
-              <a:schemeClr val="accent6">
-                <a:shade val="50000"/>
-              </a:schemeClr>
-            </a:lnRef>
-            <a:fillRef idx="1">
-              <a:schemeClr val="accent6"/>
-            </a:fillRef>
-            <a:effectRef idx="0">
-              <a:schemeClr val="accent6"/>
-            </a:effectRef>
-            <a:fontRef idx="minor">
-              <a:schemeClr val="lt1"/>
-            </a:fontRef>
-          </p:style>
-          <p:txBody>
-            <a:bodyPr rtlCol="0" anchor="ctr"/>
-            <a:lstStyle/>
-            <a:p>
-              <a:pPr algn="ctr"/>
-              <a:r>
-                <a:rPr lang="en-US" sz="1600" dirty="0"/>
-                <a:t>Storage</a:t>
-              </a:r>
-            </a:p>
-          </p:txBody>
-        </p:sp>
-        <p:sp>
-          <p:nvSpPr>
-            <p:cNvPr id="102" name="Arrow: Up-Down 101">
-              <a:extLst>
-                <a:ext uri="{FF2B5EF4-FFF2-40B4-BE49-F238E27FC236}">
-                  <a16:creationId xmlns:a16="http://schemas.microsoft.com/office/drawing/2014/main" id="{71B423D7-64F6-4812-9757-3AC3C20951EC}"/>
-                </a:ext>
-              </a:extLst>
-            </p:cNvPr>
-            <p:cNvSpPr/>
-            <p:nvPr/>
-          </p:nvSpPr>
-          <p:spPr>
-            <a:xfrm>
-              <a:off x="10972800" y="3886200"/>
-              <a:ext cx="152400" cy="457200"/>
-            </a:xfrm>
-            <a:prstGeom prst="upDownArrow">
-              <a:avLst/>
-            </a:prstGeom>
-          </p:spPr>
-          <p:style>
-            <a:lnRef idx="1">
-              <a:schemeClr val="accent6"/>
-            </a:lnRef>
-            <a:fillRef idx="2">
-              <a:schemeClr val="accent6"/>
-            </a:fillRef>
-            <a:effectRef idx="1">
-              <a:schemeClr val="accent6"/>
-            </a:effectRef>
-            <a:fontRef idx="minor">
-              <a:schemeClr val="dk1"/>
-            </a:fontRef>
-          </p:style>
-          <p:txBody>
-            <a:bodyPr rtlCol="0" anchor="ctr"/>
-            <a:lstStyle/>
-            <a:p>
-              <a:pPr algn="ctr"/>
-              <a:endParaRPr lang="en-US"/>
-            </a:p>
-          </p:txBody>
-        </p:sp>
-      </p:grpSp>
-    </p:spTree>
-    <p:extLst>
-      <p:ext uri="{BB962C8B-B14F-4D97-AF65-F5344CB8AC3E}">
-        <p14:creationId xmlns:p14="http://schemas.microsoft.com/office/powerpoint/2010/main" val="1115738124"/>
-      </p:ext>
-    </p:extLst>
-  </p:cSld>
-  <p:clrMapOvr>
-    <a:masterClrMapping/>
-  </p:clrMapOvr>
-</p:sld>
-</file>
-
-<file path=ppt/slides/slide7.xml><?xml version="1.0" encoding="utf-8"?>
-<p:sld xmlns:a="http://schemas.openxmlformats.org/drawingml/2006/main" xmlns:r="http://schemas.openxmlformats.org/officeDocument/2006/relationships" xmlns:p="http://schemas.openxmlformats.org/presentationml/2006/main">
-  <p:cSld>
-    <p:spTree>
-      <p:nvGrpSpPr>
-        <p:cNvPr id="1" name=""/>
-        <p:cNvGrpSpPr/>
-        <p:nvPr/>
-      </p:nvGrpSpPr>
-      <p:grpSpPr>
-        <a:xfrm>
-          <a:off x="0" y="0"/>
-          <a:ext cx="0" cy="0"/>
-          <a:chOff x="0" y="0"/>
-          <a:chExt cx="0" cy="0"/>
-        </a:xfrm>
-      </p:grpSpPr>
       <p:grpSp>
         <p:nvGrpSpPr>
           <p:cNvPr id="129" name="Group 128">
@@ -19355,7 +16546,7 @@
 </p:sld>
 </file>
 
-<file path=ppt/slides/slide8.xml><?xml version="1.0" encoding="utf-8"?>
+<file path=ppt/slides/slide7.xml><?xml version="1.0" encoding="utf-8"?>
 <p:sld xmlns:a="http://schemas.openxmlformats.org/drawingml/2006/main" xmlns:r="http://schemas.openxmlformats.org/officeDocument/2006/relationships" xmlns:p="http://schemas.openxmlformats.org/presentationml/2006/main">
   <p:cSld>
     <p:spTree>
@@ -20297,7 +17488,7 @@
 </p:sld>
 </file>
 
-<file path=ppt/slides/slide9.xml><?xml version="1.0" encoding="utf-8"?>
+<file path=ppt/slides/slide8.xml><?xml version="1.0" encoding="utf-8"?>
 <p:sld xmlns:a="http://schemas.openxmlformats.org/drawingml/2006/main" xmlns:r="http://schemas.openxmlformats.org/officeDocument/2006/relationships" xmlns:p="http://schemas.openxmlformats.org/presentationml/2006/main">
   <p:cSld>
     <p:spTree>
@@ -21148,6 +18339,836 @@
     <p:extLst>
       <p:ext uri="{BB962C8B-B14F-4D97-AF65-F5344CB8AC3E}">
         <p14:creationId xmlns:p14="http://schemas.microsoft.com/office/powerpoint/2010/main" val="946192865"/>
+      </p:ext>
+    </p:extLst>
+  </p:cSld>
+  <p:clrMapOvr>
+    <a:masterClrMapping/>
+  </p:clrMapOvr>
+</p:sld>
+</file>
+
+<file path=ppt/slides/slide9.xml><?xml version="1.0" encoding="utf-8"?>
+<p:sld xmlns:a="http://schemas.openxmlformats.org/drawingml/2006/main" xmlns:r="http://schemas.openxmlformats.org/officeDocument/2006/relationships" xmlns:p="http://schemas.openxmlformats.org/presentationml/2006/main">
+  <p:cSld>
+    <p:spTree>
+      <p:nvGrpSpPr>
+        <p:cNvPr id="1" name=""/>
+        <p:cNvGrpSpPr/>
+        <p:nvPr/>
+      </p:nvGrpSpPr>
+      <p:grpSpPr>
+        <a:xfrm>
+          <a:off x="0" y="0"/>
+          <a:ext cx="0" cy="0"/>
+          <a:chOff x="0" y="0"/>
+          <a:chExt cx="0" cy="0"/>
+        </a:xfrm>
+      </p:grpSpPr>
+      <p:grpSp>
+        <p:nvGrpSpPr>
+          <p:cNvPr id="129" name="Group 128">
+            <a:extLst>
+              <a:ext uri="{FF2B5EF4-FFF2-40B4-BE49-F238E27FC236}">
+                <a16:creationId xmlns:a16="http://schemas.microsoft.com/office/drawing/2014/main" id="{356B809B-BA35-4556-BB35-55659A516358}"/>
+              </a:ext>
+            </a:extLst>
+          </p:cNvPr>
+          <p:cNvGrpSpPr/>
+          <p:nvPr/>
+        </p:nvGrpSpPr>
+        <p:grpSpPr>
+          <a:xfrm>
+            <a:off x="4419600" y="1676400"/>
+            <a:ext cx="3200400" cy="3581400"/>
+            <a:chOff x="4572000" y="1295400"/>
+            <a:chExt cx="3200400" cy="3581400"/>
+          </a:xfrm>
+        </p:grpSpPr>
+        <p:sp>
+          <p:nvSpPr>
+            <p:cNvPr id="130" name="Rectangle: Rounded Corners 129">
+              <a:extLst>
+                <a:ext uri="{FF2B5EF4-FFF2-40B4-BE49-F238E27FC236}">
+                  <a16:creationId xmlns:a16="http://schemas.microsoft.com/office/drawing/2014/main" id="{89235C4A-F9D8-49AA-A913-F22EAD967C99}"/>
+                </a:ext>
+              </a:extLst>
+            </p:cNvPr>
+            <p:cNvSpPr/>
+            <p:nvPr/>
+          </p:nvSpPr>
+          <p:spPr>
+            <a:xfrm>
+              <a:off x="4572000" y="1295400"/>
+              <a:ext cx="3200400" cy="3581400"/>
+            </a:xfrm>
+            <a:prstGeom prst="roundRect">
+              <a:avLst>
+                <a:gd name="adj" fmla="val 8929"/>
+              </a:avLst>
+            </a:prstGeom>
+          </p:spPr>
+          <p:style>
+            <a:lnRef idx="1">
+              <a:schemeClr val="accent3"/>
+            </a:lnRef>
+            <a:fillRef idx="2">
+              <a:schemeClr val="accent3"/>
+            </a:fillRef>
+            <a:effectRef idx="1">
+              <a:schemeClr val="accent3"/>
+            </a:effectRef>
+            <a:fontRef idx="minor">
+              <a:schemeClr val="dk1"/>
+            </a:fontRef>
+          </p:style>
+          <p:txBody>
+            <a:bodyPr tIns="0" rtlCol="0" anchor="t" anchorCtr="0"/>
+            <a:lstStyle/>
+            <a:p>
+              <a:pPr algn="ctr"/>
+              <a:r>
+                <a:rPr lang="en-US" sz="1600" dirty="0"/>
+                <a:t>Conversational app/bot</a:t>
+              </a:r>
+            </a:p>
+          </p:txBody>
+        </p:sp>
+        <p:sp>
+          <p:nvSpPr>
+            <p:cNvPr id="131" name="Rectangle: Rounded Corners 130">
+              <a:extLst>
+                <a:ext uri="{FF2B5EF4-FFF2-40B4-BE49-F238E27FC236}">
+                  <a16:creationId xmlns:a16="http://schemas.microsoft.com/office/drawing/2014/main" id="{42584972-E47C-4EF7-B731-52C7EA72326C}"/>
+                </a:ext>
+              </a:extLst>
+            </p:cNvPr>
+            <p:cNvSpPr/>
+            <p:nvPr/>
+          </p:nvSpPr>
+          <p:spPr>
+            <a:xfrm>
+              <a:off x="4724400" y="1752600"/>
+              <a:ext cx="2895600" cy="1295400"/>
+            </a:xfrm>
+            <a:prstGeom prst="roundRect">
+              <a:avLst/>
+            </a:prstGeom>
+          </p:spPr>
+          <p:style>
+            <a:lnRef idx="2">
+              <a:schemeClr val="accent1">
+                <a:shade val="50000"/>
+              </a:schemeClr>
+            </a:lnRef>
+            <a:fillRef idx="1">
+              <a:schemeClr val="accent1"/>
+            </a:fillRef>
+            <a:effectRef idx="0">
+              <a:schemeClr val="accent1"/>
+            </a:effectRef>
+            <a:fontRef idx="minor">
+              <a:schemeClr val="lt1"/>
+            </a:fontRef>
+          </p:style>
+          <p:txBody>
+            <a:bodyPr rtlCol="0" anchor="t"/>
+            <a:lstStyle/>
+            <a:p>
+              <a:pPr algn="ctr"/>
+              <a:r>
+                <a:rPr lang="en-US" sz="1600" dirty="0"/>
+                <a:t>Reasoning</a:t>
+              </a:r>
+            </a:p>
+          </p:txBody>
+        </p:sp>
+        <p:sp>
+          <p:nvSpPr>
+            <p:cNvPr id="132" name="Rectangle: Rounded Corners 131">
+              <a:extLst>
+                <a:ext uri="{FF2B5EF4-FFF2-40B4-BE49-F238E27FC236}">
+                  <a16:creationId xmlns:a16="http://schemas.microsoft.com/office/drawing/2014/main" id="{8C8EFF27-EE9D-4B8D-B864-4067D23B9A48}"/>
+                </a:ext>
+              </a:extLst>
+            </p:cNvPr>
+            <p:cNvSpPr/>
+            <p:nvPr/>
+          </p:nvSpPr>
+          <p:spPr>
+            <a:xfrm>
+              <a:off x="4876800" y="2286000"/>
+              <a:ext cx="1219200" cy="609600"/>
+            </a:xfrm>
+            <a:prstGeom prst="roundRect">
+              <a:avLst/>
+            </a:prstGeom>
+          </p:spPr>
+          <p:style>
+            <a:lnRef idx="2">
+              <a:schemeClr val="accent5">
+                <a:shade val="50000"/>
+              </a:schemeClr>
+            </a:lnRef>
+            <a:fillRef idx="1">
+              <a:schemeClr val="accent5"/>
+            </a:fillRef>
+            <a:effectRef idx="0">
+              <a:schemeClr val="accent5"/>
+            </a:effectRef>
+            <a:fontRef idx="minor">
+              <a:schemeClr val="lt1"/>
+            </a:fontRef>
+          </p:style>
+          <p:txBody>
+            <a:bodyPr rtlCol="0" anchor="t"/>
+            <a:lstStyle/>
+            <a:p>
+              <a:pPr algn="ctr"/>
+              <a:r>
+                <a:rPr lang="en-US" sz="1600" dirty="0"/>
+                <a:t>Input recognition</a:t>
+              </a:r>
+            </a:p>
+          </p:txBody>
+        </p:sp>
+        <p:sp>
+          <p:nvSpPr>
+            <p:cNvPr id="133" name="Rectangle: Rounded Corners 132">
+              <a:extLst>
+                <a:ext uri="{FF2B5EF4-FFF2-40B4-BE49-F238E27FC236}">
+                  <a16:creationId xmlns:a16="http://schemas.microsoft.com/office/drawing/2014/main" id="{05EA6A71-3ACD-4126-83FA-4E4939AD9B57}"/>
+                </a:ext>
+              </a:extLst>
+            </p:cNvPr>
+            <p:cNvSpPr/>
+            <p:nvPr/>
+          </p:nvSpPr>
+          <p:spPr>
+            <a:xfrm>
+              <a:off x="6248400" y="2286000"/>
+              <a:ext cx="1219200" cy="609600"/>
+            </a:xfrm>
+            <a:prstGeom prst="roundRect">
+              <a:avLst/>
+            </a:prstGeom>
+          </p:spPr>
+          <p:style>
+            <a:lnRef idx="2">
+              <a:schemeClr val="accent5">
+                <a:shade val="50000"/>
+              </a:schemeClr>
+            </a:lnRef>
+            <a:fillRef idx="1">
+              <a:schemeClr val="accent5"/>
+            </a:fillRef>
+            <a:effectRef idx="0">
+              <a:schemeClr val="accent5"/>
+            </a:effectRef>
+            <a:fontRef idx="minor">
+              <a:schemeClr val="lt1"/>
+            </a:fontRef>
+          </p:style>
+          <p:txBody>
+            <a:bodyPr rtlCol="0" anchor="t"/>
+            <a:lstStyle/>
+            <a:p>
+              <a:pPr algn="ctr"/>
+              <a:r>
+                <a:rPr lang="en-US" sz="1600" dirty="0"/>
+                <a:t>Response generation</a:t>
+              </a:r>
+            </a:p>
+          </p:txBody>
+        </p:sp>
+        <p:sp>
+          <p:nvSpPr>
+            <p:cNvPr id="134" name="Rectangle: Rounded Corners 133">
+              <a:extLst>
+                <a:ext uri="{FF2B5EF4-FFF2-40B4-BE49-F238E27FC236}">
+                  <a16:creationId xmlns:a16="http://schemas.microsoft.com/office/drawing/2014/main" id="{0BBB3841-FF12-4DAD-AF07-CFB6CFC7E749}"/>
+                </a:ext>
+              </a:extLst>
+            </p:cNvPr>
+            <p:cNvSpPr/>
+            <p:nvPr/>
+          </p:nvSpPr>
+          <p:spPr>
+            <a:xfrm>
+              <a:off x="4724400" y="3276600"/>
+              <a:ext cx="2895600" cy="609600"/>
+            </a:xfrm>
+            <a:prstGeom prst="roundRect">
+              <a:avLst/>
+            </a:prstGeom>
+          </p:spPr>
+          <p:style>
+            <a:lnRef idx="2">
+              <a:schemeClr val="accent1">
+                <a:shade val="50000"/>
+              </a:schemeClr>
+            </a:lnRef>
+            <a:fillRef idx="1">
+              <a:schemeClr val="accent1"/>
+            </a:fillRef>
+            <a:effectRef idx="0">
+              <a:schemeClr val="accent1"/>
+            </a:effectRef>
+            <a:fontRef idx="minor">
+              <a:schemeClr val="lt1"/>
+            </a:fontRef>
+          </p:style>
+          <p:txBody>
+            <a:bodyPr rtlCol="0" anchor="t"/>
+            <a:lstStyle/>
+            <a:p>
+              <a:pPr algn="ctr"/>
+              <a:r>
+                <a:rPr lang="en-US" sz="1600" dirty="0"/>
+                <a:t>Pipeline processing</a:t>
+              </a:r>
+            </a:p>
+          </p:txBody>
+        </p:sp>
+        <p:sp>
+          <p:nvSpPr>
+            <p:cNvPr id="135" name="Rectangle: Rounded Corners 134">
+              <a:extLst>
+                <a:ext uri="{FF2B5EF4-FFF2-40B4-BE49-F238E27FC236}">
+                  <a16:creationId xmlns:a16="http://schemas.microsoft.com/office/drawing/2014/main" id="{F926E1B4-F398-43FD-AD3A-F11DB165A314}"/>
+                </a:ext>
+              </a:extLst>
+            </p:cNvPr>
+            <p:cNvSpPr/>
+            <p:nvPr/>
+          </p:nvSpPr>
+          <p:spPr>
+            <a:xfrm>
+              <a:off x="4724400" y="4038600"/>
+              <a:ext cx="2895600" cy="609600"/>
+            </a:xfrm>
+            <a:prstGeom prst="roundRect">
+              <a:avLst/>
+            </a:prstGeom>
+          </p:spPr>
+          <p:style>
+            <a:lnRef idx="2">
+              <a:schemeClr val="accent1">
+                <a:shade val="50000"/>
+              </a:schemeClr>
+            </a:lnRef>
+            <a:fillRef idx="1">
+              <a:schemeClr val="accent1"/>
+            </a:fillRef>
+            <a:effectRef idx="0">
+              <a:schemeClr val="accent1"/>
+            </a:effectRef>
+            <a:fontRef idx="minor">
+              <a:schemeClr val="lt1"/>
+            </a:fontRef>
+          </p:style>
+          <p:txBody>
+            <a:bodyPr rtlCol="0" anchor="t"/>
+            <a:lstStyle/>
+            <a:p>
+              <a:pPr algn="ctr"/>
+              <a:r>
+                <a:rPr lang="en-US" sz="1600" dirty="0"/>
+                <a:t>Connectivity &amp; protocol</a:t>
+              </a:r>
+            </a:p>
+          </p:txBody>
+        </p:sp>
+        <p:cxnSp>
+          <p:nvCxnSpPr>
+            <p:cNvPr id="137" name="Straight Arrow Connector 136">
+              <a:extLst>
+                <a:ext uri="{FF2B5EF4-FFF2-40B4-BE49-F238E27FC236}">
+                  <a16:creationId xmlns:a16="http://schemas.microsoft.com/office/drawing/2014/main" id="{3EE5B8FC-E07C-4B97-BA6A-5F1D6EF8F035}"/>
+                </a:ext>
+              </a:extLst>
+            </p:cNvPr>
+            <p:cNvCxnSpPr>
+              <a:cxnSpLocks/>
+            </p:cNvCxnSpPr>
+            <p:nvPr/>
+          </p:nvCxnSpPr>
+          <p:spPr>
+            <a:xfrm>
+              <a:off x="6858000" y="3048000"/>
+              <a:ext cx="0" cy="228600"/>
+            </a:xfrm>
+            <a:prstGeom prst="straightConnector1">
+              <a:avLst/>
+            </a:prstGeom>
+            <a:ln>
+              <a:tailEnd type="triangle"/>
+            </a:ln>
+          </p:spPr>
+          <p:style>
+            <a:lnRef idx="1">
+              <a:schemeClr val="accent1"/>
+            </a:lnRef>
+            <a:fillRef idx="0">
+              <a:schemeClr val="accent1"/>
+            </a:fillRef>
+            <a:effectRef idx="0">
+              <a:schemeClr val="accent1"/>
+            </a:effectRef>
+            <a:fontRef idx="minor">
+              <a:schemeClr val="tx1"/>
+            </a:fontRef>
+          </p:style>
+        </p:cxnSp>
+        <p:cxnSp>
+          <p:nvCxnSpPr>
+            <p:cNvPr id="139" name="Straight Arrow Connector 138">
+              <a:extLst>
+                <a:ext uri="{FF2B5EF4-FFF2-40B4-BE49-F238E27FC236}">
+                  <a16:creationId xmlns:a16="http://schemas.microsoft.com/office/drawing/2014/main" id="{A4BE5A02-B2F7-4D9F-91B0-2D5E1E753EAF}"/>
+                </a:ext>
+              </a:extLst>
+            </p:cNvPr>
+            <p:cNvCxnSpPr>
+              <a:cxnSpLocks/>
+            </p:cNvCxnSpPr>
+            <p:nvPr/>
+          </p:nvCxnSpPr>
+          <p:spPr>
+            <a:xfrm>
+              <a:off x="6858000" y="3886200"/>
+              <a:ext cx="0" cy="152400"/>
+            </a:xfrm>
+            <a:prstGeom prst="straightConnector1">
+              <a:avLst/>
+            </a:prstGeom>
+            <a:ln>
+              <a:tailEnd type="triangle"/>
+            </a:ln>
+          </p:spPr>
+          <p:style>
+            <a:lnRef idx="1">
+              <a:schemeClr val="accent1"/>
+            </a:lnRef>
+            <a:fillRef idx="0">
+              <a:schemeClr val="accent1"/>
+            </a:fillRef>
+            <a:effectRef idx="0">
+              <a:schemeClr val="accent1"/>
+            </a:effectRef>
+            <a:fontRef idx="minor">
+              <a:schemeClr val="tx1"/>
+            </a:fontRef>
+          </p:style>
+        </p:cxnSp>
+        <p:cxnSp>
+          <p:nvCxnSpPr>
+            <p:cNvPr id="140" name="Straight Arrow Connector 139">
+              <a:extLst>
+                <a:ext uri="{FF2B5EF4-FFF2-40B4-BE49-F238E27FC236}">
+                  <a16:creationId xmlns:a16="http://schemas.microsoft.com/office/drawing/2014/main" id="{2CFCF0B8-2DC3-4B3E-AE1F-FC5A46CD9CAD}"/>
+                </a:ext>
+              </a:extLst>
+            </p:cNvPr>
+            <p:cNvCxnSpPr>
+              <a:cxnSpLocks/>
+            </p:cNvCxnSpPr>
+            <p:nvPr/>
+          </p:nvCxnSpPr>
+          <p:spPr>
+            <a:xfrm flipV="1">
+              <a:off x="5334000" y="3048000"/>
+              <a:ext cx="0" cy="228600"/>
+            </a:xfrm>
+            <a:prstGeom prst="straightConnector1">
+              <a:avLst/>
+            </a:prstGeom>
+            <a:ln>
+              <a:tailEnd type="triangle"/>
+            </a:ln>
+          </p:spPr>
+          <p:style>
+            <a:lnRef idx="1">
+              <a:schemeClr val="accent1"/>
+            </a:lnRef>
+            <a:fillRef idx="0">
+              <a:schemeClr val="accent1"/>
+            </a:fillRef>
+            <a:effectRef idx="0">
+              <a:schemeClr val="accent1"/>
+            </a:effectRef>
+            <a:fontRef idx="minor">
+              <a:schemeClr val="tx1"/>
+            </a:fontRef>
+          </p:style>
+        </p:cxnSp>
+        <p:cxnSp>
+          <p:nvCxnSpPr>
+            <p:cNvPr id="141" name="Straight Arrow Connector 140">
+              <a:extLst>
+                <a:ext uri="{FF2B5EF4-FFF2-40B4-BE49-F238E27FC236}">
+                  <a16:creationId xmlns:a16="http://schemas.microsoft.com/office/drawing/2014/main" id="{306C0A34-E4D6-4D69-B1E5-FF7409F1B7A9}"/>
+                </a:ext>
+              </a:extLst>
+            </p:cNvPr>
+            <p:cNvCxnSpPr>
+              <a:cxnSpLocks/>
+            </p:cNvCxnSpPr>
+            <p:nvPr/>
+          </p:nvCxnSpPr>
+          <p:spPr>
+            <a:xfrm flipV="1">
+              <a:off x="5334000" y="3886200"/>
+              <a:ext cx="0" cy="152400"/>
+            </a:xfrm>
+            <a:prstGeom prst="straightConnector1">
+              <a:avLst/>
+            </a:prstGeom>
+            <a:ln>
+              <a:tailEnd type="triangle"/>
+            </a:ln>
+          </p:spPr>
+          <p:style>
+            <a:lnRef idx="1">
+              <a:schemeClr val="accent1"/>
+            </a:lnRef>
+            <a:fillRef idx="0">
+              <a:schemeClr val="accent1"/>
+            </a:fillRef>
+            <a:effectRef idx="0">
+              <a:schemeClr val="accent1"/>
+            </a:effectRef>
+            <a:fontRef idx="minor">
+              <a:schemeClr val="tx1"/>
+            </a:fontRef>
+          </p:style>
+        </p:cxnSp>
+      </p:grpSp>
+      <p:sp>
+        <p:nvSpPr>
+          <p:cNvPr id="5" name="Rectangle 4">
+            <a:extLst>
+              <a:ext uri="{FF2B5EF4-FFF2-40B4-BE49-F238E27FC236}">
+                <a16:creationId xmlns:a16="http://schemas.microsoft.com/office/drawing/2014/main" id="{573EA52F-D524-4C1E-9EDD-5C835ABB67FA}"/>
+              </a:ext>
+            </a:extLst>
+          </p:cNvPr>
+          <p:cNvSpPr/>
+          <p:nvPr/>
+        </p:nvSpPr>
+        <p:spPr>
+          <a:xfrm>
+            <a:off x="1676400" y="5562600"/>
+            <a:ext cx="7315200" cy="304800"/>
+          </a:xfrm>
+          <a:prstGeom prst="rect">
+            <a:avLst/>
+          </a:prstGeom>
+        </p:spPr>
+        <p:style>
+          <a:lnRef idx="1">
+            <a:schemeClr val="accent3"/>
+          </a:lnRef>
+          <a:fillRef idx="2">
+            <a:schemeClr val="accent3"/>
+          </a:fillRef>
+          <a:effectRef idx="1">
+            <a:schemeClr val="accent3"/>
+          </a:effectRef>
+          <a:fontRef idx="minor">
+            <a:schemeClr val="dk1"/>
+          </a:fontRef>
+        </p:style>
+        <p:txBody>
+          <a:bodyPr rtlCol="0" anchor="ctr"/>
+          <a:lstStyle/>
+          <a:p>
+            <a:pPr algn="ctr"/>
+            <a:r>
+              <a:rPr lang="en-US" sz="1600" dirty="0"/>
+              <a:t>ABS or other first- or third-party systems</a:t>
+            </a:r>
+          </a:p>
+        </p:txBody>
+      </p:sp>
+      <p:sp>
+        <p:nvSpPr>
+          <p:cNvPr id="6" name="Arrow: Up-Down 5">
+            <a:extLst>
+              <a:ext uri="{FF2B5EF4-FFF2-40B4-BE49-F238E27FC236}">
+                <a16:creationId xmlns:a16="http://schemas.microsoft.com/office/drawing/2014/main" id="{13231FE1-172B-44FC-9001-33FE434547FD}"/>
+              </a:ext>
+            </a:extLst>
+          </p:cNvPr>
+          <p:cNvSpPr/>
+          <p:nvPr/>
+        </p:nvSpPr>
+        <p:spPr>
+          <a:xfrm>
+            <a:off x="5943600" y="5257800"/>
+            <a:ext cx="152400" cy="304800"/>
+          </a:xfrm>
+          <a:prstGeom prst="upDownArrow">
+            <a:avLst/>
+          </a:prstGeom>
+        </p:spPr>
+        <p:style>
+          <a:lnRef idx="1">
+            <a:schemeClr val="accent3"/>
+          </a:lnRef>
+          <a:fillRef idx="2">
+            <a:schemeClr val="accent3"/>
+          </a:fillRef>
+          <a:effectRef idx="1">
+            <a:schemeClr val="accent3"/>
+          </a:effectRef>
+          <a:fontRef idx="minor">
+            <a:schemeClr val="dk1"/>
+          </a:fontRef>
+        </p:style>
+        <p:txBody>
+          <a:bodyPr rtlCol="0" anchor="ctr"/>
+          <a:lstStyle/>
+          <a:p>
+            <a:pPr algn="ctr"/>
+            <a:endParaRPr lang="en-US"/>
+          </a:p>
+        </p:txBody>
+      </p:sp>
+      <p:sp>
+        <p:nvSpPr>
+          <p:cNvPr id="9" name="TextBox 8">
+            <a:extLst>
+              <a:ext uri="{FF2B5EF4-FFF2-40B4-BE49-F238E27FC236}">
+                <a16:creationId xmlns:a16="http://schemas.microsoft.com/office/drawing/2014/main" id="{53AEBA00-EE2A-4F06-8F20-9FA0AFE65284}"/>
+              </a:ext>
+            </a:extLst>
+          </p:cNvPr>
+          <p:cNvSpPr txBox="1"/>
+          <p:nvPr/>
+        </p:nvSpPr>
+        <p:spPr>
+          <a:xfrm>
+            <a:off x="609600" y="381000"/>
+            <a:ext cx="2590800" cy="400110"/>
+          </a:xfrm>
+          <a:prstGeom prst="rect">
+            <a:avLst/>
+          </a:prstGeom>
+          <a:noFill/>
+        </p:spPr>
+        <p:txBody>
+          <a:bodyPr wrap="square" rtlCol="0">
+            <a:spAutoFit/>
+          </a:bodyPr>
+          <a:lstStyle/>
+          <a:p>
+            <a:r>
+              <a:rPr lang="en-US" sz="2000" b="1" dirty="0"/>
+              <a:t>Dialogs library</a:t>
+            </a:r>
+          </a:p>
+        </p:txBody>
+      </p:sp>
+      <p:sp>
+        <p:nvSpPr>
+          <p:cNvPr id="16" name="Callout: Right Arrow 15">
+            <a:extLst>
+              <a:ext uri="{FF2B5EF4-FFF2-40B4-BE49-F238E27FC236}">
+                <a16:creationId xmlns:a16="http://schemas.microsoft.com/office/drawing/2014/main" id="{7EDACBF4-FF6B-4F44-B090-27D3185B84F1}"/>
+              </a:ext>
+            </a:extLst>
+          </p:cNvPr>
+          <p:cNvSpPr/>
+          <p:nvPr/>
+        </p:nvSpPr>
+        <p:spPr>
+          <a:xfrm>
+            <a:off x="1828800" y="2209800"/>
+            <a:ext cx="2743200" cy="914400"/>
+          </a:xfrm>
+          <a:prstGeom prst="rightArrowCallout">
+            <a:avLst>
+              <a:gd name="adj1" fmla="val 25000"/>
+              <a:gd name="adj2" fmla="val 25000"/>
+              <a:gd name="adj3" fmla="val 36250"/>
+              <a:gd name="adj4" fmla="val 64977"/>
+            </a:avLst>
+          </a:prstGeom>
+        </p:spPr>
+        <p:style>
+          <a:lnRef idx="2">
+            <a:schemeClr val="accent2">
+              <a:shade val="50000"/>
+            </a:schemeClr>
+          </a:lnRef>
+          <a:fillRef idx="1">
+            <a:schemeClr val="accent2"/>
+          </a:fillRef>
+          <a:effectRef idx="0">
+            <a:schemeClr val="accent2"/>
+          </a:effectRef>
+          <a:fontRef idx="minor">
+            <a:schemeClr val="lt1"/>
+          </a:fontRef>
+        </p:style>
+        <p:txBody>
+          <a:bodyPr rtlCol="0" anchor="ctr"/>
+          <a:lstStyle/>
+          <a:p>
+            <a:pPr marL="285750" indent="-285750" defTabSz="274320">
+              <a:buFont typeface="Arial" panose="020B0604020202020204" pitchFamily="34" charset="0"/>
+              <a:buChar char="•"/>
+            </a:pPr>
+            <a:r>
+              <a:rPr lang="en-US" sz="1200" dirty="0"/>
+              <a:t>Dialogs</a:t>
+            </a:r>
+          </a:p>
+          <a:p>
+            <a:pPr marL="285750" indent="-285750" defTabSz="274320">
+              <a:buFont typeface="Arial" panose="020B0604020202020204" pitchFamily="34" charset="0"/>
+              <a:buChar char="•"/>
+            </a:pPr>
+            <a:r>
+              <a:rPr lang="en-US" sz="1200" dirty="0" err="1"/>
+              <a:t>QnA</a:t>
+            </a:r>
+            <a:r>
+              <a:rPr lang="en-US" sz="1200" dirty="0"/>
+              <a:t> Maker dialog</a:t>
+            </a:r>
+          </a:p>
+          <a:p>
+            <a:pPr marL="285750" indent="-285750" defTabSz="274320">
+              <a:buFont typeface="Arial" panose="020B0604020202020204" pitchFamily="34" charset="0"/>
+              <a:buChar char="•"/>
+            </a:pPr>
+            <a:r>
+              <a:rPr lang="en-US" sz="1200" dirty="0"/>
+              <a:t>(Skills dialog)</a:t>
+            </a:r>
+          </a:p>
+        </p:txBody>
+      </p:sp>
+      <p:sp>
+        <p:nvSpPr>
+          <p:cNvPr id="2" name="Callout: Right Arrow 1">
+            <a:extLst>
+              <a:ext uri="{FF2B5EF4-FFF2-40B4-BE49-F238E27FC236}">
+                <a16:creationId xmlns:a16="http://schemas.microsoft.com/office/drawing/2014/main" id="{FB2CC90F-343C-4DD3-82D2-B556DF0CE6B9}"/>
+              </a:ext>
+            </a:extLst>
+          </p:cNvPr>
+          <p:cNvSpPr/>
+          <p:nvPr/>
+        </p:nvSpPr>
+        <p:spPr>
+          <a:xfrm>
+            <a:off x="1828800" y="3581400"/>
+            <a:ext cx="2743200" cy="609600"/>
+          </a:xfrm>
+          <a:prstGeom prst="rightArrowCallout">
+            <a:avLst>
+              <a:gd name="adj1" fmla="val 25000"/>
+              <a:gd name="adj2" fmla="val 25000"/>
+              <a:gd name="adj3" fmla="val 36250"/>
+              <a:gd name="adj4" fmla="val 64977"/>
+            </a:avLst>
+          </a:prstGeom>
+        </p:spPr>
+        <p:style>
+          <a:lnRef idx="2">
+            <a:schemeClr val="accent2">
+              <a:shade val="50000"/>
+            </a:schemeClr>
+          </a:lnRef>
+          <a:fillRef idx="1">
+            <a:schemeClr val="accent2"/>
+          </a:fillRef>
+          <a:effectRef idx="0">
+            <a:schemeClr val="accent2"/>
+          </a:effectRef>
+          <a:fontRef idx="minor">
+            <a:schemeClr val="lt1"/>
+          </a:fontRef>
+        </p:style>
+        <p:txBody>
+          <a:bodyPr rtlCol="0" anchor="ctr"/>
+          <a:lstStyle/>
+          <a:p>
+            <a:pPr marL="285750" indent="-285750" defTabSz="274320">
+              <a:buFont typeface="Arial" panose="020B0604020202020204" pitchFamily="34" charset="0"/>
+              <a:buChar char="•"/>
+            </a:pPr>
+            <a:r>
+              <a:rPr lang="en-US" sz="1200" dirty="0"/>
+              <a:t>Dialog state</a:t>
+            </a:r>
+          </a:p>
+        </p:txBody>
+      </p:sp>
+      <p:sp>
+        <p:nvSpPr>
+          <p:cNvPr id="3" name="Callout: Right Arrow 2">
+            <a:extLst>
+              <a:ext uri="{FF2B5EF4-FFF2-40B4-BE49-F238E27FC236}">
+                <a16:creationId xmlns:a16="http://schemas.microsoft.com/office/drawing/2014/main" id="{1B96634C-4C87-4A7D-BB6E-B6B2485A673B}"/>
+              </a:ext>
+            </a:extLst>
+          </p:cNvPr>
+          <p:cNvSpPr/>
+          <p:nvPr/>
+        </p:nvSpPr>
+        <p:spPr>
+          <a:xfrm>
+            <a:off x="1828800" y="4343400"/>
+            <a:ext cx="2743200" cy="609600"/>
+          </a:xfrm>
+          <a:prstGeom prst="rightArrowCallout">
+            <a:avLst>
+              <a:gd name="adj1" fmla="val 25000"/>
+              <a:gd name="adj2" fmla="val 25000"/>
+              <a:gd name="adj3" fmla="val 36250"/>
+              <a:gd name="adj4" fmla="val 64977"/>
+            </a:avLst>
+          </a:prstGeom>
+        </p:spPr>
+        <p:style>
+          <a:lnRef idx="2">
+            <a:schemeClr val="accent2">
+              <a:shade val="50000"/>
+            </a:schemeClr>
+          </a:lnRef>
+          <a:fillRef idx="1">
+            <a:schemeClr val="accent2"/>
+          </a:fillRef>
+          <a:effectRef idx="0">
+            <a:schemeClr val="accent2"/>
+          </a:effectRef>
+          <a:fontRef idx="minor">
+            <a:schemeClr val="lt1"/>
+          </a:fontRef>
+        </p:style>
+        <p:txBody>
+          <a:bodyPr rtlCol="0" anchor="ctr"/>
+          <a:lstStyle/>
+          <a:p>
+            <a:pPr marL="285750" indent="-285750" defTabSz="274320">
+              <a:buFont typeface="Arial" panose="020B0604020202020204" pitchFamily="34" charset="0"/>
+              <a:buChar char="•"/>
+            </a:pPr>
+            <a:r>
+              <a:rPr lang="en-US" sz="1200" dirty="0"/>
+              <a:t>Skills dialog</a:t>
+            </a:r>
+          </a:p>
+        </p:txBody>
+      </p:sp>
+    </p:spTree>
+    <p:extLst>
+      <p:ext uri="{BB962C8B-B14F-4D97-AF65-F5344CB8AC3E}">
+        <p14:creationId xmlns:p14="http://schemas.microsoft.com/office/powerpoint/2010/main" val="1386863386"/>
       </p:ext>
     </p:extLst>
   </p:cSld>

</xml_diff>

<commit_message>
Tweak what is a bot artwork to match surrounding text.
</commit_message>
<xml_diff>
--- a/art-source/power-point/architecture.pptx
+++ b/art-source/power-point/architecture.pptx
@@ -233,7 +233,7 @@
           <a:p>
             <a:fld id="{8571834C-5366-4363-9166-255623AAA58F}" type="datetimeFigureOut">
               <a:rPr lang="en-US" smtClean="0"/>
-              <a:t>9/14/2020</a:t>
+              <a:t>9/18/2020</a:t>
             </a:fld>
             <a:endParaRPr lang="en-US"/>
           </a:p>
@@ -642,7 +642,7 @@
           <a:p>
             <a:r>
               <a:rPr lang="en-US" dirty="0"/>
-              <a:t>How bots work</a:t>
+              <a:t>How bots work – basic bot</a:t>
             </a:r>
           </a:p>
         </p:txBody>
@@ -729,7 +729,94 @@
           <a:p>
             <a:r>
               <a:rPr lang="en-US" dirty="0"/>
-              <a:t>How bots work</a:t>
+              <a:t>Skills</a:t>
+            </a:r>
+          </a:p>
+        </p:txBody>
+      </p:sp>
+      <p:sp>
+        <p:nvSpPr>
+          <p:cNvPr id="4" name="Slide Number Placeholder 3"/>
+          <p:cNvSpPr>
+            <a:spLocks noGrp="1"/>
+          </p:cNvSpPr>
+          <p:nvPr>
+            <p:ph type="sldNum" sz="quarter" idx="5"/>
+          </p:nvPr>
+        </p:nvSpPr>
+        <p:spPr/>
+        <p:txBody>
+          <a:bodyPr/>
+          <a:lstStyle/>
+          <a:p>
+            <a:fld id="{1F7BDCF2-8FA5-4AA5-960D-EE86EC57324F}" type="slidenum">
+              <a:rPr lang="en-US" smtClean="0"/>
+              <a:t>3</a:t>
+            </a:fld>
+            <a:endParaRPr lang="en-US"/>
+          </a:p>
+        </p:txBody>
+      </p:sp>
+    </p:spTree>
+    <p:extLst>
+      <p:ext uri="{BB962C8B-B14F-4D97-AF65-F5344CB8AC3E}">
+        <p14:creationId xmlns:p14="http://schemas.microsoft.com/office/powerpoint/2010/main" val="2041840558"/>
+      </p:ext>
+    </p:extLst>
+  </p:cSld>
+  <p:clrMapOvr>
+    <a:masterClrMapping/>
+  </p:clrMapOvr>
+</p:notes>
+</file>
+
+<file path=ppt/notesSlides/notesSlide4.xml><?xml version="1.0" encoding="utf-8"?>
+<p:notes xmlns:a="http://schemas.openxmlformats.org/drawingml/2006/main" xmlns:r="http://schemas.openxmlformats.org/officeDocument/2006/relationships" xmlns:p="http://schemas.openxmlformats.org/presentationml/2006/main">
+  <p:cSld>
+    <p:spTree>
+      <p:nvGrpSpPr>
+        <p:cNvPr id="1" name=""/>
+        <p:cNvGrpSpPr/>
+        <p:nvPr/>
+      </p:nvGrpSpPr>
+      <p:grpSpPr>
+        <a:xfrm>
+          <a:off x="0" y="0"/>
+          <a:ext cx="0" cy="0"/>
+          <a:chOff x="0" y="0"/>
+          <a:chExt cx="0" cy="0"/>
+        </a:xfrm>
+      </p:grpSpPr>
+      <p:sp>
+        <p:nvSpPr>
+          <p:cNvPr id="2" name="Slide Image Placeholder 1"/>
+          <p:cNvSpPr>
+            <a:spLocks noGrp="1" noRot="1" noChangeAspect="1"/>
+          </p:cNvSpPr>
+          <p:nvPr>
+            <p:ph type="sldImg"/>
+          </p:nvPr>
+        </p:nvSpPr>
+        <p:spPr/>
+      </p:sp>
+      <p:sp>
+        <p:nvSpPr>
+          <p:cNvPr id="3" name="Notes Placeholder 2"/>
+          <p:cNvSpPr>
+            <a:spLocks noGrp="1"/>
+          </p:cNvSpPr>
+          <p:nvPr>
+            <p:ph type="body" idx="1"/>
+          </p:nvPr>
+        </p:nvSpPr>
+        <p:spPr/>
+        <p:txBody>
+          <a:bodyPr/>
+          <a:lstStyle/>
+          <a:p>
+            <a:r>
+              <a:rPr lang="en-US" dirty="0"/>
+              <a:t>Authentication</a:t>
             </a:r>
           </a:p>
         </p:txBody>
@@ -917,7 +1004,7 @@
           <a:p>
             <a:fld id="{CC8FB143-15DE-4420-B72D-ECFFB175310A}" type="datetimeFigureOut">
               <a:rPr lang="en-US" smtClean="0"/>
-              <a:t>9/14/2020</a:t>
+              <a:t>9/18/2020</a:t>
             </a:fld>
             <a:endParaRPr lang="en-US"/>
           </a:p>
@@ -1115,7 +1202,7 @@
           <a:p>
             <a:fld id="{CC8FB143-15DE-4420-B72D-ECFFB175310A}" type="datetimeFigureOut">
               <a:rPr lang="en-US" smtClean="0"/>
-              <a:t>9/14/2020</a:t>
+              <a:t>9/18/2020</a:t>
             </a:fld>
             <a:endParaRPr lang="en-US"/>
           </a:p>
@@ -1323,7 +1410,7 @@
           <a:p>
             <a:fld id="{CC8FB143-15DE-4420-B72D-ECFFB175310A}" type="datetimeFigureOut">
               <a:rPr lang="en-US" smtClean="0"/>
-              <a:t>9/14/2020</a:t>
+              <a:t>9/18/2020</a:t>
             </a:fld>
             <a:endParaRPr lang="en-US"/>
           </a:p>
@@ -1521,7 +1608,7 @@
           <a:p>
             <a:fld id="{CC8FB143-15DE-4420-B72D-ECFFB175310A}" type="datetimeFigureOut">
               <a:rPr lang="en-US" smtClean="0"/>
-              <a:t>9/14/2020</a:t>
+              <a:t>9/18/2020</a:t>
             </a:fld>
             <a:endParaRPr lang="en-US"/>
           </a:p>
@@ -1796,7 +1883,7 @@
           <a:p>
             <a:fld id="{CC8FB143-15DE-4420-B72D-ECFFB175310A}" type="datetimeFigureOut">
               <a:rPr lang="en-US" smtClean="0"/>
-              <a:t>9/14/2020</a:t>
+              <a:t>9/18/2020</a:t>
             </a:fld>
             <a:endParaRPr lang="en-US"/>
           </a:p>
@@ -2061,7 +2148,7 @@
           <a:p>
             <a:fld id="{CC8FB143-15DE-4420-B72D-ECFFB175310A}" type="datetimeFigureOut">
               <a:rPr lang="en-US" smtClean="0"/>
-              <a:t>9/14/2020</a:t>
+              <a:t>9/18/2020</a:t>
             </a:fld>
             <a:endParaRPr lang="en-US"/>
           </a:p>
@@ -2473,7 +2560,7 @@
           <a:p>
             <a:fld id="{CC8FB143-15DE-4420-B72D-ECFFB175310A}" type="datetimeFigureOut">
               <a:rPr lang="en-US" smtClean="0"/>
-              <a:t>9/14/2020</a:t>
+              <a:t>9/18/2020</a:t>
             </a:fld>
             <a:endParaRPr lang="en-US"/>
           </a:p>
@@ -2614,7 +2701,7 @@
           <a:p>
             <a:fld id="{CC8FB143-15DE-4420-B72D-ECFFB175310A}" type="datetimeFigureOut">
               <a:rPr lang="en-US" smtClean="0"/>
-              <a:t>9/14/2020</a:t>
+              <a:t>9/18/2020</a:t>
             </a:fld>
             <a:endParaRPr lang="en-US"/>
           </a:p>
@@ -2727,7 +2814,7 @@
           <a:p>
             <a:fld id="{CC8FB143-15DE-4420-B72D-ECFFB175310A}" type="datetimeFigureOut">
               <a:rPr lang="en-US" smtClean="0"/>
-              <a:t>9/14/2020</a:t>
+              <a:t>9/18/2020</a:t>
             </a:fld>
             <a:endParaRPr lang="en-US"/>
           </a:p>
@@ -3038,7 +3125,7 @@
           <a:p>
             <a:fld id="{CC8FB143-15DE-4420-B72D-ECFFB175310A}" type="datetimeFigureOut">
               <a:rPr lang="en-US" smtClean="0"/>
-              <a:t>9/14/2020</a:t>
+              <a:t>9/18/2020</a:t>
             </a:fld>
             <a:endParaRPr lang="en-US"/>
           </a:p>
@@ -3326,7 +3413,7 @@
           <a:p>
             <a:fld id="{CC8FB143-15DE-4420-B72D-ECFFB175310A}" type="datetimeFigureOut">
               <a:rPr lang="en-US" smtClean="0"/>
-              <a:t>9/14/2020</a:t>
+              <a:t>9/18/2020</a:t>
             </a:fld>
             <a:endParaRPr lang="en-US"/>
           </a:p>
@@ -3567,7 +3654,7 @@
           <a:p>
             <a:fld id="{CC8FB143-15DE-4420-B72D-ECFFB175310A}" type="datetimeFigureOut">
               <a:rPr lang="en-US" smtClean="0"/>
-              <a:t>9/14/2020</a:t>
+              <a:t>9/18/2020</a:t>
             </a:fld>
             <a:endParaRPr lang="en-US"/>
           </a:p>
@@ -4368,9 +4455,9 @@
         <p:grpSpPr>
           <a:xfrm>
             <a:off x="1371600" y="1143000"/>
-            <a:ext cx="3962400" cy="1828800"/>
+            <a:ext cx="3200400" cy="1828800"/>
             <a:chOff x="6705600" y="838200"/>
-            <a:chExt cx="3962400" cy="1828800"/>
+            <a:chExt cx="3200400" cy="1828800"/>
           </a:xfrm>
         </p:grpSpPr>
         <p:sp>
@@ -4654,53 +4741,6 @@
         </p:cxnSp>
         <p:sp>
           <p:nvSpPr>
-            <p:cNvPr id="15" name="Cylinder 14">
-              <a:extLst>
-                <a:ext uri="{FF2B5EF4-FFF2-40B4-BE49-F238E27FC236}">
-                  <a16:creationId xmlns:a16="http://schemas.microsoft.com/office/drawing/2014/main" id="{07E8D820-EDF6-48D6-A1BE-B682A6288B86}"/>
-                </a:ext>
-              </a:extLst>
-            </p:cNvPr>
-            <p:cNvSpPr/>
-            <p:nvPr/>
-          </p:nvSpPr>
-          <p:spPr>
-            <a:xfrm>
-              <a:off x="9906000" y="1447800"/>
-              <a:ext cx="762000" cy="609600"/>
-            </a:xfrm>
-            <a:prstGeom prst="can">
-              <a:avLst/>
-            </a:prstGeom>
-          </p:spPr>
-          <p:style>
-            <a:lnRef idx="1">
-              <a:schemeClr val="accent3"/>
-            </a:lnRef>
-            <a:fillRef idx="2">
-              <a:schemeClr val="accent3"/>
-            </a:fillRef>
-            <a:effectRef idx="1">
-              <a:schemeClr val="accent3"/>
-            </a:effectRef>
-            <a:fontRef idx="minor">
-              <a:schemeClr val="dk1"/>
-            </a:fontRef>
-          </p:style>
-          <p:txBody>
-            <a:bodyPr rtlCol="0" anchor="ctr"/>
-            <a:lstStyle/>
-            <a:p>
-              <a:pPr algn="ctr"/>
-              <a:r>
-                <a:rPr lang="en-US" sz="1200" dirty="0"/>
-                <a:t>Storage</a:t>
-              </a:r>
-            </a:p>
-          </p:txBody>
-        </p:sp>
-        <p:sp>
-          <p:nvSpPr>
             <p:cNvPr id="17" name="Arrow: Left-Right 16">
               <a:extLst>
                 <a:ext uri="{FF2B5EF4-FFF2-40B4-BE49-F238E27FC236}">
@@ -4744,6 +4784,53 @@
           </p:txBody>
         </p:sp>
       </p:grpSp>
+      <p:sp>
+        <p:nvSpPr>
+          <p:cNvPr id="2" name="Rectangle: Rounded Corners 1">
+            <a:extLst>
+              <a:ext uri="{FF2B5EF4-FFF2-40B4-BE49-F238E27FC236}">
+                <a16:creationId xmlns:a16="http://schemas.microsoft.com/office/drawing/2014/main" id="{789AB2E7-B7DB-4AB9-ABC8-443119A7BC3C}"/>
+              </a:ext>
+            </a:extLst>
+          </p:cNvPr>
+          <p:cNvSpPr/>
+          <p:nvPr/>
+        </p:nvSpPr>
+        <p:spPr>
+          <a:xfrm>
+            <a:off x="4572000" y="1600200"/>
+            <a:ext cx="914400" cy="914400"/>
+          </a:xfrm>
+          <a:prstGeom prst="roundRect">
+            <a:avLst/>
+          </a:prstGeom>
+        </p:spPr>
+        <p:style>
+          <a:lnRef idx="1">
+            <a:schemeClr val="accent3"/>
+          </a:lnRef>
+          <a:fillRef idx="2">
+            <a:schemeClr val="accent3"/>
+          </a:fillRef>
+          <a:effectRef idx="1">
+            <a:schemeClr val="accent3"/>
+          </a:effectRef>
+          <a:fontRef idx="minor">
+            <a:schemeClr val="dk1"/>
+          </a:fontRef>
+        </p:style>
+        <p:txBody>
+          <a:bodyPr rtlCol="0" anchor="t"/>
+          <a:lstStyle/>
+          <a:p>
+            <a:pPr algn="ctr"/>
+            <a:r>
+              <a:rPr lang="en-US" sz="1200" dirty="0"/>
+              <a:t>Other services</a:t>
+            </a:r>
+          </a:p>
+        </p:txBody>
+      </p:sp>
     </p:spTree>
     <p:extLst>
       <p:ext uri="{BB962C8B-B14F-4D97-AF65-F5344CB8AC3E}">
@@ -9214,10 +9301,10 @@
         </p:nvGrpSpPr>
         <p:grpSpPr>
           <a:xfrm>
-            <a:off x="4876800" y="685800"/>
-            <a:ext cx="2895600" cy="2895600"/>
-            <a:chOff x="4724400" y="1447800"/>
-            <a:chExt cx="2895600" cy="2895600"/>
+            <a:off x="4876800" y="838200"/>
+            <a:ext cx="2895600" cy="2743200"/>
+            <a:chOff x="4724400" y="1600200"/>
+            <a:chExt cx="2895600" cy="2743200"/>
           </a:xfrm>
         </p:grpSpPr>
         <p:sp>
@@ -9234,8 +9321,8 @@
           </p:nvSpPr>
           <p:spPr>
             <a:xfrm>
-              <a:off x="4724400" y="1447800"/>
-              <a:ext cx="2895600" cy="2895600"/>
+              <a:off x="4724400" y="1600200"/>
+              <a:ext cx="2895600" cy="2743200"/>
             </a:xfrm>
             <a:prstGeom prst="roundRect">
               <a:avLst>
@@ -11846,8 +11933,8 @@
         </p:nvSpPr>
         <p:spPr>
           <a:xfrm>
-            <a:off x="1676400" y="4038600"/>
-            <a:ext cx="7315200" cy="304800"/>
+            <a:off x="1981200" y="4038600"/>
+            <a:ext cx="7010400" cy="304800"/>
           </a:xfrm>
           <a:prstGeom prst="rect">
             <a:avLst/>
@@ -12072,10 +12159,10 @@
         </p:nvGrpSpPr>
         <p:grpSpPr>
           <a:xfrm>
-            <a:off x="4876800" y="685800"/>
-            <a:ext cx="2895600" cy="2895600"/>
-            <a:chOff x="4724400" y="1447800"/>
-            <a:chExt cx="2895600" cy="2895600"/>
+            <a:off x="4876800" y="838200"/>
+            <a:ext cx="2895600" cy="2743200"/>
+            <a:chOff x="4724400" y="1600200"/>
+            <a:chExt cx="2895600" cy="2743200"/>
           </a:xfrm>
         </p:grpSpPr>
         <p:sp>
@@ -12092,8 +12179,8 @@
           </p:nvSpPr>
           <p:spPr>
             <a:xfrm>
-              <a:off x="4724400" y="1447800"/>
-              <a:ext cx="2895600" cy="2895600"/>
+              <a:off x="4724400" y="1600200"/>
+              <a:ext cx="2895600" cy="2743200"/>
             </a:xfrm>
             <a:prstGeom prst="roundRect">
               <a:avLst>
@@ -12756,8 +12843,8 @@
         </p:nvSpPr>
         <p:spPr>
           <a:xfrm>
-            <a:off x="1981200" y="2209800"/>
-            <a:ext cx="1066800" cy="1219200"/>
+            <a:off x="2286000" y="2514600"/>
+            <a:ext cx="914400" cy="914400"/>
           </a:xfrm>
           <a:prstGeom prst="roundRect">
             <a:avLst/>
@@ -12803,8 +12890,8 @@
         </p:nvSpPr>
         <p:spPr>
           <a:xfrm>
-            <a:off x="3352800" y="2209800"/>
-            <a:ext cx="1066800" cy="1219200"/>
+            <a:off x="3505200" y="2514600"/>
+            <a:ext cx="914400" cy="914400"/>
           </a:xfrm>
           <a:prstGeom prst="roundRect">
             <a:avLst/>
@@ -12850,7 +12937,7 @@
         </p:nvSpPr>
         <p:spPr>
           <a:xfrm>
-            <a:off x="3810000" y="3429000"/>
+            <a:off x="3886200" y="3429000"/>
             <a:ext cx="152400" cy="609600"/>
           </a:xfrm>
           <a:prstGeom prst="upDownArrow">
@@ -12894,7 +12981,7 @@
         </p:nvSpPr>
         <p:spPr>
           <a:xfrm>
-            <a:off x="2438400" y="3429000"/>
+            <a:off x="2667000" y="3429000"/>
             <a:ext cx="152400" cy="609600"/>
           </a:xfrm>
           <a:prstGeom prst="upDownArrow">
@@ -12924,49 +13011,50 @@
           </a:p>
         </p:txBody>
       </p:sp>
-      <p:cxnSp>
-        <p:nvCxnSpPr>
-          <p:cNvPr id="7" name="Straight Connector 6">
+      <p:sp>
+        <p:nvSpPr>
+          <p:cNvPr id="12" name="Arrow: Left-Right 11">
             <a:extLst>
               <a:ext uri="{FF2B5EF4-FFF2-40B4-BE49-F238E27FC236}">
-                <a16:creationId xmlns:a16="http://schemas.microsoft.com/office/drawing/2014/main" id="{BEEAAD4F-D549-49E3-A7CC-9CCE78DD0E97}"/>
+                <a16:creationId xmlns:a16="http://schemas.microsoft.com/office/drawing/2014/main" id="{0476F436-D4C3-42B2-84D5-CDC887019B7B}"/>
               </a:ext>
             </a:extLst>
           </p:cNvPr>
-          <p:cNvCxnSpPr>
-            <a:cxnSpLocks/>
-            <a:stCxn id="2" idx="3"/>
-            <a:endCxn id="3" idx="1"/>
-          </p:cNvCxnSpPr>
+          <p:cNvSpPr/>
           <p:nvPr/>
-        </p:nvCxnSpPr>
+        </p:nvSpPr>
         <p:spPr>
           <a:xfrm>
-            <a:off x="3048000" y="2819400"/>
-            <a:ext cx="304800" cy="0"/>
+            <a:off x="3200400" y="2895600"/>
+            <a:ext cx="304800" cy="152400"/>
           </a:xfrm>
-          <a:prstGeom prst="line">
+          <a:prstGeom prst="leftRightArrow">
             <a:avLst/>
           </a:prstGeom>
-          <a:ln w="12700">
-            <a:prstDash val="sysDash"/>
-          </a:ln>
         </p:spPr>
         <p:style>
           <a:lnRef idx="1">
-            <a:schemeClr val="accent1"/>
+            <a:schemeClr val="accent3"/>
           </a:lnRef>
-          <a:fillRef idx="0">
-            <a:schemeClr val="accent1"/>
+          <a:fillRef idx="2">
+            <a:schemeClr val="accent3"/>
           </a:fillRef>
-          <a:effectRef idx="0">
-            <a:schemeClr val="accent1"/>
+          <a:effectRef idx="1">
+            <a:schemeClr val="accent3"/>
           </a:effectRef>
           <a:fontRef idx="minor">
-            <a:schemeClr val="tx1"/>
+            <a:schemeClr val="dk1"/>
           </a:fontRef>
         </p:style>
-      </p:cxnSp>
+        <p:txBody>
+          <a:bodyPr rtlCol="0" anchor="ctr"/>
+          <a:lstStyle/>
+          <a:p>
+            <a:pPr algn="ctr"/>
+            <a:endParaRPr lang="en-US"/>
+          </a:p>
+        </p:txBody>
+      </p:sp>
     </p:spTree>
     <p:extLst>
       <p:ext uri="{BB962C8B-B14F-4D97-AF65-F5344CB8AC3E}">

</xml_diff>

<commit_message>
Small images changes and edits
</commit_message>
<xml_diff>
--- a/art-source/power-point/architecture.pptx
+++ b/art-source/power-point/architecture.pptx
@@ -233,7 +233,7 @@
           <a:p>
             <a:fld id="{8571834C-5366-4363-9166-255623AAA58F}" type="datetimeFigureOut">
               <a:rPr lang="en-US" smtClean="0"/>
-              <a:t>9/18/2020</a:t>
+              <a:t>10/5/2020</a:t>
             </a:fld>
             <a:endParaRPr lang="en-US"/>
           </a:p>
@@ -1004,7 +1004,7 @@
           <a:p>
             <a:fld id="{CC8FB143-15DE-4420-B72D-ECFFB175310A}" type="datetimeFigureOut">
               <a:rPr lang="en-US" smtClean="0"/>
-              <a:t>9/18/2020</a:t>
+              <a:t>10/5/2020</a:t>
             </a:fld>
             <a:endParaRPr lang="en-US"/>
           </a:p>
@@ -1202,7 +1202,7 @@
           <a:p>
             <a:fld id="{CC8FB143-15DE-4420-B72D-ECFFB175310A}" type="datetimeFigureOut">
               <a:rPr lang="en-US" smtClean="0"/>
-              <a:t>9/18/2020</a:t>
+              <a:t>10/5/2020</a:t>
             </a:fld>
             <a:endParaRPr lang="en-US"/>
           </a:p>
@@ -1410,7 +1410,7 @@
           <a:p>
             <a:fld id="{CC8FB143-15DE-4420-B72D-ECFFB175310A}" type="datetimeFigureOut">
               <a:rPr lang="en-US" smtClean="0"/>
-              <a:t>9/18/2020</a:t>
+              <a:t>10/5/2020</a:t>
             </a:fld>
             <a:endParaRPr lang="en-US"/>
           </a:p>
@@ -1608,7 +1608,7 @@
           <a:p>
             <a:fld id="{CC8FB143-15DE-4420-B72D-ECFFB175310A}" type="datetimeFigureOut">
               <a:rPr lang="en-US" smtClean="0"/>
-              <a:t>9/18/2020</a:t>
+              <a:t>10/5/2020</a:t>
             </a:fld>
             <a:endParaRPr lang="en-US"/>
           </a:p>
@@ -1883,7 +1883,7 @@
           <a:p>
             <a:fld id="{CC8FB143-15DE-4420-B72D-ECFFB175310A}" type="datetimeFigureOut">
               <a:rPr lang="en-US" smtClean="0"/>
-              <a:t>9/18/2020</a:t>
+              <a:t>10/5/2020</a:t>
             </a:fld>
             <a:endParaRPr lang="en-US"/>
           </a:p>
@@ -2148,7 +2148,7 @@
           <a:p>
             <a:fld id="{CC8FB143-15DE-4420-B72D-ECFFB175310A}" type="datetimeFigureOut">
               <a:rPr lang="en-US" smtClean="0"/>
-              <a:t>9/18/2020</a:t>
+              <a:t>10/5/2020</a:t>
             </a:fld>
             <a:endParaRPr lang="en-US"/>
           </a:p>
@@ -2560,7 +2560,7 @@
           <a:p>
             <a:fld id="{CC8FB143-15DE-4420-B72D-ECFFB175310A}" type="datetimeFigureOut">
               <a:rPr lang="en-US" smtClean="0"/>
-              <a:t>9/18/2020</a:t>
+              <a:t>10/5/2020</a:t>
             </a:fld>
             <a:endParaRPr lang="en-US"/>
           </a:p>
@@ -2701,7 +2701,7 @@
           <a:p>
             <a:fld id="{CC8FB143-15DE-4420-B72D-ECFFB175310A}" type="datetimeFigureOut">
               <a:rPr lang="en-US" smtClean="0"/>
-              <a:t>9/18/2020</a:t>
+              <a:t>10/5/2020</a:t>
             </a:fld>
             <a:endParaRPr lang="en-US"/>
           </a:p>
@@ -2814,7 +2814,7 @@
           <a:p>
             <a:fld id="{CC8FB143-15DE-4420-B72D-ECFFB175310A}" type="datetimeFigureOut">
               <a:rPr lang="en-US" smtClean="0"/>
-              <a:t>9/18/2020</a:t>
+              <a:t>10/5/2020</a:t>
             </a:fld>
             <a:endParaRPr lang="en-US"/>
           </a:p>
@@ -3125,7 +3125,7 @@
           <a:p>
             <a:fld id="{CC8FB143-15DE-4420-B72D-ECFFB175310A}" type="datetimeFigureOut">
               <a:rPr lang="en-US" smtClean="0"/>
-              <a:t>9/18/2020</a:t>
+              <a:t>10/5/2020</a:t>
             </a:fld>
             <a:endParaRPr lang="en-US"/>
           </a:p>
@@ -3413,7 +3413,7 @@
           <a:p>
             <a:fld id="{CC8FB143-15DE-4420-B72D-ECFFB175310A}" type="datetimeFigureOut">
               <a:rPr lang="en-US" smtClean="0"/>
-              <a:t>9/18/2020</a:t>
+              <a:t>10/5/2020</a:t>
             </a:fld>
             <a:endParaRPr lang="en-US"/>
           </a:p>
@@ -3654,7 +3654,7 @@
           <a:p>
             <a:fld id="{CC8FB143-15DE-4420-B72D-ECFFB175310A}" type="datetimeFigureOut">
               <a:rPr lang="en-US" smtClean="0"/>
-              <a:t>9/18/2020</a:t>
+              <a:t>10/5/2020</a:t>
             </a:fld>
             <a:endParaRPr lang="en-US"/>
           </a:p>
@@ -4085,7 +4085,7 @@
         </p:nvSpPr>
         <p:spPr>
           <a:xfrm>
-            <a:off x="3048000" y="2971800"/>
+            <a:off x="3352800" y="2667000"/>
             <a:ext cx="304800" cy="609600"/>
           </a:xfrm>
           <a:prstGeom prst="downArrow">
@@ -4129,7 +4129,7 @@
         </p:nvSpPr>
         <p:spPr>
           <a:xfrm rot="10800000">
-            <a:off x="1981200" y="2971800"/>
+            <a:off x="2286000" y="2667000"/>
             <a:ext cx="304800" cy="609600"/>
           </a:xfrm>
           <a:prstGeom prst="downArrow">
@@ -4159,12 +4159,58 @@
           </a:p>
         </p:txBody>
       </p:sp>
+      <p:sp>
+        <p:nvSpPr>
+          <p:cNvPr id="23" name="Rectangle: Rounded Corners 22">
+            <a:extLst>
+              <a:ext uri="{FF2B5EF4-FFF2-40B4-BE49-F238E27FC236}">
+                <a16:creationId xmlns:a16="http://schemas.microsoft.com/office/drawing/2014/main" id="{73EEAE0C-8A7E-4EAF-924C-BA8121343FDC}"/>
+              </a:ext>
+            </a:extLst>
+          </p:cNvPr>
+          <p:cNvSpPr/>
+          <p:nvPr/>
+        </p:nvSpPr>
+        <p:spPr>
+          <a:xfrm>
+            <a:off x="1981200" y="3276600"/>
+            <a:ext cx="1981200" cy="1524000"/>
+          </a:xfrm>
+          <a:prstGeom prst="roundRect">
+            <a:avLst/>
+          </a:prstGeom>
+        </p:spPr>
+        <p:style>
+          <a:lnRef idx="1">
+            <a:schemeClr val="accent3"/>
+          </a:lnRef>
+          <a:fillRef idx="2">
+            <a:schemeClr val="accent3"/>
+          </a:fillRef>
+          <a:effectRef idx="1">
+            <a:schemeClr val="accent3"/>
+          </a:effectRef>
+          <a:fontRef idx="minor">
+            <a:schemeClr val="dk1"/>
+          </a:fontRef>
+        </p:style>
+        <p:txBody>
+          <a:bodyPr rtlCol="0" anchor="t"/>
+          <a:lstStyle/>
+          <a:p>
+            <a:r>
+              <a:rPr lang="en-US" sz="1200" dirty="0"/>
+              <a:t>Device/Channel</a:t>
+            </a:r>
+          </a:p>
+        </p:txBody>
+      </p:sp>
       <p:grpSp>
         <p:nvGrpSpPr>
-          <p:cNvPr id="47" name="Group 46">
+          <p:cNvPr id="27" name="Group 26">
             <a:extLst>
               <a:ext uri="{FF2B5EF4-FFF2-40B4-BE49-F238E27FC236}">
-                <a16:creationId xmlns:a16="http://schemas.microsoft.com/office/drawing/2014/main" id="{D8D410C7-183D-47C6-830B-CC180E501B26}"/>
+                <a16:creationId xmlns:a16="http://schemas.microsoft.com/office/drawing/2014/main" id="{77C28C09-1CE3-4946-B1E5-F43E54F55180}"/>
               </a:ext>
             </a:extLst>
           </p:cNvPr>
@@ -4173,18 +4219,21 @@
         </p:nvGrpSpPr>
         <p:grpSpPr>
           <a:xfrm>
-            <a:off x="1676400" y="3581400"/>
-            <a:ext cx="1981202" cy="1524000"/>
-            <a:chOff x="6705599" y="3276600"/>
-            <a:chExt cx="1981202" cy="1524000"/>
+            <a:off x="3200398" y="3733799"/>
+            <a:ext cx="914402" cy="914401"/>
+            <a:chOff x="6913416" y="4495803"/>
+            <a:chExt cx="831277" cy="798026"/>
           </a:xfrm>
+          <a:solidFill>
+            <a:schemeClr val="bg1"/>
+          </a:solidFill>
         </p:grpSpPr>
         <p:sp>
           <p:nvSpPr>
-            <p:cNvPr id="23" name="Rectangle: Rounded Corners 22">
+            <p:cNvPr id="28" name="Rectangle: Rounded Corners 27">
               <a:extLst>
                 <a:ext uri="{FF2B5EF4-FFF2-40B4-BE49-F238E27FC236}">
-                  <a16:creationId xmlns:a16="http://schemas.microsoft.com/office/drawing/2014/main" id="{73EEAE0C-8A7E-4EAF-924C-BA8121343FDC}"/>
+                  <a16:creationId xmlns:a16="http://schemas.microsoft.com/office/drawing/2014/main" id="{C1C8F575-06DF-481B-BF11-C59CF360DDDA}"/>
                 </a:ext>
               </a:extLst>
             </p:cNvPr>
@@ -4193,44 +4242,52 @@
           </p:nvSpPr>
           <p:spPr>
             <a:xfrm>
-              <a:off x="6705599" y="3276600"/>
-              <a:ext cx="1828801" cy="1524000"/>
+              <a:off x="6913428" y="4495803"/>
+              <a:ext cx="831264" cy="266009"/>
             </a:xfrm>
             <a:prstGeom prst="roundRect">
               <a:avLst/>
             </a:prstGeom>
+            <a:grpFill/>
           </p:spPr>
           <p:style>
-            <a:lnRef idx="1">
-              <a:schemeClr val="accent3"/>
+            <a:lnRef idx="2">
+              <a:schemeClr val="accent3">
+                <a:shade val="50000"/>
+              </a:schemeClr>
             </a:lnRef>
-            <a:fillRef idx="2">
+            <a:fillRef idx="1">
               <a:schemeClr val="accent3"/>
             </a:fillRef>
-            <a:effectRef idx="1">
+            <a:effectRef idx="0">
               <a:schemeClr val="accent3"/>
             </a:effectRef>
             <a:fontRef idx="minor">
-              <a:schemeClr val="dk1"/>
+              <a:schemeClr val="lt1"/>
             </a:fontRef>
           </p:style>
           <p:txBody>
-            <a:bodyPr rtlCol="0" anchor="t"/>
+            <a:bodyPr rtlCol="0" anchor="ctr"/>
             <a:lstStyle/>
             <a:p>
+              <a:pPr algn="ctr"/>
               <a:r>
-                <a:rPr lang="en-US" sz="1200" dirty="0"/>
-                <a:t>Device/Channel</a:t>
+                <a:rPr lang="en-US" sz="1200" dirty="0">
+                  <a:solidFill>
+                    <a:schemeClr val="tx1"/>
+                  </a:solidFill>
+                </a:rPr>
+                <a:t>Text</a:t>
               </a:r>
             </a:p>
           </p:txBody>
         </p:sp>
         <p:sp>
           <p:nvSpPr>
-            <p:cNvPr id="25" name="Rectangle: Rounded Corners 24">
+            <p:cNvPr id="29" name="Rectangle: Rounded Corners 28">
               <a:extLst>
                 <a:ext uri="{FF2B5EF4-FFF2-40B4-BE49-F238E27FC236}">
-                  <a16:creationId xmlns:a16="http://schemas.microsoft.com/office/drawing/2014/main" id="{5C856818-286B-4C67-94A8-048B9CA4BC76}"/>
+                  <a16:creationId xmlns:a16="http://schemas.microsoft.com/office/drawing/2014/main" id="{F5AAACC3-6334-4219-B821-40C7910B6ACD}"/>
                 </a:ext>
               </a:extLst>
             </p:cNvPr>
@@ -4239,206 +4296,100 @@
           </p:nvSpPr>
           <p:spPr>
             <a:xfrm>
-              <a:off x="7924799" y="3733800"/>
-              <a:ext cx="762002" cy="914400"/>
+              <a:off x="6913416" y="4761811"/>
+              <a:ext cx="831274" cy="266009"/>
             </a:xfrm>
             <a:prstGeom prst="roundRect">
               <a:avLst/>
             </a:prstGeom>
+            <a:grpFill/>
           </p:spPr>
           <p:style>
             <a:lnRef idx="2">
-              <a:schemeClr val="dk1"/>
+              <a:schemeClr val="accent3">
+                <a:shade val="50000"/>
+              </a:schemeClr>
             </a:lnRef>
             <a:fillRef idx="1">
-              <a:schemeClr val="lt1"/>
+              <a:schemeClr val="accent3"/>
             </a:fillRef>
             <a:effectRef idx="0">
-              <a:schemeClr val="dk1"/>
+              <a:schemeClr val="accent3"/>
             </a:effectRef>
             <a:fontRef idx="minor">
-              <a:schemeClr val="dk1"/>
+              <a:schemeClr val="lt1"/>
             </a:fontRef>
           </p:style>
           <p:txBody>
-            <a:bodyPr rtlCol="0" anchor="t"/>
+            <a:bodyPr rtlCol="0" anchor="ctr"/>
             <a:lstStyle/>
             <a:p>
+              <a:pPr algn="ctr"/>
               <a:r>
-                <a:rPr lang="en-US" sz="1200" dirty="0"/>
-                <a:t>User</a:t>
+                <a:rPr lang="en-US" sz="1200" dirty="0">
+                  <a:solidFill>
+                    <a:schemeClr val="tx1"/>
+                  </a:solidFill>
+                </a:rPr>
+                <a:t>Audio</a:t>
               </a:r>
             </a:p>
           </p:txBody>
         </p:sp>
-        <p:grpSp>
-          <p:nvGrpSpPr>
-            <p:cNvPr id="27" name="Group 26">
+        <p:sp>
+          <p:nvSpPr>
+            <p:cNvPr id="30" name="Rectangle: Rounded Corners 29">
               <a:extLst>
                 <a:ext uri="{FF2B5EF4-FFF2-40B4-BE49-F238E27FC236}">
-                  <a16:creationId xmlns:a16="http://schemas.microsoft.com/office/drawing/2014/main" id="{77C28C09-1CE3-4946-B1E5-F43E54F55180}"/>
+                  <a16:creationId xmlns:a16="http://schemas.microsoft.com/office/drawing/2014/main" id="{AFEDC236-3892-4FE7-80EF-49899F251EAD}"/>
                 </a:ext>
               </a:extLst>
             </p:cNvPr>
-            <p:cNvGrpSpPr/>
+            <p:cNvSpPr/>
             <p:nvPr/>
-          </p:nvGrpSpPr>
-          <p:grpSpPr>
+          </p:nvSpPr>
+          <p:spPr>
             <a:xfrm>
-              <a:off x="6857998" y="3733798"/>
-              <a:ext cx="914400" cy="914401"/>
-              <a:chOff x="6913417" y="4495803"/>
-              <a:chExt cx="831275" cy="798026"/>
+              <a:off x="6913420" y="5027820"/>
+              <a:ext cx="831273" cy="266009"/>
             </a:xfrm>
-          </p:grpSpPr>
-          <p:sp>
-            <p:nvSpPr>
-              <p:cNvPr id="28" name="Rectangle: Rounded Corners 27">
-                <a:extLst>
-                  <a:ext uri="{FF2B5EF4-FFF2-40B4-BE49-F238E27FC236}">
-                    <a16:creationId xmlns:a16="http://schemas.microsoft.com/office/drawing/2014/main" id="{C1C8F575-06DF-481B-BF11-C59CF360DDDA}"/>
-                  </a:ext>
-                </a:extLst>
-              </p:cNvPr>
-              <p:cNvSpPr/>
-              <p:nvPr/>
-            </p:nvSpPr>
-            <p:spPr>
-              <a:xfrm>
-                <a:off x="6913428" y="4495803"/>
-                <a:ext cx="831264" cy="266009"/>
-              </a:xfrm>
-              <a:prstGeom prst="roundRect">
-                <a:avLst/>
-              </a:prstGeom>
-            </p:spPr>
-            <p:style>
-              <a:lnRef idx="2">
-                <a:schemeClr val="accent3">
-                  <a:shade val="50000"/>
-                </a:schemeClr>
-              </a:lnRef>
-              <a:fillRef idx="1">
-                <a:schemeClr val="accent3"/>
-              </a:fillRef>
-              <a:effectRef idx="0">
-                <a:schemeClr val="accent3"/>
-              </a:effectRef>
-              <a:fontRef idx="minor">
-                <a:schemeClr val="lt1"/>
-              </a:fontRef>
-            </p:style>
-            <p:txBody>
-              <a:bodyPr rtlCol="0" anchor="ctr"/>
-              <a:lstStyle/>
-              <a:p>
-                <a:pPr algn="ctr"/>
-                <a:r>
-                  <a:rPr lang="en-US" sz="1200" dirty="0"/>
-                  <a:t>Text</a:t>
-                </a:r>
-              </a:p>
-            </p:txBody>
-          </p:sp>
-          <p:sp>
-            <p:nvSpPr>
-              <p:cNvPr id="29" name="Rectangle: Rounded Corners 28">
-                <a:extLst>
-                  <a:ext uri="{FF2B5EF4-FFF2-40B4-BE49-F238E27FC236}">
-                    <a16:creationId xmlns:a16="http://schemas.microsoft.com/office/drawing/2014/main" id="{F5AAACC3-6334-4219-B821-40C7910B6ACD}"/>
-                  </a:ext>
-                </a:extLst>
-              </p:cNvPr>
-              <p:cNvSpPr/>
-              <p:nvPr/>
-            </p:nvSpPr>
-            <p:spPr>
-              <a:xfrm>
-                <a:off x="6913417" y="4761811"/>
-                <a:ext cx="831274" cy="266009"/>
-              </a:xfrm>
-              <a:prstGeom prst="roundRect">
-                <a:avLst/>
-              </a:prstGeom>
-            </p:spPr>
-            <p:style>
-              <a:lnRef idx="2">
-                <a:schemeClr val="accent3">
-                  <a:shade val="50000"/>
-                </a:schemeClr>
-              </a:lnRef>
-              <a:fillRef idx="1">
-                <a:schemeClr val="accent3"/>
-              </a:fillRef>
-              <a:effectRef idx="0">
-                <a:schemeClr val="accent3"/>
-              </a:effectRef>
-              <a:fontRef idx="minor">
-                <a:schemeClr val="lt1"/>
-              </a:fontRef>
-            </p:style>
-            <p:txBody>
-              <a:bodyPr rtlCol="0" anchor="ctr"/>
-              <a:lstStyle/>
-              <a:p>
-                <a:pPr algn="ctr"/>
-                <a:r>
-                  <a:rPr lang="en-US" sz="1200" dirty="0"/>
-                  <a:t>Audio</a:t>
-                </a:r>
-              </a:p>
-            </p:txBody>
-          </p:sp>
-          <p:sp>
-            <p:nvSpPr>
-              <p:cNvPr id="30" name="Rectangle: Rounded Corners 29">
-                <a:extLst>
-                  <a:ext uri="{FF2B5EF4-FFF2-40B4-BE49-F238E27FC236}">
-                    <a16:creationId xmlns:a16="http://schemas.microsoft.com/office/drawing/2014/main" id="{AFEDC236-3892-4FE7-80EF-49899F251EAD}"/>
-                  </a:ext>
-                </a:extLst>
-              </p:cNvPr>
-              <p:cNvSpPr/>
-              <p:nvPr/>
-            </p:nvSpPr>
-            <p:spPr>
-              <a:xfrm>
-                <a:off x="6913417" y="5027820"/>
-                <a:ext cx="831273" cy="266009"/>
-              </a:xfrm>
-              <a:prstGeom prst="roundRect">
-                <a:avLst/>
-              </a:prstGeom>
-            </p:spPr>
-            <p:style>
-              <a:lnRef idx="2">
-                <a:schemeClr val="accent3">
-                  <a:shade val="50000"/>
-                </a:schemeClr>
-              </a:lnRef>
-              <a:fillRef idx="1">
-                <a:schemeClr val="accent3"/>
-              </a:fillRef>
-              <a:effectRef idx="0">
-                <a:schemeClr val="accent3"/>
-              </a:effectRef>
-              <a:fontRef idx="minor">
-                <a:schemeClr val="lt1"/>
-              </a:fontRef>
-            </p:style>
-            <p:txBody>
-              <a:bodyPr rtlCol="0" anchor="ctr"/>
-              <a:lstStyle/>
-              <a:p>
-                <a:pPr algn="ctr"/>
-                <a:r>
-                  <a:rPr lang="en-US" sz="1200" dirty="0"/>
-                  <a:t>Video</a:t>
-                </a:r>
-              </a:p>
-            </p:txBody>
-          </p:sp>
-        </p:grpSp>
+            <a:prstGeom prst="roundRect">
+              <a:avLst/>
+            </a:prstGeom>
+            <a:grpFill/>
+          </p:spPr>
+          <p:style>
+            <a:lnRef idx="2">
+              <a:schemeClr val="accent3">
+                <a:shade val="50000"/>
+              </a:schemeClr>
+            </a:lnRef>
+            <a:fillRef idx="1">
+              <a:schemeClr val="accent3"/>
+            </a:fillRef>
+            <a:effectRef idx="0">
+              <a:schemeClr val="accent3"/>
+            </a:effectRef>
+            <a:fontRef idx="minor">
+              <a:schemeClr val="lt1"/>
+            </a:fontRef>
+          </p:style>
+          <p:txBody>
+            <a:bodyPr rtlCol="0" anchor="ctr"/>
+            <a:lstStyle/>
+            <a:p>
+              <a:pPr algn="ctr"/>
+              <a:r>
+                <a:rPr lang="en-US" sz="1200" dirty="0">
+                  <a:solidFill>
+                    <a:schemeClr val="tx1"/>
+                  </a:solidFill>
+                </a:rPr>
+                <a:t>Video</a:t>
+              </a:r>
+            </a:p>
+          </p:txBody>
+        </p:sp>
       </p:grpSp>
       <p:grpSp>
         <p:nvGrpSpPr>
@@ -4454,7 +4405,7 @@
         </p:nvGrpSpPr>
         <p:grpSpPr>
           <a:xfrm>
-            <a:off x="1371600" y="1143000"/>
+            <a:off x="1676400" y="838200"/>
             <a:ext cx="3200400" cy="1828800"/>
             <a:chOff x="6705600" y="838200"/>
             <a:chExt cx="3200400" cy="1828800"/>
@@ -4798,7 +4749,7 @@
         </p:nvSpPr>
         <p:spPr>
           <a:xfrm>
-            <a:off x="4572000" y="1600200"/>
+            <a:off x="4876800" y="1295400"/>
             <a:ext cx="914400" cy="914400"/>
           </a:xfrm>
           <a:prstGeom prst="roundRect">
@@ -4828,6 +4779,90 @@
               <a:rPr lang="en-US" sz="1200" dirty="0"/>
               <a:t>Other services</a:t>
             </a:r>
+          </a:p>
+        </p:txBody>
+      </p:sp>
+      <p:pic>
+        <p:nvPicPr>
+          <p:cNvPr id="4" name="Graphic 3" descr="User">
+            <a:extLst>
+              <a:ext uri="{FF2B5EF4-FFF2-40B4-BE49-F238E27FC236}">
+                <a16:creationId xmlns:a16="http://schemas.microsoft.com/office/drawing/2014/main" id="{1C4CEBA9-8D3A-4C72-8E87-3125AA049676}"/>
+              </a:ext>
+            </a:extLst>
+          </p:cNvPr>
+          <p:cNvPicPr>
+            <a:picLocks noChangeAspect="1"/>
+          </p:cNvPicPr>
+          <p:nvPr/>
+        </p:nvPicPr>
+        <p:blipFill>
+          <a:blip r:embed="rId3">
+            <a:extLst>
+              <a:ext uri="{28A0092B-C50C-407E-A947-70E740481C1C}">
+                <a14:useLocalDpi xmlns:a14="http://schemas.microsoft.com/office/drawing/2010/main" val="0"/>
+              </a:ext>
+              <a:ext uri="{96DAC541-7B7A-43D3-8B79-37D633B846F1}">
+                <asvg:svgBlip xmlns:asvg="http://schemas.microsoft.com/office/drawing/2016/SVG/main" r:embed="rId4"/>
+              </a:ext>
+            </a:extLst>
+          </a:blip>
+          <a:stretch>
+            <a:fillRect/>
+          </a:stretch>
+        </p:blipFill>
+        <p:spPr>
+          <a:xfrm>
+            <a:off x="4114800" y="3429000"/>
+            <a:ext cx="1219200" cy="1219200"/>
+          </a:xfrm>
+          <a:prstGeom prst="rect">
+            <a:avLst/>
+          </a:prstGeom>
+        </p:spPr>
+      </p:pic>
+      <p:sp>
+        <p:nvSpPr>
+          <p:cNvPr id="5" name="Rectangle 4">
+            <a:extLst>
+              <a:ext uri="{FF2B5EF4-FFF2-40B4-BE49-F238E27FC236}">
+                <a16:creationId xmlns:a16="http://schemas.microsoft.com/office/drawing/2014/main" id="{C773F863-CA17-4555-A1F2-E630D56A90F8}"/>
+              </a:ext>
+            </a:extLst>
+          </p:cNvPr>
+          <p:cNvSpPr/>
+          <p:nvPr/>
+        </p:nvSpPr>
+        <p:spPr>
+          <a:xfrm>
+            <a:off x="1524000" y="685800"/>
+            <a:ext cx="4419600" cy="4267200"/>
+          </a:xfrm>
+          <a:prstGeom prst="rect">
+            <a:avLst/>
+          </a:prstGeom>
+          <a:noFill/>
+        </p:spPr>
+        <p:style>
+          <a:lnRef idx="2">
+            <a:schemeClr val="accent3"/>
+          </a:lnRef>
+          <a:fillRef idx="1">
+            <a:schemeClr val="lt1"/>
+          </a:fillRef>
+          <a:effectRef idx="0">
+            <a:schemeClr val="accent3"/>
+          </a:effectRef>
+          <a:fontRef idx="minor">
+            <a:schemeClr val="dk1"/>
+          </a:fontRef>
+        </p:style>
+        <p:txBody>
+          <a:bodyPr rtlCol="0" anchor="ctr"/>
+          <a:lstStyle/>
+          <a:p>
+            <a:pPr algn="ctr"/>
+            <a:endParaRPr lang="en-US"/>
           </a:p>
         </p:txBody>
       </p:sp>
@@ -9075,7 +9110,7 @@
         </p:nvSpPr>
         <p:spPr>
           <a:xfrm>
-            <a:off x="4572000" y="4038600"/>
+            <a:off x="1676400" y="3886200"/>
             <a:ext cx="4572000" cy="304800"/>
           </a:xfrm>
           <a:prstGeom prst="rect">
@@ -9122,8 +9157,8 @@
         </p:nvSpPr>
         <p:spPr>
           <a:xfrm>
-            <a:off x="6248400" y="3581400"/>
-            <a:ext cx="152400" cy="457200"/>
+            <a:off x="3352800" y="3124200"/>
+            <a:ext cx="304800" cy="762000"/>
           </a:xfrm>
           <a:prstGeom prst="upDownArrow">
             <a:avLst/>
@@ -9166,8 +9201,8 @@
         </p:nvSpPr>
         <p:spPr>
           <a:xfrm>
-            <a:off x="6248400" y="4343400"/>
-            <a:ext cx="152400" cy="457200"/>
+            <a:off x="3352800" y="4191000"/>
+            <a:ext cx="304800" cy="762000"/>
           </a:xfrm>
           <a:prstGeom prst="upDownArrow">
             <a:avLst/>
@@ -9210,8 +9245,8 @@
         </p:nvSpPr>
         <p:spPr>
           <a:xfrm>
-            <a:off x="8077200" y="2971800"/>
-            <a:ext cx="762000" cy="609600"/>
+            <a:off x="5181600" y="2514600"/>
+            <a:ext cx="914400" cy="609600"/>
           </a:xfrm>
           <a:prstGeom prst="can">
             <a:avLst/>
@@ -9257,8 +9292,8 @@
         </p:nvSpPr>
         <p:spPr>
           <a:xfrm>
-            <a:off x="8382000" y="3581400"/>
-            <a:ext cx="152400" cy="457200"/>
+            <a:off x="5486400" y="3124200"/>
+            <a:ext cx="304800" cy="762000"/>
           </a:xfrm>
           <a:prstGeom prst="upDownArrow">
             <a:avLst/>
@@ -9301,7 +9336,7 @@
         </p:nvGrpSpPr>
         <p:grpSpPr>
           <a:xfrm>
-            <a:off x="4876800" y="838200"/>
+            <a:off x="1981200" y="381000"/>
             <a:ext cx="2895600" cy="2743200"/>
             <a:chOff x="4724400" y="1600200"/>
             <a:chExt cx="2895600" cy="2743200"/>
@@ -9690,287 +9725,136 @@
           </p:style>
         </p:cxnSp>
       </p:grpSp>
-      <p:grpSp>
-        <p:nvGrpSpPr>
-          <p:cNvPr id="217" name="Group 216">
+      <p:sp>
+        <p:nvSpPr>
+          <p:cNvPr id="2" name="Rectangle: Rounded Corners 1">
             <a:extLst>
               <a:ext uri="{FF2B5EF4-FFF2-40B4-BE49-F238E27FC236}">
-                <a16:creationId xmlns:a16="http://schemas.microsoft.com/office/drawing/2014/main" id="{B482EA07-BDD9-4D57-852E-58BC36A20AE4}"/>
+                <a16:creationId xmlns:a16="http://schemas.microsoft.com/office/drawing/2014/main" id="{A7A16428-7C1A-4AB7-9676-66DAC5BEBE4A}"/>
               </a:ext>
             </a:extLst>
           </p:cNvPr>
-          <p:cNvGrpSpPr/>
+          <p:cNvSpPr/>
           <p:nvPr/>
-        </p:nvGrpSpPr>
-        <p:grpSpPr>
+        </p:nvSpPr>
+        <p:spPr>
           <a:xfrm>
-            <a:off x="5486400" y="4800600"/>
-            <a:ext cx="1981202" cy="1524000"/>
-            <a:chOff x="6705599" y="3276600"/>
-            <a:chExt cx="1981202" cy="1524000"/>
+            <a:off x="2743200" y="4953000"/>
+            <a:ext cx="1524000" cy="1524000"/>
           </a:xfrm>
-        </p:grpSpPr>
-        <p:sp>
-          <p:nvSpPr>
-            <p:cNvPr id="218" name="Rectangle: Rounded Corners 217">
-              <a:extLst>
-                <a:ext uri="{FF2B5EF4-FFF2-40B4-BE49-F238E27FC236}">
-                  <a16:creationId xmlns:a16="http://schemas.microsoft.com/office/drawing/2014/main" id="{BE246D5F-2551-42FC-BAF8-4CF7CD185BDF}"/>
-                </a:ext>
-              </a:extLst>
-            </p:cNvPr>
-            <p:cNvSpPr/>
-            <p:nvPr/>
-          </p:nvSpPr>
-          <p:spPr>
-            <a:xfrm>
-              <a:off x="6705599" y="3276600"/>
-              <a:ext cx="1828801" cy="1524000"/>
-            </a:xfrm>
-            <a:prstGeom prst="roundRect">
-              <a:avLst/>
-            </a:prstGeom>
-          </p:spPr>
-          <p:style>
-            <a:lnRef idx="1">
-              <a:schemeClr val="accent3"/>
-            </a:lnRef>
-            <a:fillRef idx="2">
-              <a:schemeClr val="accent3"/>
-            </a:fillRef>
-            <a:effectRef idx="1">
-              <a:schemeClr val="accent3"/>
-            </a:effectRef>
-            <a:fontRef idx="minor">
-              <a:schemeClr val="dk1"/>
-            </a:fontRef>
-          </p:style>
-          <p:txBody>
-            <a:bodyPr rtlCol="0" anchor="t"/>
-            <a:lstStyle/>
-            <a:p>
-              <a:r>
-                <a:rPr lang="en-US" sz="1200" dirty="0"/>
-                <a:t>Device/Channel</a:t>
-              </a:r>
-            </a:p>
-          </p:txBody>
-        </p:sp>
-        <p:sp>
-          <p:nvSpPr>
-            <p:cNvPr id="219" name="Rectangle: Rounded Corners 218">
-              <a:extLst>
-                <a:ext uri="{FF2B5EF4-FFF2-40B4-BE49-F238E27FC236}">
-                  <a16:creationId xmlns:a16="http://schemas.microsoft.com/office/drawing/2014/main" id="{C0B7D263-3085-4609-B372-7D8CCD661623}"/>
-                </a:ext>
-              </a:extLst>
-            </p:cNvPr>
-            <p:cNvSpPr/>
-            <p:nvPr/>
-          </p:nvSpPr>
-          <p:spPr>
-            <a:xfrm>
-              <a:off x="7924799" y="3733800"/>
-              <a:ext cx="762002" cy="914400"/>
-            </a:xfrm>
-            <a:prstGeom prst="roundRect">
-              <a:avLst/>
-            </a:prstGeom>
-          </p:spPr>
-          <p:style>
-            <a:lnRef idx="2">
-              <a:schemeClr val="dk1"/>
-            </a:lnRef>
-            <a:fillRef idx="1">
-              <a:schemeClr val="lt1"/>
-            </a:fillRef>
-            <a:effectRef idx="0">
-              <a:schemeClr val="dk1"/>
-            </a:effectRef>
-            <a:fontRef idx="minor">
-              <a:schemeClr val="dk1"/>
-            </a:fontRef>
-          </p:style>
-          <p:txBody>
-            <a:bodyPr rtlCol="0" anchor="t"/>
-            <a:lstStyle/>
-            <a:p>
-              <a:r>
-                <a:rPr lang="en-US" sz="1200" dirty="0"/>
-                <a:t>User</a:t>
-              </a:r>
-            </a:p>
-          </p:txBody>
-        </p:sp>
-        <p:grpSp>
-          <p:nvGrpSpPr>
-            <p:cNvPr id="220" name="Group 219">
-              <a:extLst>
-                <a:ext uri="{FF2B5EF4-FFF2-40B4-BE49-F238E27FC236}">
-                  <a16:creationId xmlns:a16="http://schemas.microsoft.com/office/drawing/2014/main" id="{00C9504D-1AA3-4991-87F9-7D763D486F35}"/>
-                </a:ext>
-              </a:extLst>
-            </p:cNvPr>
-            <p:cNvGrpSpPr/>
-            <p:nvPr/>
-          </p:nvGrpSpPr>
-          <p:grpSpPr>
-            <a:xfrm>
-              <a:off x="6857998" y="3733798"/>
-              <a:ext cx="914400" cy="914401"/>
-              <a:chOff x="6913417" y="4495803"/>
-              <a:chExt cx="831275" cy="798026"/>
-            </a:xfrm>
-          </p:grpSpPr>
-          <p:sp>
-            <p:nvSpPr>
-              <p:cNvPr id="221" name="Rectangle: Rounded Corners 220">
-                <a:extLst>
-                  <a:ext uri="{FF2B5EF4-FFF2-40B4-BE49-F238E27FC236}">
-                    <a16:creationId xmlns:a16="http://schemas.microsoft.com/office/drawing/2014/main" id="{CCB5A3B1-1BE2-4016-9D92-180AB4990746}"/>
-                  </a:ext>
-                </a:extLst>
-              </p:cNvPr>
-              <p:cNvSpPr/>
-              <p:nvPr/>
-            </p:nvSpPr>
-            <p:spPr>
-              <a:xfrm>
-                <a:off x="6913428" y="4495803"/>
-                <a:ext cx="831264" cy="266009"/>
-              </a:xfrm>
-              <a:prstGeom prst="roundRect">
-                <a:avLst/>
-              </a:prstGeom>
-            </p:spPr>
-            <p:style>
-              <a:lnRef idx="2">
-                <a:schemeClr val="accent3">
-                  <a:shade val="50000"/>
-                </a:schemeClr>
-              </a:lnRef>
-              <a:fillRef idx="1">
-                <a:schemeClr val="accent3"/>
-              </a:fillRef>
-              <a:effectRef idx="0">
-                <a:schemeClr val="accent3"/>
-              </a:effectRef>
-              <a:fontRef idx="minor">
-                <a:schemeClr val="lt1"/>
-              </a:fontRef>
-            </p:style>
-            <p:txBody>
-              <a:bodyPr rtlCol="0" anchor="ctr"/>
-              <a:lstStyle/>
-              <a:p>
-                <a:pPr algn="ctr"/>
-                <a:r>
-                  <a:rPr lang="en-US" sz="1200" dirty="0"/>
-                  <a:t>Text</a:t>
-                </a:r>
-              </a:p>
-            </p:txBody>
-          </p:sp>
-          <p:sp>
-            <p:nvSpPr>
-              <p:cNvPr id="222" name="Rectangle: Rounded Corners 221">
-                <a:extLst>
-                  <a:ext uri="{FF2B5EF4-FFF2-40B4-BE49-F238E27FC236}">
-                    <a16:creationId xmlns:a16="http://schemas.microsoft.com/office/drawing/2014/main" id="{E66BAA78-A33F-4CA6-9443-125E0C997448}"/>
-                  </a:ext>
-                </a:extLst>
-              </p:cNvPr>
-              <p:cNvSpPr/>
-              <p:nvPr/>
-            </p:nvSpPr>
-            <p:spPr>
-              <a:xfrm>
-                <a:off x="6913417" y="4761811"/>
-                <a:ext cx="831274" cy="266009"/>
-              </a:xfrm>
-              <a:prstGeom prst="roundRect">
-                <a:avLst/>
-              </a:prstGeom>
-            </p:spPr>
-            <p:style>
-              <a:lnRef idx="2">
-                <a:schemeClr val="accent3">
-                  <a:shade val="50000"/>
-                </a:schemeClr>
-              </a:lnRef>
-              <a:fillRef idx="1">
-                <a:schemeClr val="accent3"/>
-              </a:fillRef>
-              <a:effectRef idx="0">
-                <a:schemeClr val="accent3"/>
-              </a:effectRef>
-              <a:fontRef idx="minor">
-                <a:schemeClr val="lt1"/>
-              </a:fontRef>
-            </p:style>
-            <p:txBody>
-              <a:bodyPr rtlCol="0" anchor="ctr"/>
-              <a:lstStyle/>
-              <a:p>
-                <a:pPr algn="ctr"/>
-                <a:r>
-                  <a:rPr lang="en-US" sz="1200" dirty="0"/>
-                  <a:t>Audio</a:t>
-                </a:r>
-              </a:p>
-            </p:txBody>
-          </p:sp>
-          <p:sp>
-            <p:nvSpPr>
-              <p:cNvPr id="223" name="Rectangle: Rounded Corners 222">
-                <a:extLst>
-                  <a:ext uri="{FF2B5EF4-FFF2-40B4-BE49-F238E27FC236}">
-                    <a16:creationId xmlns:a16="http://schemas.microsoft.com/office/drawing/2014/main" id="{39A332F2-5B5D-496E-B780-560CCCE353E1}"/>
-                  </a:ext>
-                </a:extLst>
-              </p:cNvPr>
-              <p:cNvSpPr/>
-              <p:nvPr/>
-            </p:nvSpPr>
-            <p:spPr>
-              <a:xfrm>
-                <a:off x="6913417" y="5027820"/>
-                <a:ext cx="831273" cy="266009"/>
-              </a:xfrm>
-              <a:prstGeom prst="roundRect">
-                <a:avLst/>
-              </a:prstGeom>
-            </p:spPr>
-            <p:style>
-              <a:lnRef idx="2">
-                <a:schemeClr val="accent3">
-                  <a:shade val="50000"/>
-                </a:schemeClr>
-              </a:lnRef>
-              <a:fillRef idx="1">
-                <a:schemeClr val="accent3"/>
-              </a:fillRef>
-              <a:effectRef idx="0">
-                <a:schemeClr val="accent3"/>
-              </a:effectRef>
-              <a:fontRef idx="minor">
-                <a:schemeClr val="lt1"/>
-              </a:fontRef>
-            </p:style>
-            <p:txBody>
-              <a:bodyPr rtlCol="0" anchor="ctr"/>
-              <a:lstStyle/>
-              <a:p>
-                <a:pPr algn="ctr"/>
-                <a:r>
-                  <a:rPr lang="en-US" sz="1200" dirty="0"/>
-                  <a:t>Video</a:t>
-                </a:r>
-              </a:p>
-            </p:txBody>
-          </p:sp>
-        </p:grpSp>
-      </p:grpSp>
+          <a:prstGeom prst="roundRect">
+            <a:avLst/>
+          </a:prstGeom>
+        </p:spPr>
+        <p:style>
+          <a:lnRef idx="1">
+            <a:schemeClr val="accent3"/>
+          </a:lnRef>
+          <a:fillRef idx="2">
+            <a:schemeClr val="accent3"/>
+          </a:fillRef>
+          <a:effectRef idx="1">
+            <a:schemeClr val="accent3"/>
+          </a:effectRef>
+          <a:fontRef idx="minor">
+            <a:schemeClr val="dk1"/>
+          </a:fontRef>
+        </p:style>
+        <p:txBody>
+          <a:bodyPr rtlCol="0" anchor="t"/>
+          <a:lstStyle/>
+          <a:p>
+            <a:r>
+              <a:rPr lang="en-US" sz="1200" dirty="0"/>
+              <a:t>Device/Channel</a:t>
+            </a:r>
+          </a:p>
+        </p:txBody>
+      </p:sp>
+      <p:pic>
+        <p:nvPicPr>
+          <p:cNvPr id="3" name="Graphic 2" descr="User">
+            <a:extLst>
+              <a:ext uri="{FF2B5EF4-FFF2-40B4-BE49-F238E27FC236}">
+                <a16:creationId xmlns:a16="http://schemas.microsoft.com/office/drawing/2014/main" id="{2E87BDFC-07DC-4A8F-BA62-26CBC768908C}"/>
+              </a:ext>
+            </a:extLst>
+          </p:cNvPr>
+          <p:cNvPicPr>
+            <a:picLocks noChangeAspect="1"/>
+          </p:cNvPicPr>
+          <p:nvPr/>
+        </p:nvPicPr>
+        <p:blipFill>
+          <a:blip r:embed="rId3">
+            <a:extLst>
+              <a:ext uri="{28A0092B-C50C-407E-A947-70E740481C1C}">
+                <a14:useLocalDpi xmlns:a14="http://schemas.microsoft.com/office/drawing/2010/main" val="0"/>
+              </a:ext>
+              <a:ext uri="{96DAC541-7B7A-43D3-8B79-37D633B846F1}">
+                <asvg:svgBlip xmlns:asvg="http://schemas.microsoft.com/office/drawing/2016/SVG/main" r:embed="rId4"/>
+              </a:ext>
+            </a:extLst>
+          </a:blip>
+          <a:stretch>
+            <a:fillRect/>
+          </a:stretch>
+        </p:blipFill>
+        <p:spPr>
+          <a:xfrm>
+            <a:off x="4267200" y="5105400"/>
+            <a:ext cx="1219200" cy="1219200"/>
+          </a:xfrm>
+          <a:prstGeom prst="rect">
+            <a:avLst/>
+          </a:prstGeom>
+        </p:spPr>
+      </p:pic>
+      <p:sp>
+        <p:nvSpPr>
+          <p:cNvPr id="4" name="Rectangle 3">
+            <a:extLst>
+              <a:ext uri="{FF2B5EF4-FFF2-40B4-BE49-F238E27FC236}">
+                <a16:creationId xmlns:a16="http://schemas.microsoft.com/office/drawing/2014/main" id="{C192469C-FEB2-4FF6-AC96-2468C775F168}"/>
+              </a:ext>
+            </a:extLst>
+          </p:cNvPr>
+          <p:cNvSpPr/>
+          <p:nvPr/>
+        </p:nvSpPr>
+        <p:spPr>
+          <a:xfrm>
+            <a:off x="1524000" y="228600"/>
+            <a:ext cx="4876800" cy="6400800"/>
+          </a:xfrm>
+          <a:prstGeom prst="rect">
+            <a:avLst/>
+          </a:prstGeom>
+          <a:noFill/>
+        </p:spPr>
+        <p:style>
+          <a:lnRef idx="2">
+            <a:schemeClr val="accent3"/>
+          </a:lnRef>
+          <a:fillRef idx="1">
+            <a:schemeClr val="lt1"/>
+          </a:fillRef>
+          <a:effectRef idx="0">
+            <a:schemeClr val="accent3"/>
+          </a:effectRef>
+          <a:fontRef idx="minor">
+            <a:schemeClr val="dk1"/>
+          </a:fontRef>
+        </p:style>
+        <p:txBody>
+          <a:bodyPr rtlCol="0" anchor="ctr"/>
+          <a:lstStyle/>
+          <a:p>
+            <a:pPr algn="ctr"/>
+            <a:endParaRPr lang="en-US"/>
+          </a:p>
+        </p:txBody>
+      </p:sp>
     </p:spTree>
     <p:extLst>
       <p:ext uri="{BB962C8B-B14F-4D97-AF65-F5344CB8AC3E}">

</xml_diff>

<commit_message>
Tweek articles and architecture images
</commit_message>
<xml_diff>
--- a/art-source/power-point/architecture.pptx
+++ b/art-source/power-point/architecture.pptx
@@ -233,7 +233,7 @@
           <a:p>
             <a:fld id="{8571834C-5366-4363-9166-255623AAA58F}" type="datetimeFigureOut">
               <a:rPr lang="en-US" smtClean="0"/>
-              <a:t>10/5/2020</a:t>
+              <a:t>10/9/2020</a:t>
             </a:fld>
             <a:endParaRPr lang="en-US"/>
           </a:p>
@@ -1004,7 +1004,7 @@
           <a:p>
             <a:fld id="{CC8FB143-15DE-4420-B72D-ECFFB175310A}" type="datetimeFigureOut">
               <a:rPr lang="en-US" smtClean="0"/>
-              <a:t>10/5/2020</a:t>
+              <a:t>10/9/2020</a:t>
             </a:fld>
             <a:endParaRPr lang="en-US"/>
           </a:p>
@@ -1202,7 +1202,7 @@
           <a:p>
             <a:fld id="{CC8FB143-15DE-4420-B72D-ECFFB175310A}" type="datetimeFigureOut">
               <a:rPr lang="en-US" smtClean="0"/>
-              <a:t>10/5/2020</a:t>
+              <a:t>10/9/2020</a:t>
             </a:fld>
             <a:endParaRPr lang="en-US"/>
           </a:p>
@@ -1410,7 +1410,7 @@
           <a:p>
             <a:fld id="{CC8FB143-15DE-4420-B72D-ECFFB175310A}" type="datetimeFigureOut">
               <a:rPr lang="en-US" smtClean="0"/>
-              <a:t>10/5/2020</a:t>
+              <a:t>10/9/2020</a:t>
             </a:fld>
             <a:endParaRPr lang="en-US"/>
           </a:p>
@@ -1608,7 +1608,7 @@
           <a:p>
             <a:fld id="{CC8FB143-15DE-4420-B72D-ECFFB175310A}" type="datetimeFigureOut">
               <a:rPr lang="en-US" smtClean="0"/>
-              <a:t>10/5/2020</a:t>
+              <a:t>10/9/2020</a:t>
             </a:fld>
             <a:endParaRPr lang="en-US"/>
           </a:p>
@@ -1883,7 +1883,7 @@
           <a:p>
             <a:fld id="{CC8FB143-15DE-4420-B72D-ECFFB175310A}" type="datetimeFigureOut">
               <a:rPr lang="en-US" smtClean="0"/>
-              <a:t>10/5/2020</a:t>
+              <a:t>10/9/2020</a:t>
             </a:fld>
             <a:endParaRPr lang="en-US"/>
           </a:p>
@@ -2148,7 +2148,7 @@
           <a:p>
             <a:fld id="{CC8FB143-15DE-4420-B72D-ECFFB175310A}" type="datetimeFigureOut">
               <a:rPr lang="en-US" smtClean="0"/>
-              <a:t>10/5/2020</a:t>
+              <a:t>10/9/2020</a:t>
             </a:fld>
             <a:endParaRPr lang="en-US"/>
           </a:p>
@@ -2560,7 +2560,7 @@
           <a:p>
             <a:fld id="{CC8FB143-15DE-4420-B72D-ECFFB175310A}" type="datetimeFigureOut">
               <a:rPr lang="en-US" smtClean="0"/>
-              <a:t>10/5/2020</a:t>
+              <a:t>10/9/2020</a:t>
             </a:fld>
             <a:endParaRPr lang="en-US"/>
           </a:p>
@@ -2701,7 +2701,7 @@
           <a:p>
             <a:fld id="{CC8FB143-15DE-4420-B72D-ECFFB175310A}" type="datetimeFigureOut">
               <a:rPr lang="en-US" smtClean="0"/>
-              <a:t>10/5/2020</a:t>
+              <a:t>10/9/2020</a:t>
             </a:fld>
             <a:endParaRPr lang="en-US"/>
           </a:p>
@@ -2814,7 +2814,7 @@
           <a:p>
             <a:fld id="{CC8FB143-15DE-4420-B72D-ECFFB175310A}" type="datetimeFigureOut">
               <a:rPr lang="en-US" smtClean="0"/>
-              <a:t>10/5/2020</a:t>
+              <a:t>10/9/2020</a:t>
             </a:fld>
             <a:endParaRPr lang="en-US"/>
           </a:p>
@@ -3125,7 +3125,7 @@
           <a:p>
             <a:fld id="{CC8FB143-15DE-4420-B72D-ECFFB175310A}" type="datetimeFigureOut">
               <a:rPr lang="en-US" smtClean="0"/>
-              <a:t>10/5/2020</a:t>
+              <a:t>10/9/2020</a:t>
             </a:fld>
             <a:endParaRPr lang="en-US"/>
           </a:p>
@@ -3413,7 +3413,7 @@
           <a:p>
             <a:fld id="{CC8FB143-15DE-4420-B72D-ECFFB175310A}" type="datetimeFigureOut">
               <a:rPr lang="en-US" smtClean="0"/>
-              <a:t>10/5/2020</a:t>
+              <a:t>10/9/2020</a:t>
             </a:fld>
             <a:endParaRPr lang="en-US"/>
           </a:p>
@@ -3654,7 +3654,7 @@
           <a:p>
             <a:fld id="{CC8FB143-15DE-4420-B72D-ECFFB175310A}" type="datetimeFigureOut">
               <a:rPr lang="en-US" smtClean="0"/>
-              <a:t>10/5/2020</a:t>
+              <a:t>10/9/2020</a:t>
             </a:fld>
             <a:endParaRPr lang="en-US"/>
           </a:p>
@@ -9157,8 +9157,8 @@
         </p:nvSpPr>
         <p:spPr>
           <a:xfrm>
-            <a:off x="3352800" y="3124200"/>
-            <a:ext cx="304800" cy="762000"/>
+            <a:off x="3352800" y="3276600"/>
+            <a:ext cx="304800" cy="609600"/>
           </a:xfrm>
           <a:prstGeom prst="upDownArrow">
             <a:avLst/>
@@ -9202,7 +9202,7 @@
         <p:spPr>
           <a:xfrm>
             <a:off x="3352800" y="4191000"/>
-            <a:ext cx="304800" cy="762000"/>
+            <a:ext cx="304800" cy="609600"/>
           </a:xfrm>
           <a:prstGeom prst="upDownArrow">
             <a:avLst/>
@@ -9245,7 +9245,7 @@
         </p:nvSpPr>
         <p:spPr>
           <a:xfrm>
-            <a:off x="5181600" y="2514600"/>
+            <a:off x="5181600" y="2667000"/>
             <a:ext cx="914400" cy="609600"/>
           </a:xfrm>
           <a:prstGeom prst="can">
@@ -9292,8 +9292,8 @@
         </p:nvSpPr>
         <p:spPr>
           <a:xfrm>
-            <a:off x="5486400" y="3124200"/>
-            <a:ext cx="304800" cy="762000"/>
+            <a:off x="5486400" y="3276600"/>
+            <a:ext cx="304800" cy="609600"/>
           </a:xfrm>
           <a:prstGeom prst="upDownArrow">
             <a:avLst/>
@@ -9336,7 +9336,7 @@
         </p:nvGrpSpPr>
         <p:grpSpPr>
           <a:xfrm>
-            <a:off x="1981200" y="381000"/>
+            <a:off x="1981200" y="533400"/>
             <a:ext cx="2895600" cy="2743200"/>
             <a:chOff x="4724400" y="1600200"/>
             <a:chExt cx="2895600" cy="2743200"/>
@@ -9739,7 +9739,7 @@
         </p:nvSpPr>
         <p:spPr>
           <a:xfrm>
-            <a:off x="2743200" y="4953000"/>
+            <a:off x="2743200" y="4800600"/>
             <a:ext cx="1524000" cy="1524000"/>
           </a:xfrm>
           <a:prstGeom prst="roundRect">
@@ -9802,7 +9802,7 @@
         </p:blipFill>
         <p:spPr>
           <a:xfrm>
-            <a:off x="4267200" y="5105400"/>
+            <a:off x="4267200" y="4953000"/>
             <a:ext cx="1219200" cy="1219200"/>
           </a:xfrm>
           <a:prstGeom prst="rect">
@@ -9824,8 +9824,8 @@
         </p:nvSpPr>
         <p:spPr>
           <a:xfrm>
-            <a:off x="1524000" y="228600"/>
-            <a:ext cx="4876800" cy="6400800"/>
+            <a:off x="1524000" y="381000"/>
+            <a:ext cx="4876800" cy="6096000"/>
           </a:xfrm>
           <a:prstGeom prst="rect">
             <a:avLst/>

</xml_diff>

<commit_message>
Update "how bots work" artwork (#3002)
* Update image

* Update how-bots-work.png

* Update bot-builder-basics.md

* tweak image
</commit_message>
<xml_diff>
--- a/art-source/power-point/architecture.pptx
+++ b/art-source/power-point/architecture.pptx
@@ -119,6 +119,34 @@
     </a:lvl9pPr>
   </p:defaultTextStyle>
   <p:extLst>
+    <p:ext uri="{521415D9-36F7-43E2-AB2F-B90AF26B5E84}">
+      <p14:sectionLst xmlns:p14="http://schemas.microsoft.com/office/powerpoint/2010/main">
+        <p14:section name="bot-service-overview" id="{66F5E9C3-0C73-4C53-BB26-525A28FCEC81}">
+          <p14:sldIdLst>
+            <p14:sldId id="259"/>
+          </p14:sldIdLst>
+        </p14:section>
+        <p14:section name="bot-builder-basics" id="{2BB62A74-EC6E-4643-9CBF-E6C9C90AFAD5}">
+          <p14:sldIdLst>
+            <p14:sldId id="265"/>
+          </p14:sldIdLst>
+        </p14:section>
+        <p14:section name="Unused" id="{EAFEAFA6-9014-4FA9-A769-3F2D39813A44}">
+          <p14:sldIdLst>
+            <p14:sldId id="267"/>
+            <p14:sldId id="269"/>
+            <p14:sldId id="268"/>
+            <p14:sldId id="264"/>
+            <p14:sldId id="260"/>
+            <p14:sldId id="261"/>
+            <p14:sldId id="263"/>
+            <p14:sldId id="262"/>
+            <p14:sldId id="258"/>
+            <p14:sldId id="256"/>
+          </p14:sldIdLst>
+        </p14:section>
+      </p14:sectionLst>
+    </p:ext>
     <p:ext uri="{EFAFB233-063F-42B5-8137-9DF3F51BA10A}">
       <p15:sldGuideLst xmlns:p15="http://schemas.microsoft.com/office/powerpoint/2012/main">
         <p15:guide id="1" orient="horz" pos="2160" userDrawn="1">
@@ -233,7 +261,7 @@
           <a:p>
             <a:fld id="{8571834C-5366-4363-9166-255623AAA58F}" type="datetimeFigureOut">
               <a:rPr lang="en-US" smtClean="0"/>
-              <a:t>10/9/2020</a:t>
+              <a:t>7/22/2022</a:t>
             </a:fld>
             <a:endParaRPr lang="en-US"/>
           </a:p>
@@ -1004,7 +1032,7 @@
           <a:p>
             <a:fld id="{CC8FB143-15DE-4420-B72D-ECFFB175310A}" type="datetimeFigureOut">
               <a:rPr lang="en-US" smtClean="0"/>
-              <a:t>10/9/2020</a:t>
+              <a:t>7/22/2022</a:t>
             </a:fld>
             <a:endParaRPr lang="en-US"/>
           </a:p>
@@ -1202,7 +1230,7 @@
           <a:p>
             <a:fld id="{CC8FB143-15DE-4420-B72D-ECFFB175310A}" type="datetimeFigureOut">
               <a:rPr lang="en-US" smtClean="0"/>
-              <a:t>10/9/2020</a:t>
+              <a:t>7/22/2022</a:t>
             </a:fld>
             <a:endParaRPr lang="en-US"/>
           </a:p>
@@ -1410,7 +1438,7 @@
           <a:p>
             <a:fld id="{CC8FB143-15DE-4420-B72D-ECFFB175310A}" type="datetimeFigureOut">
               <a:rPr lang="en-US" smtClean="0"/>
-              <a:t>10/9/2020</a:t>
+              <a:t>7/22/2022</a:t>
             </a:fld>
             <a:endParaRPr lang="en-US"/>
           </a:p>
@@ -1608,7 +1636,7 @@
           <a:p>
             <a:fld id="{CC8FB143-15DE-4420-B72D-ECFFB175310A}" type="datetimeFigureOut">
               <a:rPr lang="en-US" smtClean="0"/>
-              <a:t>10/9/2020</a:t>
+              <a:t>7/22/2022</a:t>
             </a:fld>
             <a:endParaRPr lang="en-US"/>
           </a:p>
@@ -1883,7 +1911,7 @@
           <a:p>
             <a:fld id="{CC8FB143-15DE-4420-B72D-ECFFB175310A}" type="datetimeFigureOut">
               <a:rPr lang="en-US" smtClean="0"/>
-              <a:t>10/9/2020</a:t>
+              <a:t>7/22/2022</a:t>
             </a:fld>
             <a:endParaRPr lang="en-US"/>
           </a:p>
@@ -2148,7 +2176,7 @@
           <a:p>
             <a:fld id="{CC8FB143-15DE-4420-B72D-ECFFB175310A}" type="datetimeFigureOut">
               <a:rPr lang="en-US" smtClean="0"/>
-              <a:t>10/9/2020</a:t>
+              <a:t>7/22/2022</a:t>
             </a:fld>
             <a:endParaRPr lang="en-US"/>
           </a:p>
@@ -2560,7 +2588,7 @@
           <a:p>
             <a:fld id="{CC8FB143-15DE-4420-B72D-ECFFB175310A}" type="datetimeFigureOut">
               <a:rPr lang="en-US" smtClean="0"/>
-              <a:t>10/9/2020</a:t>
+              <a:t>7/22/2022</a:t>
             </a:fld>
             <a:endParaRPr lang="en-US"/>
           </a:p>
@@ -2701,7 +2729,7 @@
           <a:p>
             <a:fld id="{CC8FB143-15DE-4420-B72D-ECFFB175310A}" type="datetimeFigureOut">
               <a:rPr lang="en-US" smtClean="0"/>
-              <a:t>10/9/2020</a:t>
+              <a:t>7/22/2022</a:t>
             </a:fld>
             <a:endParaRPr lang="en-US"/>
           </a:p>
@@ -2814,7 +2842,7 @@
           <a:p>
             <a:fld id="{CC8FB143-15DE-4420-B72D-ECFFB175310A}" type="datetimeFigureOut">
               <a:rPr lang="en-US" smtClean="0"/>
-              <a:t>10/9/2020</a:t>
+              <a:t>7/22/2022</a:t>
             </a:fld>
             <a:endParaRPr lang="en-US"/>
           </a:p>
@@ -3125,7 +3153,7 @@
           <a:p>
             <a:fld id="{CC8FB143-15DE-4420-B72D-ECFFB175310A}" type="datetimeFigureOut">
               <a:rPr lang="en-US" smtClean="0"/>
-              <a:t>10/9/2020</a:t>
+              <a:t>7/22/2022</a:t>
             </a:fld>
             <a:endParaRPr lang="en-US"/>
           </a:p>
@@ -3413,7 +3441,7 @@
           <a:p>
             <a:fld id="{CC8FB143-15DE-4420-B72D-ECFFB175310A}" type="datetimeFigureOut">
               <a:rPr lang="en-US" smtClean="0"/>
-              <a:t>10/9/2020</a:t>
+              <a:t>7/22/2022</a:t>
             </a:fld>
             <a:endParaRPr lang="en-US"/>
           </a:p>
@@ -3654,7 +3682,7 @@
           <a:p>
             <a:fld id="{CC8FB143-15DE-4420-B72D-ECFFB175310A}" type="datetimeFigureOut">
               <a:rPr lang="en-US" smtClean="0"/>
-              <a:t>10/9/2020</a:t>
+              <a:t>7/22/2022</a:t>
             </a:fld>
             <a:endParaRPr lang="en-US"/>
           </a:p>
@@ -9098,6 +9126,53 @@
       </p:grpSpPr>
       <p:sp>
         <p:nvSpPr>
+          <p:cNvPr id="4" name="Rectangle 3">
+            <a:extLst>
+              <a:ext uri="{FF2B5EF4-FFF2-40B4-BE49-F238E27FC236}">
+                <a16:creationId xmlns:a16="http://schemas.microsoft.com/office/drawing/2014/main" id="{C192469C-FEB2-4FF6-AC96-2468C775F168}"/>
+              </a:ext>
+            </a:extLst>
+          </p:cNvPr>
+          <p:cNvSpPr/>
+          <p:nvPr/>
+        </p:nvSpPr>
+        <p:spPr>
+          <a:xfrm>
+            <a:off x="1524000" y="381000"/>
+            <a:ext cx="4876800" cy="6096000"/>
+          </a:xfrm>
+          <a:prstGeom prst="rect">
+            <a:avLst/>
+          </a:prstGeom>
+          <a:solidFill>
+            <a:schemeClr val="bg1"/>
+          </a:solidFill>
+        </p:spPr>
+        <p:style>
+          <a:lnRef idx="2">
+            <a:schemeClr val="accent3"/>
+          </a:lnRef>
+          <a:fillRef idx="1">
+            <a:schemeClr val="lt1"/>
+          </a:fillRef>
+          <a:effectRef idx="0">
+            <a:schemeClr val="accent3"/>
+          </a:effectRef>
+          <a:fontRef idx="minor">
+            <a:schemeClr val="dk1"/>
+          </a:fontRef>
+        </p:style>
+        <p:txBody>
+          <a:bodyPr rtlCol="0" anchor="ctr"/>
+          <a:lstStyle/>
+          <a:p>
+            <a:pPr algn="ctr"/>
+            <a:endParaRPr lang="en-US"/>
+          </a:p>
+        </p:txBody>
+      </p:sp>
+      <p:sp>
+        <p:nvSpPr>
           <p:cNvPr id="192" name="Rectangle 191">
             <a:extLst>
               <a:ext uri="{FF2B5EF4-FFF2-40B4-BE49-F238E27FC236}">
@@ -9138,7 +9213,7 @@
             <a:pPr algn="ctr"/>
             <a:r>
               <a:rPr lang="en-US" sz="1200" dirty="0"/>
-              <a:t>ABS or other first- or third-party systems</a:t>
+              <a:t>Azure Bot Service or other first- or third-party systems</a:t>
             </a:r>
           </a:p>
         </p:txBody>
@@ -9740,7 +9815,7 @@
         <p:spPr>
           <a:xfrm>
             <a:off x="2743200" y="4800600"/>
-            <a:ext cx="1524000" cy="1524000"/>
+            <a:ext cx="1524000" cy="1066800"/>
           </a:xfrm>
           <a:prstGeom prst="roundRect">
             <a:avLst/>
@@ -9764,6 +9839,7 @@
           <a:bodyPr rtlCol="0" anchor="t"/>
           <a:lstStyle/>
           <a:p>
+            <a:pPr algn="ctr"/>
             <a:r>
               <a:rPr lang="en-US" sz="1200" dirty="0"/>
               <a:t>Device/Channel</a:t>
@@ -9802,7 +9878,7 @@
         </p:blipFill>
         <p:spPr>
           <a:xfrm>
-            <a:off x="4267200" y="4953000"/>
+            <a:off x="4267200" y="4724400"/>
             <a:ext cx="1219200" cy="1219200"/>
           </a:xfrm>
           <a:prstGeom prst="rect">
@@ -9810,51 +9886,6 @@
           </a:prstGeom>
         </p:spPr>
       </p:pic>
-      <p:sp>
-        <p:nvSpPr>
-          <p:cNvPr id="4" name="Rectangle 3">
-            <a:extLst>
-              <a:ext uri="{FF2B5EF4-FFF2-40B4-BE49-F238E27FC236}">
-                <a16:creationId xmlns:a16="http://schemas.microsoft.com/office/drawing/2014/main" id="{C192469C-FEB2-4FF6-AC96-2468C775F168}"/>
-              </a:ext>
-            </a:extLst>
-          </p:cNvPr>
-          <p:cNvSpPr/>
-          <p:nvPr/>
-        </p:nvSpPr>
-        <p:spPr>
-          <a:xfrm>
-            <a:off x="1524000" y="381000"/>
-            <a:ext cx="4876800" cy="6096000"/>
-          </a:xfrm>
-          <a:prstGeom prst="rect">
-            <a:avLst/>
-          </a:prstGeom>
-          <a:noFill/>
-        </p:spPr>
-        <p:style>
-          <a:lnRef idx="2">
-            <a:schemeClr val="accent3"/>
-          </a:lnRef>
-          <a:fillRef idx="1">
-            <a:schemeClr val="lt1"/>
-          </a:fillRef>
-          <a:effectRef idx="0">
-            <a:schemeClr val="accent3"/>
-          </a:effectRef>
-          <a:fontRef idx="minor">
-            <a:schemeClr val="dk1"/>
-          </a:fontRef>
-        </p:style>
-        <p:txBody>
-          <a:bodyPr rtlCol="0" anchor="ctr"/>
-          <a:lstStyle/>
-          <a:p>
-            <a:pPr algn="ctr"/>
-            <a:endParaRPr lang="en-US"/>
-          </a:p>
-        </p:txBody>
-      </p:sp>
     </p:spTree>
     <p:extLst>
       <p:ext uri="{BB962C8B-B14F-4D97-AF65-F5344CB8AC3E}">
@@ -19738,4 +19769,10 @@
     </a:ext>
   </a:extLst>
 </a:theme>
+</file>
+
+<file path=docMetadata/LabelInfo.xml><?xml version="1.0" encoding="utf-8"?>
+<clbl:labelList xmlns:clbl="http://schemas.microsoft.com/office/2020/mipLabelMetadata">
+  <clbl:label id="{f42aa342-8706-4288-bd11-ebb85995028c}" enabled="1" method="Privileged" siteId="{72f988bf-86f1-41af-91ab-2d7cd011db47}" contentBits="0" removed="0"/>
+</clbl:labelList>
 </file>
</xml_diff>